<commit_message>
Project Design (brief Compute)
</commit_message>
<xml_diff>
--- a/project.pptx
+++ b/project.pptx
@@ -15,11 +15,22 @@
     <p:sldId id="257" r:id="rId9"/>
     <p:sldId id="270" r:id="rId10"/>
     <p:sldId id="274" r:id="rId11"/>
-    <p:sldId id="277" r:id="rId12"/>
-    <p:sldId id="278" r:id="rId13"/>
-    <p:sldId id="283" r:id="rId14"/>
-    <p:sldId id="281" r:id="rId15"/>
-    <p:sldId id="282" r:id="rId16"/>
+    <p:sldId id="285" r:id="rId12"/>
+    <p:sldId id="286" r:id="rId13"/>
+    <p:sldId id="287" r:id="rId14"/>
+    <p:sldId id="288" r:id="rId15"/>
+    <p:sldId id="291" r:id="rId16"/>
+    <p:sldId id="292" r:id="rId17"/>
+    <p:sldId id="293" r:id="rId18"/>
+    <p:sldId id="289" r:id="rId19"/>
+    <p:sldId id="290" r:id="rId20"/>
+    <p:sldId id="294" r:id="rId21"/>
+    <p:sldId id="284" r:id="rId22"/>
+    <p:sldId id="277" r:id="rId23"/>
+    <p:sldId id="278" r:id="rId24"/>
+    <p:sldId id="283" r:id="rId25"/>
+    <p:sldId id="281" r:id="rId26"/>
+    <p:sldId id="282" r:id="rId27"/>
   </p:sldIdLst>
   <p:sldSz cx="12192000" cy="6858000"/>
   <p:notesSz cx="6858000" cy="9144000"/>
@@ -3472,8 +3483,8 @@
         </p:nvSpPr>
         <p:spPr>
           <a:xfrm>
-            <a:off x="8409035" y="1053763"/>
-            <a:ext cx="1485530" cy="1166270"/>
+            <a:off x="8361013" y="1053763"/>
+            <a:ext cx="1631682" cy="1166270"/>
           </a:xfrm>
           <a:prstGeom prst="ellipse">
             <a:avLst/>
@@ -3499,8 +3510,8 @@
           <a:p>
             <a:pPr algn="ctr"/>
             <a:r>
-              <a:rPr lang="en-US" altLang="ko-KR" dirty="0" err="1" smtClean="0"/>
-              <a:t>Eval</a:t>
+              <a:rPr lang="en-US" altLang="ko-KR" dirty="0" smtClean="0"/>
+              <a:t>Compute</a:t>
             </a:r>
             <a:endParaRPr lang="ko-KR" altLang="en-US" dirty="0"/>
           </a:p>
@@ -3901,8 +3912,8 @@
         </p:nvCxnSpPr>
         <p:spPr>
           <a:xfrm rot="5400000">
-            <a:off x="6211226" y="2245759"/>
-            <a:ext cx="2611882" cy="2218839"/>
+            <a:off x="6197916" y="2259068"/>
+            <a:ext cx="2611882" cy="2192220"/>
           </a:xfrm>
           <a:prstGeom prst="curvedConnector2">
             <a:avLst/>
@@ -4019,7 +4030,7 @@
         <p:spPr>
           <a:xfrm flipV="1">
             <a:off x="8813364" y="2220033"/>
-            <a:ext cx="338436" cy="1857951"/>
+            <a:ext cx="363490" cy="1857951"/>
           </a:xfrm>
           <a:prstGeom prst="straightConnector1">
             <a:avLst/>
@@ -4271,7 +4282,7 @@
             <a:pPr algn="ctr"/>
             <a:r>
               <a:rPr lang="en-US" altLang="ko-KR" dirty="0" smtClean="0"/>
-              <a:t>Classes</a:t>
+              <a:t>State Description</a:t>
             </a:r>
             <a:endParaRPr lang="ko-KR" altLang="en-US" dirty="0"/>
           </a:p>
@@ -4280,7 +4291,7 @@
     </p:spTree>
     <p:extLst>
       <p:ext uri="{BB962C8B-B14F-4D97-AF65-F5344CB8AC3E}">
-        <p14:creationId xmlns:p14="http://schemas.microsoft.com/office/powerpoint/2010/main" val="2521189219"/>
+        <p14:creationId xmlns:p14="http://schemas.microsoft.com/office/powerpoint/2010/main" val="2420407134"/>
       </p:ext>
     </p:extLst>
   </p:cSld>
@@ -4331,7 +4342,11 @@
           <a:p>
             <a:r>
               <a:rPr lang="en-US" altLang="ko-KR" dirty="0" smtClean="0"/>
-              <a:t>Messages</a:t>
+              <a:t>Master </a:t>
+            </a:r>
+            <a:r>
+              <a:rPr lang="en-US" altLang="ko-KR" dirty="0" err="1" smtClean="0"/>
+              <a:t>Init</a:t>
             </a:r>
             <a:endParaRPr lang="ko-KR" altLang="en-US" dirty="0"/>
           </a:p>
@@ -4347,6 +4362,1591 @@
             <p:ph idx="1"/>
           </p:nvPr>
         </p:nvSpPr>
+        <p:spPr/>
+        <p:txBody>
+          <a:bodyPr/>
+          <a:lstStyle/>
+          <a:p>
+            <a:r>
+              <a:rPr lang="en-US" altLang="ko-KR" dirty="0" smtClean="0"/>
+              <a:t>Open socket</a:t>
+            </a:r>
+          </a:p>
+          <a:p>
+            <a:r>
+              <a:rPr lang="en-US" altLang="ko-KR" dirty="0" smtClean="0"/>
+              <a:t>Accept connection with loop</a:t>
+            </a:r>
+          </a:p>
+          <a:p>
+            <a:r>
+              <a:rPr lang="en-US" altLang="ko-KR" dirty="0" smtClean="0"/>
+              <a:t>Whenever client connected, create connection future and sampling future for client</a:t>
+            </a:r>
+          </a:p>
+          <a:p>
+            <a:pPr marL="0" indent="0">
+              <a:buNone/>
+            </a:pPr>
+            <a:endParaRPr lang="en-US" altLang="ko-KR" dirty="0"/>
+          </a:p>
+          <a:p>
+            <a:r>
+              <a:rPr lang="en-US" altLang="ko-KR" dirty="0" smtClean="0"/>
+              <a:t>Sampling future is continued by connection future</a:t>
+            </a:r>
+            <a:endParaRPr lang="ko-KR" altLang="en-US" dirty="0"/>
+          </a:p>
+        </p:txBody>
+      </p:sp>
+    </p:spTree>
+    <p:extLst>
+      <p:ext uri="{BB962C8B-B14F-4D97-AF65-F5344CB8AC3E}">
+        <p14:creationId xmlns:p14="http://schemas.microsoft.com/office/powerpoint/2010/main" val="738904106"/>
+      </p:ext>
+    </p:extLst>
+  </p:cSld>
+  <p:clrMapOvr>
+    <a:masterClrMapping/>
+  </p:clrMapOvr>
+</p:sld>
+</file>
+
+<file path=ppt/slides/slide13.xml><?xml version="1.0" encoding="utf-8"?>
+<p:sld xmlns:a="http://schemas.openxmlformats.org/drawingml/2006/main" xmlns:r="http://schemas.openxmlformats.org/officeDocument/2006/relationships" xmlns:p="http://schemas.openxmlformats.org/presentationml/2006/main">
+  <p:cSld>
+    <p:spTree>
+      <p:nvGrpSpPr>
+        <p:cNvPr id="1" name=""/>
+        <p:cNvGrpSpPr/>
+        <p:nvPr/>
+      </p:nvGrpSpPr>
+      <p:grpSpPr>
+        <a:xfrm>
+          <a:off x="0" y="0"/>
+          <a:ext cx="0" cy="0"/>
+          <a:chOff x="0" y="0"/>
+          <a:chExt cx="0" cy="0"/>
+        </a:xfrm>
+      </p:grpSpPr>
+      <p:sp>
+        <p:nvSpPr>
+          <p:cNvPr id="2" name="제목 1"/>
+          <p:cNvSpPr>
+            <a:spLocks noGrp="1"/>
+          </p:cNvSpPr>
+          <p:nvPr>
+            <p:ph type="title"/>
+          </p:nvPr>
+        </p:nvSpPr>
+        <p:spPr/>
+        <p:txBody>
+          <a:bodyPr/>
+          <a:lstStyle/>
+          <a:p>
+            <a:r>
+              <a:rPr lang="en-US" altLang="ko-KR" dirty="0" smtClean="0"/>
+              <a:t>Connection Future</a:t>
+            </a:r>
+            <a:endParaRPr lang="ko-KR" altLang="en-US" dirty="0"/>
+          </a:p>
+        </p:txBody>
+      </p:sp>
+      <p:sp>
+        <p:nvSpPr>
+          <p:cNvPr id="3" name="내용 개체 틀 2"/>
+          <p:cNvSpPr>
+            <a:spLocks noGrp="1"/>
+          </p:cNvSpPr>
+          <p:nvPr>
+            <p:ph idx="1"/>
+          </p:nvPr>
+        </p:nvSpPr>
+        <p:spPr/>
+        <p:txBody>
+          <a:bodyPr/>
+          <a:lstStyle/>
+          <a:p>
+            <a:r>
+              <a:rPr lang="en-US" altLang="ko-KR" dirty="0" smtClean="0"/>
+              <a:t>Receive connection future</a:t>
+            </a:r>
+          </a:p>
+          <a:p>
+            <a:r>
+              <a:rPr lang="en-US" altLang="ko-KR" dirty="0" smtClean="0"/>
+              <a:t>Update slave list </a:t>
+            </a:r>
+            <a:endParaRPr lang="ko-KR" altLang="en-US" dirty="0"/>
+          </a:p>
+        </p:txBody>
+      </p:sp>
+    </p:spTree>
+    <p:extLst>
+      <p:ext uri="{BB962C8B-B14F-4D97-AF65-F5344CB8AC3E}">
+        <p14:creationId xmlns:p14="http://schemas.microsoft.com/office/powerpoint/2010/main" val="3918754546"/>
+      </p:ext>
+    </p:extLst>
+  </p:cSld>
+  <p:clrMapOvr>
+    <a:masterClrMapping/>
+  </p:clrMapOvr>
+</p:sld>
+</file>
+
+<file path=ppt/slides/slide14.xml><?xml version="1.0" encoding="utf-8"?>
+<p:sld xmlns:a="http://schemas.openxmlformats.org/drawingml/2006/main" xmlns:r="http://schemas.openxmlformats.org/officeDocument/2006/relationships" xmlns:p="http://schemas.openxmlformats.org/presentationml/2006/main">
+  <p:cSld>
+    <p:spTree>
+      <p:nvGrpSpPr>
+        <p:cNvPr id="1" name=""/>
+        <p:cNvGrpSpPr/>
+        <p:nvPr/>
+      </p:nvGrpSpPr>
+      <p:grpSpPr>
+        <a:xfrm>
+          <a:off x="0" y="0"/>
+          <a:ext cx="0" cy="0"/>
+          <a:chOff x="0" y="0"/>
+          <a:chExt cx="0" cy="0"/>
+        </a:xfrm>
+      </p:grpSpPr>
+      <p:sp>
+        <p:nvSpPr>
+          <p:cNvPr id="2" name="제목 1"/>
+          <p:cNvSpPr>
+            <a:spLocks noGrp="1"/>
+          </p:cNvSpPr>
+          <p:nvPr>
+            <p:ph type="title"/>
+          </p:nvPr>
+        </p:nvSpPr>
+        <p:spPr/>
+        <p:txBody>
+          <a:bodyPr/>
+          <a:lstStyle/>
+          <a:p>
+            <a:r>
+              <a:rPr lang="en-US" altLang="ko-KR" dirty="0" smtClean="0"/>
+              <a:t>Sampling Future</a:t>
+            </a:r>
+            <a:endParaRPr lang="ko-KR" altLang="en-US" dirty="0"/>
+          </a:p>
+        </p:txBody>
+      </p:sp>
+      <p:sp>
+        <p:nvSpPr>
+          <p:cNvPr id="3" name="내용 개체 틀 2"/>
+          <p:cNvSpPr>
+            <a:spLocks noGrp="1"/>
+          </p:cNvSpPr>
+          <p:nvPr>
+            <p:ph idx="1"/>
+          </p:nvPr>
+        </p:nvSpPr>
+        <p:spPr/>
+        <p:txBody>
+          <a:bodyPr/>
+          <a:lstStyle/>
+          <a:p>
+            <a:r>
+              <a:rPr lang="en-US" altLang="ko-KR" dirty="0" smtClean="0"/>
+              <a:t>Receive samples from slave</a:t>
+            </a:r>
+          </a:p>
+          <a:p>
+            <a:endParaRPr lang="ko-KR" altLang="en-US" dirty="0"/>
+          </a:p>
+        </p:txBody>
+      </p:sp>
+    </p:spTree>
+    <p:extLst>
+      <p:ext uri="{BB962C8B-B14F-4D97-AF65-F5344CB8AC3E}">
+        <p14:creationId xmlns:p14="http://schemas.microsoft.com/office/powerpoint/2010/main" val="1253369"/>
+      </p:ext>
+    </p:extLst>
+  </p:cSld>
+  <p:clrMapOvr>
+    <a:masterClrMapping/>
+  </p:clrMapOvr>
+</p:sld>
+</file>
+
+<file path=ppt/slides/slide15.xml><?xml version="1.0" encoding="utf-8"?>
+<p:sld xmlns:a="http://schemas.openxmlformats.org/drawingml/2006/main" xmlns:r="http://schemas.openxmlformats.org/officeDocument/2006/relationships" xmlns:p="http://schemas.openxmlformats.org/presentationml/2006/main">
+  <p:cSld>
+    <p:spTree>
+      <p:nvGrpSpPr>
+        <p:cNvPr id="1" name=""/>
+        <p:cNvGrpSpPr/>
+        <p:nvPr/>
+      </p:nvGrpSpPr>
+      <p:grpSpPr>
+        <a:xfrm>
+          <a:off x="0" y="0"/>
+          <a:ext cx="0" cy="0"/>
+          <a:chOff x="0" y="0"/>
+          <a:chExt cx="0" cy="0"/>
+        </a:xfrm>
+      </p:grpSpPr>
+      <p:sp>
+        <p:nvSpPr>
+          <p:cNvPr id="2" name="제목 1"/>
+          <p:cNvSpPr>
+            <a:spLocks noGrp="1"/>
+          </p:cNvSpPr>
+          <p:nvPr>
+            <p:ph type="title"/>
+          </p:nvPr>
+        </p:nvSpPr>
+        <p:spPr/>
+        <p:txBody>
+          <a:bodyPr/>
+          <a:lstStyle/>
+          <a:p>
+            <a:r>
+              <a:rPr lang="en-US" altLang="ko-KR" dirty="0" smtClean="0"/>
+              <a:t>Master </a:t>
+            </a:r>
+            <a:r>
+              <a:rPr lang="en-US" altLang="ko-KR" dirty="0" err="1" smtClean="0"/>
+              <a:t>Calc</a:t>
+            </a:r>
+            <a:endParaRPr lang="ko-KR" altLang="en-US" dirty="0"/>
+          </a:p>
+        </p:txBody>
+      </p:sp>
+      <p:sp>
+        <p:nvSpPr>
+          <p:cNvPr id="3" name="내용 개체 틀 2"/>
+          <p:cNvSpPr>
+            <a:spLocks noGrp="1"/>
+          </p:cNvSpPr>
+          <p:nvPr>
+            <p:ph idx="1"/>
+          </p:nvPr>
+        </p:nvSpPr>
+        <p:spPr/>
+        <p:txBody>
+          <a:bodyPr/>
+          <a:lstStyle/>
+          <a:p>
+            <a:r>
+              <a:rPr lang="en-US" altLang="ko-KR" dirty="0" smtClean="0"/>
+              <a:t>Gather Keys from futures</a:t>
+            </a:r>
+          </a:p>
+          <a:p>
+            <a:r>
+              <a:rPr lang="en-US" altLang="ko-KR" dirty="0" smtClean="0"/>
+              <a:t>Calculate pivot values</a:t>
+            </a:r>
+          </a:p>
+          <a:p>
+            <a:pPr lvl="1"/>
+            <a:r>
+              <a:rPr lang="en-US" altLang="ko-KR" dirty="0" smtClean="0"/>
+              <a:t>Choose values from 1/n, 2/n, …, (n-1)/n position </a:t>
+            </a:r>
+          </a:p>
+          <a:p>
+            <a:r>
+              <a:rPr lang="en-US" altLang="ko-KR" dirty="0" smtClean="0"/>
+              <a:t>Make compute future</a:t>
+            </a:r>
+            <a:endParaRPr lang="ko-KR" altLang="en-US" dirty="0"/>
+          </a:p>
+        </p:txBody>
+      </p:sp>
+    </p:spTree>
+    <p:extLst>
+      <p:ext uri="{BB962C8B-B14F-4D97-AF65-F5344CB8AC3E}">
+        <p14:creationId xmlns:p14="http://schemas.microsoft.com/office/powerpoint/2010/main" val="1534592386"/>
+      </p:ext>
+    </p:extLst>
+  </p:cSld>
+  <p:clrMapOvr>
+    <a:masterClrMapping/>
+  </p:clrMapOvr>
+</p:sld>
+</file>
+
+<file path=ppt/slides/slide16.xml><?xml version="1.0" encoding="utf-8"?>
+<p:sld xmlns:a="http://schemas.openxmlformats.org/drawingml/2006/main" xmlns:r="http://schemas.openxmlformats.org/officeDocument/2006/relationships" xmlns:p="http://schemas.openxmlformats.org/presentationml/2006/main">
+  <p:cSld>
+    <p:spTree>
+      <p:nvGrpSpPr>
+        <p:cNvPr id="1" name=""/>
+        <p:cNvGrpSpPr/>
+        <p:nvPr/>
+      </p:nvGrpSpPr>
+      <p:grpSpPr>
+        <a:xfrm>
+          <a:off x="0" y="0"/>
+          <a:ext cx="0" cy="0"/>
+          <a:chOff x="0" y="0"/>
+          <a:chExt cx="0" cy="0"/>
+        </a:xfrm>
+      </p:grpSpPr>
+      <p:sp>
+        <p:nvSpPr>
+          <p:cNvPr id="2" name="제목 1"/>
+          <p:cNvSpPr>
+            <a:spLocks noGrp="1"/>
+          </p:cNvSpPr>
+          <p:nvPr>
+            <p:ph type="title"/>
+          </p:nvPr>
+        </p:nvSpPr>
+        <p:spPr/>
+        <p:txBody>
+          <a:bodyPr/>
+          <a:lstStyle/>
+          <a:p>
+            <a:r>
+              <a:rPr lang="en-US" altLang="ko-KR" dirty="0" smtClean="0"/>
+              <a:t>Master Compute</a:t>
+            </a:r>
+            <a:endParaRPr lang="ko-KR" altLang="en-US" dirty="0"/>
+          </a:p>
+        </p:txBody>
+      </p:sp>
+      <p:sp>
+        <p:nvSpPr>
+          <p:cNvPr id="3" name="내용 개체 틀 2"/>
+          <p:cNvSpPr>
+            <a:spLocks noGrp="1"/>
+          </p:cNvSpPr>
+          <p:nvPr>
+            <p:ph idx="1"/>
+          </p:nvPr>
+        </p:nvSpPr>
+        <p:spPr/>
+        <p:txBody>
+          <a:bodyPr/>
+          <a:lstStyle/>
+          <a:p>
+            <a:r>
+              <a:rPr lang="en-US" altLang="ko-KR" dirty="0" smtClean="0"/>
+              <a:t>Send </a:t>
+            </a:r>
+            <a:r>
+              <a:rPr lang="en-US" altLang="ko-KR" dirty="0" err="1" smtClean="0"/>
+              <a:t>SlaveInfoMsg</a:t>
+            </a:r>
+            <a:endParaRPr lang="en-US" altLang="ko-KR" dirty="0" smtClean="0"/>
+          </a:p>
+          <a:p>
+            <a:r>
+              <a:rPr lang="en-US" altLang="ko-KR" dirty="0" smtClean="0"/>
+              <a:t>Wait </a:t>
+            </a:r>
+            <a:r>
+              <a:rPr lang="en-US" altLang="ko-KR" dirty="0" err="1" smtClean="0"/>
+              <a:t>doneMsg</a:t>
+            </a:r>
+            <a:endParaRPr lang="ko-KR" altLang="en-US" dirty="0"/>
+          </a:p>
+        </p:txBody>
+      </p:sp>
+    </p:spTree>
+    <p:extLst>
+      <p:ext uri="{BB962C8B-B14F-4D97-AF65-F5344CB8AC3E}">
+        <p14:creationId xmlns:p14="http://schemas.microsoft.com/office/powerpoint/2010/main" val="1447580139"/>
+      </p:ext>
+    </p:extLst>
+  </p:cSld>
+  <p:clrMapOvr>
+    <a:masterClrMapping/>
+  </p:clrMapOvr>
+</p:sld>
+</file>
+
+<file path=ppt/slides/slide17.xml><?xml version="1.0" encoding="utf-8"?>
+<p:sld xmlns:a="http://schemas.openxmlformats.org/drawingml/2006/main" xmlns:r="http://schemas.openxmlformats.org/officeDocument/2006/relationships" xmlns:p="http://schemas.openxmlformats.org/presentationml/2006/main">
+  <p:cSld>
+    <p:spTree>
+      <p:nvGrpSpPr>
+        <p:cNvPr id="1" name=""/>
+        <p:cNvGrpSpPr/>
+        <p:nvPr/>
+      </p:nvGrpSpPr>
+      <p:grpSpPr>
+        <a:xfrm>
+          <a:off x="0" y="0"/>
+          <a:ext cx="0" cy="0"/>
+          <a:chOff x="0" y="0"/>
+          <a:chExt cx="0" cy="0"/>
+        </a:xfrm>
+      </p:grpSpPr>
+      <p:sp>
+        <p:nvSpPr>
+          <p:cNvPr id="2" name="제목 1"/>
+          <p:cNvSpPr>
+            <a:spLocks noGrp="1"/>
+          </p:cNvSpPr>
+          <p:nvPr>
+            <p:ph type="title"/>
+          </p:nvPr>
+        </p:nvSpPr>
+        <p:spPr/>
+        <p:txBody>
+          <a:bodyPr/>
+          <a:lstStyle/>
+          <a:p>
+            <a:r>
+              <a:rPr lang="en-US" altLang="ko-KR" dirty="0" smtClean="0"/>
+              <a:t>Master Success</a:t>
+            </a:r>
+            <a:endParaRPr lang="ko-KR" altLang="en-US" dirty="0"/>
+          </a:p>
+        </p:txBody>
+      </p:sp>
+      <p:sp>
+        <p:nvSpPr>
+          <p:cNvPr id="3" name="내용 개체 틀 2"/>
+          <p:cNvSpPr>
+            <a:spLocks noGrp="1"/>
+          </p:cNvSpPr>
+          <p:nvPr>
+            <p:ph idx="1"/>
+          </p:nvPr>
+        </p:nvSpPr>
+        <p:spPr/>
+        <p:txBody>
+          <a:bodyPr/>
+          <a:lstStyle/>
+          <a:p>
+            <a:r>
+              <a:rPr lang="en-US" altLang="ko-KR" dirty="0" smtClean="0"/>
+              <a:t>Close all sockets</a:t>
+            </a:r>
+            <a:endParaRPr lang="ko-KR" altLang="en-US" dirty="0"/>
+          </a:p>
+        </p:txBody>
+      </p:sp>
+    </p:spTree>
+    <p:extLst>
+      <p:ext uri="{BB962C8B-B14F-4D97-AF65-F5344CB8AC3E}">
+        <p14:creationId xmlns:p14="http://schemas.microsoft.com/office/powerpoint/2010/main" val="3790057209"/>
+      </p:ext>
+    </p:extLst>
+  </p:cSld>
+  <p:clrMapOvr>
+    <a:masterClrMapping/>
+  </p:clrMapOvr>
+</p:sld>
+</file>
+
+<file path=ppt/slides/slide18.xml><?xml version="1.0" encoding="utf-8"?>
+<p:sld xmlns:a="http://schemas.openxmlformats.org/drawingml/2006/main" xmlns:r="http://schemas.openxmlformats.org/officeDocument/2006/relationships" xmlns:p="http://schemas.openxmlformats.org/presentationml/2006/main">
+  <p:cSld>
+    <p:spTree>
+      <p:nvGrpSpPr>
+        <p:cNvPr id="1" name=""/>
+        <p:cNvGrpSpPr/>
+        <p:nvPr/>
+      </p:nvGrpSpPr>
+      <p:grpSpPr>
+        <a:xfrm>
+          <a:off x="0" y="0"/>
+          <a:ext cx="0" cy="0"/>
+          <a:chOff x="0" y="0"/>
+          <a:chExt cx="0" cy="0"/>
+        </a:xfrm>
+      </p:grpSpPr>
+      <p:sp>
+        <p:nvSpPr>
+          <p:cNvPr id="2" name="제목 1"/>
+          <p:cNvSpPr>
+            <a:spLocks noGrp="1"/>
+          </p:cNvSpPr>
+          <p:nvPr>
+            <p:ph type="title"/>
+          </p:nvPr>
+        </p:nvSpPr>
+        <p:spPr/>
+        <p:txBody>
+          <a:bodyPr/>
+          <a:lstStyle/>
+          <a:p>
+            <a:r>
+              <a:rPr lang="en-US" altLang="ko-KR" dirty="0" smtClean="0"/>
+              <a:t>Client Connect</a:t>
+            </a:r>
+            <a:endParaRPr lang="ko-KR" altLang="en-US" dirty="0"/>
+          </a:p>
+        </p:txBody>
+      </p:sp>
+      <p:sp>
+        <p:nvSpPr>
+          <p:cNvPr id="3" name="내용 개체 틀 2"/>
+          <p:cNvSpPr>
+            <a:spLocks noGrp="1"/>
+          </p:cNvSpPr>
+          <p:nvPr>
+            <p:ph idx="1"/>
+          </p:nvPr>
+        </p:nvSpPr>
+        <p:spPr/>
+        <p:txBody>
+          <a:bodyPr/>
+          <a:lstStyle/>
+          <a:p>
+            <a:r>
+              <a:rPr lang="en-US" altLang="ko-KR" dirty="0" smtClean="0"/>
+              <a:t>Make socket connection with Master</a:t>
+            </a:r>
+          </a:p>
+          <a:p>
+            <a:r>
+              <a:rPr lang="en-US" altLang="ko-KR" dirty="0" smtClean="0"/>
+              <a:t>Get number of key-value pairs</a:t>
+            </a:r>
+          </a:p>
+          <a:p>
+            <a:r>
+              <a:rPr lang="en-US" altLang="ko-KR" dirty="0" smtClean="0"/>
+              <a:t>Send </a:t>
+            </a:r>
+            <a:r>
+              <a:rPr lang="en-US" altLang="ko-KR" dirty="0" err="1" smtClean="0"/>
+              <a:t>ConnectMsg</a:t>
+            </a:r>
+            <a:endParaRPr lang="en-US" altLang="ko-KR" dirty="0" smtClean="0"/>
+          </a:p>
+          <a:p>
+            <a:endParaRPr lang="ko-KR" altLang="en-US" dirty="0"/>
+          </a:p>
+        </p:txBody>
+      </p:sp>
+    </p:spTree>
+    <p:extLst>
+      <p:ext uri="{BB962C8B-B14F-4D97-AF65-F5344CB8AC3E}">
+        <p14:creationId xmlns:p14="http://schemas.microsoft.com/office/powerpoint/2010/main" val="633923706"/>
+      </p:ext>
+    </p:extLst>
+  </p:cSld>
+  <p:clrMapOvr>
+    <a:masterClrMapping/>
+  </p:clrMapOvr>
+</p:sld>
+</file>
+
+<file path=ppt/slides/slide19.xml><?xml version="1.0" encoding="utf-8"?>
+<p:sld xmlns:a="http://schemas.openxmlformats.org/drawingml/2006/main" xmlns:r="http://schemas.openxmlformats.org/officeDocument/2006/relationships" xmlns:p="http://schemas.openxmlformats.org/presentationml/2006/main">
+  <p:cSld>
+    <p:spTree>
+      <p:nvGrpSpPr>
+        <p:cNvPr id="1" name=""/>
+        <p:cNvGrpSpPr/>
+        <p:nvPr/>
+      </p:nvGrpSpPr>
+      <p:grpSpPr>
+        <a:xfrm>
+          <a:off x="0" y="0"/>
+          <a:ext cx="0" cy="0"/>
+          <a:chOff x="0" y="0"/>
+          <a:chExt cx="0" cy="0"/>
+        </a:xfrm>
+      </p:grpSpPr>
+      <p:sp>
+        <p:nvSpPr>
+          <p:cNvPr id="2" name="제목 1"/>
+          <p:cNvSpPr>
+            <a:spLocks noGrp="1"/>
+          </p:cNvSpPr>
+          <p:nvPr>
+            <p:ph type="title"/>
+          </p:nvPr>
+        </p:nvSpPr>
+        <p:spPr/>
+        <p:txBody>
+          <a:bodyPr/>
+          <a:lstStyle/>
+          <a:p>
+            <a:r>
+              <a:rPr lang="en-US" altLang="ko-KR" dirty="0" smtClean="0"/>
+              <a:t>Client Sample</a:t>
+            </a:r>
+            <a:endParaRPr lang="ko-KR" altLang="en-US" dirty="0"/>
+          </a:p>
+        </p:txBody>
+      </p:sp>
+      <p:sp>
+        <p:nvSpPr>
+          <p:cNvPr id="3" name="내용 개체 틀 2"/>
+          <p:cNvSpPr>
+            <a:spLocks noGrp="1"/>
+          </p:cNvSpPr>
+          <p:nvPr>
+            <p:ph idx="1"/>
+          </p:nvPr>
+        </p:nvSpPr>
+        <p:spPr/>
+        <p:txBody>
+          <a:bodyPr/>
+          <a:lstStyle/>
+          <a:p>
+            <a:r>
+              <a:rPr lang="en-US" altLang="ko-KR" dirty="0" smtClean="0"/>
+              <a:t>Sample from data (Sample size is </a:t>
+            </a:r>
+            <a:r>
+              <a:rPr lang="en-US" altLang="ko-KR" dirty="0" err="1" smtClean="0"/>
+              <a:t>proposional</a:t>
+            </a:r>
+            <a:r>
+              <a:rPr lang="en-US" altLang="ko-KR" dirty="0" smtClean="0"/>
+              <a:t> to data size)</a:t>
+            </a:r>
+          </a:p>
+          <a:p>
+            <a:r>
+              <a:rPr lang="en-US" altLang="ko-KR" dirty="0" smtClean="0"/>
+              <a:t>Send samples to master</a:t>
+            </a:r>
+          </a:p>
+          <a:p>
+            <a:endParaRPr lang="en-US" altLang="ko-KR" dirty="0"/>
+          </a:p>
+          <a:p>
+            <a:r>
+              <a:rPr lang="en-US" altLang="ko-KR" dirty="0" smtClean="0"/>
+              <a:t>Wait </a:t>
+            </a:r>
+            <a:r>
+              <a:rPr lang="en-US" altLang="ko-KR" dirty="0" err="1" smtClean="0"/>
+              <a:t>SlaveInfoMsg</a:t>
+            </a:r>
+            <a:endParaRPr lang="ko-KR" altLang="en-US" dirty="0"/>
+          </a:p>
+        </p:txBody>
+      </p:sp>
+    </p:spTree>
+    <p:extLst>
+      <p:ext uri="{BB962C8B-B14F-4D97-AF65-F5344CB8AC3E}">
+        <p14:creationId xmlns:p14="http://schemas.microsoft.com/office/powerpoint/2010/main" val="1566732067"/>
+      </p:ext>
+    </p:extLst>
+  </p:cSld>
+  <p:clrMapOvr>
+    <a:masterClrMapping/>
+  </p:clrMapOvr>
+</p:sld>
+</file>
+
+<file path=ppt/slides/slide2.xml><?xml version="1.0" encoding="utf-8"?>
+<p:sld xmlns:a="http://schemas.openxmlformats.org/drawingml/2006/main" xmlns:r="http://schemas.openxmlformats.org/officeDocument/2006/relationships" xmlns:p="http://schemas.openxmlformats.org/presentationml/2006/main">
+  <p:cSld>
+    <p:spTree>
+      <p:nvGrpSpPr>
+        <p:cNvPr id="1" name=""/>
+        <p:cNvGrpSpPr/>
+        <p:nvPr/>
+      </p:nvGrpSpPr>
+      <p:grpSpPr>
+        <a:xfrm>
+          <a:off x="0" y="0"/>
+          <a:ext cx="0" cy="0"/>
+          <a:chOff x="0" y="0"/>
+          <a:chExt cx="0" cy="0"/>
+        </a:xfrm>
+      </p:grpSpPr>
+      <p:sp>
+        <p:nvSpPr>
+          <p:cNvPr id="2" name="제목 1"/>
+          <p:cNvSpPr>
+            <a:spLocks noGrp="1"/>
+          </p:cNvSpPr>
+          <p:nvPr>
+            <p:ph type="title"/>
+          </p:nvPr>
+        </p:nvSpPr>
+        <p:spPr>
+          <a:xfrm>
+            <a:off x="197117" y="2763371"/>
+            <a:ext cx="11876248" cy="1325563"/>
+          </a:xfrm>
+        </p:spPr>
+        <p:txBody>
+          <a:bodyPr/>
+          <a:lstStyle/>
+          <a:p>
+            <a:pPr algn="ctr"/>
+            <a:r>
+              <a:rPr lang="en-US" altLang="ko-KR" dirty="0" smtClean="0"/>
+              <a:t>Conventions</a:t>
+            </a:r>
+            <a:endParaRPr lang="ko-KR" altLang="en-US" dirty="0"/>
+          </a:p>
+        </p:txBody>
+      </p:sp>
+    </p:spTree>
+    <p:extLst>
+      <p:ext uri="{BB962C8B-B14F-4D97-AF65-F5344CB8AC3E}">
+        <p14:creationId xmlns:p14="http://schemas.microsoft.com/office/powerpoint/2010/main" val="2859998143"/>
+      </p:ext>
+    </p:extLst>
+  </p:cSld>
+  <p:clrMapOvr>
+    <a:masterClrMapping/>
+  </p:clrMapOvr>
+  <p:timing>
+    <p:tnLst>
+      <p:par>
+        <p:cTn id="1" dur="indefinite" restart="never" nodeType="tmRoot"/>
+      </p:par>
+    </p:tnLst>
+  </p:timing>
+</p:sld>
+</file>
+
+<file path=ppt/slides/slide20.xml><?xml version="1.0" encoding="utf-8"?>
+<p:sld xmlns:a="http://schemas.openxmlformats.org/drawingml/2006/main" xmlns:r="http://schemas.openxmlformats.org/officeDocument/2006/relationships" xmlns:p="http://schemas.openxmlformats.org/presentationml/2006/main">
+  <p:cSld>
+    <p:spTree>
+      <p:nvGrpSpPr>
+        <p:cNvPr id="1" name=""/>
+        <p:cNvGrpSpPr/>
+        <p:nvPr/>
+      </p:nvGrpSpPr>
+      <p:grpSpPr>
+        <a:xfrm>
+          <a:off x="0" y="0"/>
+          <a:ext cx="0" cy="0"/>
+          <a:chOff x="0" y="0"/>
+          <a:chExt cx="0" cy="0"/>
+        </a:xfrm>
+      </p:grpSpPr>
+      <p:sp>
+        <p:nvSpPr>
+          <p:cNvPr id="2" name="제목 1"/>
+          <p:cNvSpPr>
+            <a:spLocks noGrp="1"/>
+          </p:cNvSpPr>
+          <p:nvPr>
+            <p:ph type="title"/>
+          </p:nvPr>
+        </p:nvSpPr>
+        <p:spPr/>
+        <p:txBody>
+          <a:bodyPr/>
+          <a:lstStyle/>
+          <a:p>
+            <a:r>
+              <a:rPr lang="en-US" altLang="ko-KR" dirty="0" smtClean="0"/>
+              <a:t>Client Compute</a:t>
+            </a:r>
+            <a:endParaRPr lang="ko-KR" altLang="en-US" dirty="0"/>
+          </a:p>
+        </p:txBody>
+      </p:sp>
+      <p:sp>
+        <p:nvSpPr>
+          <p:cNvPr id="3" name="내용 개체 틀 2"/>
+          <p:cNvSpPr>
+            <a:spLocks noGrp="1"/>
+          </p:cNvSpPr>
+          <p:nvPr>
+            <p:ph idx="1"/>
+          </p:nvPr>
+        </p:nvSpPr>
+        <p:spPr/>
+        <p:txBody>
+          <a:bodyPr/>
+          <a:lstStyle/>
+          <a:p>
+            <a:r>
+              <a:rPr lang="en-US" altLang="ko-KR" dirty="0" smtClean="0"/>
+              <a:t>Listen and Partition/Sort concurrently</a:t>
+            </a:r>
+          </a:p>
+          <a:p>
+            <a:endParaRPr lang="en-US" altLang="ko-KR" dirty="0" smtClean="0"/>
+          </a:p>
+          <a:p>
+            <a:r>
+              <a:rPr lang="en-US" altLang="ko-KR" dirty="0" smtClean="0"/>
+              <a:t>Shuffle starts after Sort and Listen are completed </a:t>
+            </a:r>
+          </a:p>
+          <a:p>
+            <a:r>
+              <a:rPr lang="en-US" altLang="ko-KR" dirty="0" smtClean="0"/>
+              <a:t>Send starts after Sort is completed</a:t>
+            </a:r>
+          </a:p>
+          <a:p>
+            <a:endParaRPr lang="en-US" altLang="ko-KR" dirty="0"/>
+          </a:p>
+          <a:p>
+            <a:r>
+              <a:rPr lang="en-US" altLang="ko-KR" dirty="0" smtClean="0"/>
+              <a:t>Send </a:t>
+            </a:r>
+            <a:r>
+              <a:rPr lang="en-US" altLang="ko-KR" dirty="0" err="1" smtClean="0"/>
+              <a:t>DoneMsg</a:t>
+            </a:r>
+            <a:r>
+              <a:rPr lang="en-US" altLang="ko-KR" dirty="0" smtClean="0"/>
+              <a:t> after shuffling is finished</a:t>
+            </a:r>
+          </a:p>
+          <a:p>
+            <a:endParaRPr lang="ko-KR" altLang="en-US" dirty="0"/>
+          </a:p>
+        </p:txBody>
+      </p:sp>
+    </p:spTree>
+    <p:extLst>
+      <p:ext uri="{BB962C8B-B14F-4D97-AF65-F5344CB8AC3E}">
+        <p14:creationId xmlns:p14="http://schemas.microsoft.com/office/powerpoint/2010/main" val="608558083"/>
+      </p:ext>
+    </p:extLst>
+  </p:cSld>
+  <p:clrMapOvr>
+    <a:masterClrMapping/>
+  </p:clrMapOvr>
+</p:sld>
+</file>
+
+<file path=ppt/slides/slide21.xml><?xml version="1.0" encoding="utf-8"?>
+<p:sld xmlns:a="http://schemas.openxmlformats.org/drawingml/2006/main" xmlns:r="http://schemas.openxmlformats.org/officeDocument/2006/relationships" xmlns:p="http://schemas.openxmlformats.org/presentationml/2006/main">
+  <p:cSld>
+    <p:spTree>
+      <p:nvGrpSpPr>
+        <p:cNvPr id="1" name=""/>
+        <p:cNvGrpSpPr/>
+        <p:nvPr/>
+      </p:nvGrpSpPr>
+      <p:grpSpPr>
+        <a:xfrm>
+          <a:off x="0" y="0"/>
+          <a:ext cx="0" cy="0"/>
+          <a:chOff x="0" y="0"/>
+          <a:chExt cx="0" cy="0"/>
+        </a:xfrm>
+      </p:grpSpPr>
+      <p:sp>
+        <p:nvSpPr>
+          <p:cNvPr id="2" name="제목 1"/>
+          <p:cNvSpPr>
+            <a:spLocks noGrp="1"/>
+          </p:cNvSpPr>
+          <p:nvPr>
+            <p:ph type="title"/>
+          </p:nvPr>
+        </p:nvSpPr>
+        <p:spPr>
+          <a:xfrm>
+            <a:off x="6061323" y="343223"/>
+            <a:ext cx="5683516" cy="1325563"/>
+          </a:xfrm>
+        </p:spPr>
+        <p:txBody>
+          <a:bodyPr/>
+          <a:lstStyle/>
+          <a:p>
+            <a:r>
+              <a:rPr lang="en-US" altLang="ko-KR" dirty="0" smtClean="0"/>
+              <a:t>Slave </a:t>
+            </a:r>
+            <a:r>
+              <a:rPr lang="en-US" altLang="ko-KR" dirty="0" smtClean="0"/>
+              <a:t>Compute</a:t>
+            </a:r>
+            <a:r>
+              <a:rPr lang="en-US" altLang="ko-KR" dirty="0" smtClean="0"/>
+              <a:t> Order</a:t>
+            </a:r>
+            <a:endParaRPr lang="ko-KR" altLang="en-US" dirty="0"/>
+          </a:p>
+        </p:txBody>
+      </p:sp>
+      <p:sp>
+        <p:nvSpPr>
+          <p:cNvPr id="3" name="모서리가 둥근 직사각형 2"/>
+          <p:cNvSpPr/>
+          <p:nvPr/>
+        </p:nvSpPr>
+        <p:spPr>
+          <a:xfrm>
+            <a:off x="865121" y="2054962"/>
+            <a:ext cx="1653586" cy="832268"/>
+          </a:xfrm>
+          <a:prstGeom prst="roundRect">
+            <a:avLst/>
+          </a:prstGeom>
+        </p:spPr>
+        <p:style>
+          <a:lnRef idx="1">
+            <a:schemeClr val="accent1"/>
+          </a:lnRef>
+          <a:fillRef idx="2">
+            <a:schemeClr val="accent1"/>
+          </a:fillRef>
+          <a:effectRef idx="1">
+            <a:schemeClr val="accent1"/>
+          </a:effectRef>
+          <a:fontRef idx="minor">
+            <a:schemeClr val="dk1"/>
+          </a:fontRef>
+        </p:style>
+        <p:txBody>
+          <a:bodyPr rtlCol="0" anchor="ctr"/>
+          <a:lstStyle/>
+          <a:p>
+            <a:pPr algn="ctr"/>
+            <a:r>
+              <a:rPr lang="en-US" altLang="ko-KR" dirty="0" smtClean="0"/>
+              <a:t>Listen</a:t>
+            </a:r>
+            <a:endParaRPr lang="ko-KR" altLang="en-US" dirty="0"/>
+          </a:p>
+        </p:txBody>
+      </p:sp>
+      <p:sp>
+        <p:nvSpPr>
+          <p:cNvPr id="23" name="모서리가 둥근 직사각형 22"/>
+          <p:cNvSpPr/>
+          <p:nvPr/>
+        </p:nvSpPr>
+        <p:spPr>
+          <a:xfrm>
+            <a:off x="865121" y="4937943"/>
+            <a:ext cx="1653586" cy="832268"/>
+          </a:xfrm>
+          <a:prstGeom prst="roundRect">
+            <a:avLst/>
+          </a:prstGeom>
+        </p:spPr>
+        <p:style>
+          <a:lnRef idx="1">
+            <a:schemeClr val="accent1"/>
+          </a:lnRef>
+          <a:fillRef idx="2">
+            <a:schemeClr val="accent1"/>
+          </a:fillRef>
+          <a:effectRef idx="1">
+            <a:schemeClr val="accent1"/>
+          </a:effectRef>
+          <a:fontRef idx="minor">
+            <a:schemeClr val="dk1"/>
+          </a:fontRef>
+        </p:style>
+        <p:txBody>
+          <a:bodyPr rtlCol="0" anchor="ctr"/>
+          <a:lstStyle/>
+          <a:p>
+            <a:pPr algn="ctr"/>
+            <a:r>
+              <a:rPr lang="en-US" altLang="ko-KR" dirty="0" smtClean="0"/>
+              <a:t>Partition</a:t>
+            </a:r>
+            <a:endParaRPr lang="ko-KR" altLang="en-US" dirty="0"/>
+          </a:p>
+        </p:txBody>
+      </p:sp>
+      <p:sp>
+        <p:nvSpPr>
+          <p:cNvPr id="24" name="모서리가 둥근 직사각형 23"/>
+          <p:cNvSpPr/>
+          <p:nvPr/>
+        </p:nvSpPr>
+        <p:spPr>
+          <a:xfrm>
+            <a:off x="3475998" y="4937943"/>
+            <a:ext cx="1653586" cy="832268"/>
+          </a:xfrm>
+          <a:prstGeom prst="roundRect">
+            <a:avLst/>
+          </a:prstGeom>
+        </p:spPr>
+        <p:style>
+          <a:lnRef idx="1">
+            <a:schemeClr val="accent1"/>
+          </a:lnRef>
+          <a:fillRef idx="2">
+            <a:schemeClr val="accent1"/>
+          </a:fillRef>
+          <a:effectRef idx="1">
+            <a:schemeClr val="accent1"/>
+          </a:effectRef>
+          <a:fontRef idx="minor">
+            <a:schemeClr val="dk1"/>
+          </a:fontRef>
+        </p:style>
+        <p:txBody>
+          <a:bodyPr rtlCol="0" anchor="ctr"/>
+          <a:lstStyle/>
+          <a:p>
+            <a:pPr algn="ctr"/>
+            <a:r>
+              <a:rPr lang="en-US" altLang="ko-KR" dirty="0" smtClean="0"/>
+              <a:t>Sort</a:t>
+            </a:r>
+            <a:endParaRPr lang="ko-KR" altLang="en-US" dirty="0"/>
+          </a:p>
+        </p:txBody>
+      </p:sp>
+      <p:sp>
+        <p:nvSpPr>
+          <p:cNvPr id="25" name="모서리가 둥근 직사각형 24"/>
+          <p:cNvSpPr/>
+          <p:nvPr/>
+        </p:nvSpPr>
+        <p:spPr>
+          <a:xfrm>
+            <a:off x="6431829" y="4937943"/>
+            <a:ext cx="1653586" cy="832268"/>
+          </a:xfrm>
+          <a:prstGeom prst="roundRect">
+            <a:avLst/>
+          </a:prstGeom>
+        </p:spPr>
+        <p:style>
+          <a:lnRef idx="1">
+            <a:schemeClr val="accent1"/>
+          </a:lnRef>
+          <a:fillRef idx="2">
+            <a:schemeClr val="accent1"/>
+          </a:fillRef>
+          <a:effectRef idx="1">
+            <a:schemeClr val="accent1"/>
+          </a:effectRef>
+          <a:fontRef idx="minor">
+            <a:schemeClr val="dk1"/>
+          </a:fontRef>
+        </p:style>
+        <p:txBody>
+          <a:bodyPr rtlCol="0" anchor="ctr"/>
+          <a:lstStyle/>
+          <a:p>
+            <a:pPr algn="ctr"/>
+            <a:r>
+              <a:rPr lang="en-US" altLang="ko-KR" dirty="0" smtClean="0"/>
+              <a:t>Send</a:t>
+            </a:r>
+            <a:endParaRPr lang="ko-KR" altLang="en-US" dirty="0"/>
+          </a:p>
+        </p:txBody>
+      </p:sp>
+      <p:sp>
+        <p:nvSpPr>
+          <p:cNvPr id="26" name="모서리가 둥근 직사각형 25"/>
+          <p:cNvSpPr/>
+          <p:nvPr/>
+        </p:nvSpPr>
+        <p:spPr>
+          <a:xfrm>
+            <a:off x="6475633" y="2054962"/>
+            <a:ext cx="1653586" cy="832268"/>
+          </a:xfrm>
+          <a:prstGeom prst="roundRect">
+            <a:avLst/>
+          </a:prstGeom>
+        </p:spPr>
+        <p:style>
+          <a:lnRef idx="1">
+            <a:schemeClr val="accent1"/>
+          </a:lnRef>
+          <a:fillRef idx="2">
+            <a:schemeClr val="accent1"/>
+          </a:fillRef>
+          <a:effectRef idx="1">
+            <a:schemeClr val="accent1"/>
+          </a:effectRef>
+          <a:fontRef idx="minor">
+            <a:schemeClr val="dk1"/>
+          </a:fontRef>
+        </p:style>
+        <p:txBody>
+          <a:bodyPr rtlCol="0" anchor="ctr"/>
+          <a:lstStyle/>
+          <a:p>
+            <a:pPr algn="ctr"/>
+            <a:r>
+              <a:rPr lang="en-US" altLang="ko-KR" dirty="0" smtClean="0"/>
+              <a:t>Shuffle</a:t>
+            </a:r>
+            <a:endParaRPr lang="ko-KR" altLang="en-US" dirty="0"/>
+          </a:p>
+        </p:txBody>
+      </p:sp>
+      <p:cxnSp>
+        <p:nvCxnSpPr>
+          <p:cNvPr id="5" name="직선 화살표 연결선 4"/>
+          <p:cNvCxnSpPr>
+            <a:stCxn id="23" idx="3"/>
+            <a:endCxn id="24" idx="1"/>
+          </p:cNvCxnSpPr>
+          <p:nvPr/>
+        </p:nvCxnSpPr>
+        <p:spPr>
+          <a:xfrm>
+            <a:off x="2518707" y="5354077"/>
+            <a:ext cx="957291" cy="0"/>
+          </a:xfrm>
+          <a:prstGeom prst="straightConnector1">
+            <a:avLst/>
+          </a:prstGeom>
+          <a:ln>
+            <a:tailEnd type="triangle"/>
+          </a:ln>
+        </p:spPr>
+        <p:style>
+          <a:lnRef idx="1">
+            <a:schemeClr val="accent1"/>
+          </a:lnRef>
+          <a:fillRef idx="0">
+            <a:schemeClr val="accent1"/>
+          </a:fillRef>
+          <a:effectRef idx="0">
+            <a:schemeClr val="accent1"/>
+          </a:effectRef>
+          <a:fontRef idx="minor">
+            <a:schemeClr val="tx1"/>
+          </a:fontRef>
+        </p:style>
+      </p:cxnSp>
+      <p:cxnSp>
+        <p:nvCxnSpPr>
+          <p:cNvPr id="7" name="구부러진 연결선 6"/>
+          <p:cNvCxnSpPr>
+            <a:stCxn id="24" idx="3"/>
+            <a:endCxn id="25" idx="1"/>
+          </p:cNvCxnSpPr>
+          <p:nvPr/>
+        </p:nvCxnSpPr>
+        <p:spPr>
+          <a:xfrm>
+            <a:off x="5129584" y="5354077"/>
+            <a:ext cx="1302245" cy="12700"/>
+          </a:xfrm>
+          <a:prstGeom prst="curvedConnector3">
+            <a:avLst/>
+          </a:prstGeom>
+          <a:ln>
+            <a:tailEnd type="triangle"/>
+          </a:ln>
+        </p:spPr>
+        <p:style>
+          <a:lnRef idx="1">
+            <a:schemeClr val="accent1"/>
+          </a:lnRef>
+          <a:fillRef idx="0">
+            <a:schemeClr val="accent1"/>
+          </a:fillRef>
+          <a:effectRef idx="0">
+            <a:schemeClr val="accent1"/>
+          </a:effectRef>
+          <a:fontRef idx="minor">
+            <a:schemeClr val="tx1"/>
+          </a:fontRef>
+        </p:style>
+      </p:cxnSp>
+      <p:cxnSp>
+        <p:nvCxnSpPr>
+          <p:cNvPr id="31" name="구부러진 연결선 30"/>
+          <p:cNvCxnSpPr>
+            <a:stCxn id="24" idx="3"/>
+            <a:endCxn id="26" idx="1"/>
+          </p:cNvCxnSpPr>
+          <p:nvPr/>
+        </p:nvCxnSpPr>
+        <p:spPr>
+          <a:xfrm flipV="1">
+            <a:off x="5129584" y="2471096"/>
+            <a:ext cx="1346049" cy="2882981"/>
+          </a:xfrm>
+          <a:prstGeom prst="curvedConnector3">
+            <a:avLst/>
+          </a:prstGeom>
+          <a:ln>
+            <a:tailEnd type="triangle"/>
+          </a:ln>
+        </p:spPr>
+        <p:style>
+          <a:lnRef idx="1">
+            <a:schemeClr val="accent1"/>
+          </a:lnRef>
+          <a:fillRef idx="0">
+            <a:schemeClr val="accent1"/>
+          </a:fillRef>
+          <a:effectRef idx="0">
+            <a:schemeClr val="accent1"/>
+          </a:effectRef>
+          <a:fontRef idx="minor">
+            <a:schemeClr val="tx1"/>
+          </a:fontRef>
+        </p:style>
+      </p:cxnSp>
+      <p:cxnSp>
+        <p:nvCxnSpPr>
+          <p:cNvPr id="34" name="구부러진 연결선 33"/>
+          <p:cNvCxnSpPr>
+            <a:stCxn id="3" idx="3"/>
+            <a:endCxn id="26" idx="1"/>
+          </p:cNvCxnSpPr>
+          <p:nvPr/>
+        </p:nvCxnSpPr>
+        <p:spPr>
+          <a:xfrm>
+            <a:off x="2518707" y="2471096"/>
+            <a:ext cx="3956926" cy="12700"/>
+          </a:xfrm>
+          <a:prstGeom prst="curvedConnector3">
+            <a:avLst/>
+          </a:prstGeom>
+          <a:ln>
+            <a:tailEnd type="triangle"/>
+          </a:ln>
+        </p:spPr>
+        <p:style>
+          <a:lnRef idx="1">
+            <a:schemeClr val="accent1"/>
+          </a:lnRef>
+          <a:fillRef idx="0">
+            <a:schemeClr val="accent1"/>
+          </a:fillRef>
+          <a:effectRef idx="0">
+            <a:schemeClr val="accent1"/>
+          </a:effectRef>
+          <a:fontRef idx="minor">
+            <a:schemeClr val="tx1"/>
+          </a:fontRef>
+        </p:style>
+      </p:cxnSp>
+      <p:sp>
+        <p:nvSpPr>
+          <p:cNvPr id="41" name="모서리가 둥근 직사각형 40"/>
+          <p:cNvSpPr/>
+          <p:nvPr/>
+        </p:nvSpPr>
+        <p:spPr>
+          <a:xfrm>
+            <a:off x="9020804" y="2054962"/>
+            <a:ext cx="1653586" cy="832268"/>
+          </a:xfrm>
+          <a:prstGeom prst="roundRect">
+            <a:avLst/>
+          </a:prstGeom>
+        </p:spPr>
+        <p:style>
+          <a:lnRef idx="1">
+            <a:schemeClr val="accent1"/>
+          </a:lnRef>
+          <a:fillRef idx="2">
+            <a:schemeClr val="accent1"/>
+          </a:fillRef>
+          <a:effectRef idx="1">
+            <a:schemeClr val="accent1"/>
+          </a:effectRef>
+          <a:fontRef idx="minor">
+            <a:schemeClr val="dk1"/>
+          </a:fontRef>
+        </p:style>
+        <p:txBody>
+          <a:bodyPr rtlCol="0" anchor="ctr"/>
+          <a:lstStyle/>
+          <a:p>
+            <a:pPr algn="ctr"/>
+            <a:r>
+              <a:rPr lang="en-US" altLang="ko-KR" dirty="0" smtClean="0"/>
+              <a:t>Done</a:t>
+            </a:r>
+            <a:endParaRPr lang="ko-KR" altLang="en-US" dirty="0"/>
+          </a:p>
+        </p:txBody>
+      </p:sp>
+      <p:cxnSp>
+        <p:nvCxnSpPr>
+          <p:cNvPr id="17" name="구부러진 연결선 16"/>
+          <p:cNvCxnSpPr>
+            <a:stCxn id="26" idx="3"/>
+            <a:endCxn id="41" idx="1"/>
+          </p:cNvCxnSpPr>
+          <p:nvPr/>
+        </p:nvCxnSpPr>
+        <p:spPr>
+          <a:xfrm>
+            <a:off x="8129219" y="2471096"/>
+            <a:ext cx="891585" cy="12700"/>
+          </a:xfrm>
+          <a:prstGeom prst="curvedConnector3">
+            <a:avLst/>
+          </a:prstGeom>
+          <a:ln>
+            <a:tailEnd type="triangle"/>
+          </a:ln>
+        </p:spPr>
+        <p:style>
+          <a:lnRef idx="1">
+            <a:schemeClr val="accent1"/>
+          </a:lnRef>
+          <a:fillRef idx="0">
+            <a:schemeClr val="accent1"/>
+          </a:fillRef>
+          <a:effectRef idx="0">
+            <a:schemeClr val="accent1"/>
+          </a:effectRef>
+          <a:fontRef idx="minor">
+            <a:schemeClr val="tx1"/>
+          </a:fontRef>
+        </p:style>
+      </p:cxnSp>
+      <p:sp>
+        <p:nvSpPr>
+          <p:cNvPr id="53" name="모서리가 둥근 직사각형 52"/>
+          <p:cNvSpPr/>
+          <p:nvPr/>
+        </p:nvSpPr>
+        <p:spPr>
+          <a:xfrm>
+            <a:off x="9693372" y="3496452"/>
+            <a:ext cx="1653586" cy="832268"/>
+          </a:xfrm>
+          <a:prstGeom prst="roundRect">
+            <a:avLst/>
+          </a:prstGeom>
+        </p:spPr>
+        <p:style>
+          <a:lnRef idx="1">
+            <a:schemeClr val="accent1"/>
+          </a:lnRef>
+          <a:fillRef idx="2">
+            <a:schemeClr val="accent1"/>
+          </a:fillRef>
+          <a:effectRef idx="1">
+            <a:schemeClr val="accent1"/>
+          </a:effectRef>
+          <a:fontRef idx="minor">
+            <a:schemeClr val="dk1"/>
+          </a:fontRef>
+        </p:style>
+        <p:txBody>
+          <a:bodyPr rtlCol="0" anchor="ctr"/>
+          <a:lstStyle/>
+          <a:p>
+            <a:pPr algn="ctr"/>
+            <a:r>
+              <a:rPr lang="en-US" altLang="ko-KR" dirty="0" smtClean="0"/>
+              <a:t>Terminate</a:t>
+            </a:r>
+            <a:endParaRPr lang="ko-KR" altLang="en-US" dirty="0"/>
+          </a:p>
+        </p:txBody>
+      </p:sp>
+      <p:cxnSp>
+        <p:nvCxnSpPr>
+          <p:cNvPr id="33" name="구부러진 연결선 32"/>
+          <p:cNvCxnSpPr>
+            <a:stCxn id="41" idx="2"/>
+            <a:endCxn id="53" idx="0"/>
+          </p:cNvCxnSpPr>
+          <p:nvPr/>
+        </p:nvCxnSpPr>
+        <p:spPr>
+          <a:xfrm rot="16200000" flipH="1">
+            <a:off x="9879270" y="2855557"/>
+            <a:ext cx="609222" cy="672568"/>
+          </a:xfrm>
+          <a:prstGeom prst="curvedConnector3">
+            <a:avLst/>
+          </a:prstGeom>
+          <a:ln>
+            <a:tailEnd type="triangle"/>
+          </a:ln>
+        </p:spPr>
+        <p:style>
+          <a:lnRef idx="1">
+            <a:schemeClr val="accent1"/>
+          </a:lnRef>
+          <a:fillRef idx="0">
+            <a:schemeClr val="accent1"/>
+          </a:fillRef>
+          <a:effectRef idx="0">
+            <a:schemeClr val="accent1"/>
+          </a:effectRef>
+          <a:fontRef idx="minor">
+            <a:schemeClr val="tx1"/>
+          </a:fontRef>
+        </p:style>
+      </p:cxnSp>
+      <p:cxnSp>
+        <p:nvCxnSpPr>
+          <p:cNvPr id="44" name="구부러진 연결선 43"/>
+          <p:cNvCxnSpPr>
+            <a:stCxn id="25" idx="3"/>
+            <a:endCxn id="53" idx="2"/>
+          </p:cNvCxnSpPr>
+          <p:nvPr/>
+        </p:nvCxnSpPr>
+        <p:spPr>
+          <a:xfrm flipV="1">
+            <a:off x="8085415" y="4328720"/>
+            <a:ext cx="2434750" cy="1025357"/>
+          </a:xfrm>
+          <a:prstGeom prst="curvedConnector2">
+            <a:avLst/>
+          </a:prstGeom>
+          <a:ln>
+            <a:tailEnd type="triangle"/>
+          </a:ln>
+        </p:spPr>
+        <p:style>
+          <a:lnRef idx="1">
+            <a:schemeClr val="accent1"/>
+          </a:lnRef>
+          <a:fillRef idx="0">
+            <a:schemeClr val="accent1"/>
+          </a:fillRef>
+          <a:effectRef idx="0">
+            <a:schemeClr val="accent1"/>
+          </a:effectRef>
+          <a:fontRef idx="minor">
+            <a:schemeClr val="tx1"/>
+          </a:fontRef>
+        </p:style>
+      </p:cxnSp>
+    </p:spTree>
+    <p:extLst>
+      <p:ext uri="{BB962C8B-B14F-4D97-AF65-F5344CB8AC3E}">
+        <p14:creationId xmlns:p14="http://schemas.microsoft.com/office/powerpoint/2010/main" val="3038135300"/>
+      </p:ext>
+    </p:extLst>
+  </p:cSld>
+  <p:clrMapOvr>
+    <a:masterClrMapping/>
+  </p:clrMapOvr>
+  <p:timing>
+    <p:tnLst>
+      <p:par>
+        <p:cTn id="1" dur="indefinite" restart="never" nodeType="tmRoot"/>
+      </p:par>
+    </p:tnLst>
+  </p:timing>
+</p:sld>
+</file>
+
+<file path=ppt/slides/slide22.xml><?xml version="1.0" encoding="utf-8"?>
+<p:sld xmlns:a="http://schemas.openxmlformats.org/drawingml/2006/main" xmlns:r="http://schemas.openxmlformats.org/officeDocument/2006/relationships" xmlns:p="http://schemas.openxmlformats.org/presentationml/2006/main">
+  <p:cSld>
+    <p:spTree>
+      <p:nvGrpSpPr>
+        <p:cNvPr id="1" name=""/>
+        <p:cNvGrpSpPr/>
+        <p:nvPr/>
+      </p:nvGrpSpPr>
+      <p:grpSpPr>
+        <a:xfrm>
+          <a:off x="0" y="0"/>
+          <a:ext cx="0" cy="0"/>
+          <a:chOff x="0" y="0"/>
+          <a:chExt cx="0" cy="0"/>
+        </a:xfrm>
+      </p:grpSpPr>
+      <p:sp>
+        <p:nvSpPr>
+          <p:cNvPr id="2" name="제목 1"/>
+          <p:cNvSpPr>
+            <a:spLocks noGrp="1"/>
+          </p:cNvSpPr>
+          <p:nvPr>
+            <p:ph type="title"/>
+          </p:nvPr>
+        </p:nvSpPr>
+        <p:spPr>
+          <a:xfrm>
+            <a:off x="197117" y="2763371"/>
+            <a:ext cx="11876248" cy="1325563"/>
+          </a:xfrm>
+        </p:spPr>
+        <p:txBody>
+          <a:bodyPr/>
+          <a:lstStyle/>
+          <a:p>
+            <a:pPr algn="ctr"/>
+            <a:r>
+              <a:rPr lang="en-US" altLang="ko-KR" dirty="0" smtClean="0"/>
+              <a:t>Classes</a:t>
+            </a:r>
+            <a:endParaRPr lang="ko-KR" altLang="en-US" dirty="0"/>
+          </a:p>
+        </p:txBody>
+      </p:sp>
+    </p:spTree>
+    <p:extLst>
+      <p:ext uri="{BB962C8B-B14F-4D97-AF65-F5344CB8AC3E}">
+        <p14:creationId xmlns:p14="http://schemas.microsoft.com/office/powerpoint/2010/main" val="2521189219"/>
+      </p:ext>
+    </p:extLst>
+  </p:cSld>
+  <p:clrMapOvr>
+    <a:masterClrMapping/>
+  </p:clrMapOvr>
+  <p:timing>
+    <p:tnLst>
+      <p:par>
+        <p:cTn id="1" dur="indefinite" restart="never" nodeType="tmRoot"/>
+      </p:par>
+    </p:tnLst>
+  </p:timing>
+</p:sld>
+</file>
+
+<file path=ppt/slides/slide23.xml><?xml version="1.0" encoding="utf-8"?>
+<p:sld xmlns:a="http://schemas.openxmlformats.org/drawingml/2006/main" xmlns:r="http://schemas.openxmlformats.org/officeDocument/2006/relationships" xmlns:p="http://schemas.openxmlformats.org/presentationml/2006/main">
+  <p:cSld>
+    <p:spTree>
+      <p:nvGrpSpPr>
+        <p:cNvPr id="1" name=""/>
+        <p:cNvGrpSpPr/>
+        <p:nvPr/>
+      </p:nvGrpSpPr>
+      <p:grpSpPr>
+        <a:xfrm>
+          <a:off x="0" y="0"/>
+          <a:ext cx="0" cy="0"/>
+          <a:chOff x="0" y="0"/>
+          <a:chExt cx="0" cy="0"/>
+        </a:xfrm>
+      </p:grpSpPr>
+      <p:sp>
+        <p:nvSpPr>
+          <p:cNvPr id="2" name="제목 1"/>
+          <p:cNvSpPr>
+            <a:spLocks noGrp="1"/>
+          </p:cNvSpPr>
+          <p:nvPr>
+            <p:ph type="title"/>
+          </p:nvPr>
+        </p:nvSpPr>
+        <p:spPr/>
+        <p:txBody>
+          <a:bodyPr/>
+          <a:lstStyle/>
+          <a:p>
+            <a:r>
+              <a:rPr lang="en-US" altLang="ko-KR" dirty="0" smtClean="0"/>
+              <a:t>Messages</a:t>
+            </a:r>
+            <a:endParaRPr lang="ko-KR" altLang="en-US" dirty="0"/>
+          </a:p>
+        </p:txBody>
+      </p:sp>
+      <p:sp>
+        <p:nvSpPr>
+          <p:cNvPr id="3" name="내용 개체 틀 2"/>
+          <p:cNvSpPr>
+            <a:spLocks noGrp="1"/>
+          </p:cNvSpPr>
+          <p:nvPr>
+            <p:ph idx="1"/>
+          </p:nvPr>
+        </p:nvSpPr>
         <p:spPr>
           <a:xfrm>
             <a:off x="838200" y="1978024"/>
@@ -4398,7 +5998,6 @@
               <a:rPr lang="en-US" altLang="ko-KR" sz="1600" dirty="0" smtClean="0"/>
               <a:t>]</a:t>
             </a:r>
-            <a:endParaRPr lang="en-US" altLang="ko-KR" sz="1600" dirty="0" smtClean="0"/>
           </a:p>
           <a:p>
             <a:r>
@@ -4470,7 +6069,7 @@
         <p:spPr>
           <a:xfrm>
             <a:off x="5768385" y="1978024"/>
-            <a:ext cx="6096000" cy="4462760"/>
+            <a:ext cx="6096000" cy="4708981"/>
           </a:xfrm>
           <a:prstGeom prst="rect">
             <a:avLst/>
@@ -4491,8 +6090,8 @@
               <a:t>class </a:t>
             </a:r>
             <a:r>
-              <a:rPr lang="en-US" altLang="ko-KR" sz="2000" dirty="0" err="1" smtClean="0"/>
-              <a:t>SlaveInfo</a:t>
+              <a:rPr lang="en-US" altLang="ko-KR" sz="2000" dirty="0" smtClean="0"/>
+              <a:t>Slave</a:t>
             </a:r>
             <a:endParaRPr lang="en-US" altLang="ko-KR" sz="2000" dirty="0"/>
           </a:p>
@@ -4502,9 +6101,36 @@
               <a:buChar char="-"/>
             </a:pPr>
             <a:r>
+              <a:rPr lang="en-US" altLang="ko-KR" sz="1600" dirty="0" err="1"/>
+              <a:t>i</a:t>
+            </a:r>
+            <a:r>
+              <a:rPr lang="en-US" altLang="ko-KR" sz="1600" dirty="0" err="1" smtClean="0"/>
+              <a:t>p</a:t>
+            </a:r>
+            <a:r>
               <a:rPr lang="en-US" altLang="ko-KR" sz="1600" dirty="0" smtClean="0"/>
-              <a:t>socket: Socket</a:t>
-            </a:r>
+              <a:t>: String</a:t>
+            </a:r>
+          </a:p>
+          <a:p>
+            <a:pPr marL="742950" lvl="1" indent="-285750">
+              <a:buFontTx/>
+              <a:buChar char="-"/>
+            </a:pPr>
+            <a:r>
+              <a:rPr lang="en-US" altLang="ko-KR" sz="1600" dirty="0"/>
+              <a:t>p</a:t>
+            </a:r>
+            <a:r>
+              <a:rPr lang="en-US" altLang="ko-KR" sz="1600" dirty="0" smtClean="0"/>
+              <a:t>ort: </a:t>
+            </a:r>
+            <a:r>
+              <a:rPr lang="en-US" altLang="ko-KR" sz="1600" dirty="0" err="1" smtClean="0"/>
+              <a:t>Int</a:t>
+            </a:r>
+            <a:endParaRPr lang="en-US" altLang="ko-KR" sz="1600" dirty="0" smtClean="0"/>
           </a:p>
           <a:p>
             <a:pPr marL="742950" lvl="1" indent="-285750">
@@ -4622,16 +6248,9 @@
             </a:r>
             <a:r>
               <a:rPr lang="en-US" altLang="ko-KR" sz="1600" dirty="0" smtClean="0"/>
-              <a:t>Vector[</a:t>
-            </a:r>
-            <a:r>
-              <a:rPr lang="en-US" altLang="ko-KR" sz="1600" dirty="0" err="1" smtClean="0"/>
-              <a:t>SlaveInfo</a:t>
-            </a:r>
-            <a:r>
-              <a:rPr lang="en-US" altLang="ko-KR" sz="1600" dirty="0" smtClean="0"/>
-              <a:t>]</a:t>
-            </a:r>
+              <a:t>Vector[Slave]</a:t>
+            </a:r>
+            <a:endParaRPr lang="en-US" altLang="ko-KR" sz="1600" dirty="0" smtClean="0"/>
           </a:p>
           <a:p>
             <a:pPr marL="742950" lvl="1" indent="-285750">
@@ -4692,11 +6311,7 @@
             </a:r>
             <a:r>
               <a:rPr lang="en-US" altLang="ko-KR" sz="1600" dirty="0" smtClean="0"/>
-              <a:t>]</a:t>
-            </a:r>
-            <a:r>
-              <a:rPr lang="en-US" altLang="ko-KR" sz="1600" dirty="0" smtClean="0"/>
-              <a:t>): </a:t>
+              <a:t>]): </a:t>
             </a:r>
             <a:r>
               <a:rPr lang="en-US" altLang="ko-KR" sz="1600" dirty="0" err="1" smtClean="0"/>
@@ -4711,15 +6326,11 @@
             </a:pPr>
             <a:r>
               <a:rPr lang="en-US" altLang="ko-KR" sz="1600" dirty="0" smtClean="0"/>
-              <a:t>apply(Vector[</a:t>
-            </a:r>
-            <a:r>
-              <a:rPr lang="en-US" altLang="ko-KR" sz="1600" dirty="0" err="1" smtClean="0"/>
-              <a:t>SlaveInfo</a:t>
+              <a:t>apply(Vector[Slave], </a:t>
             </a:r>
             <a:r>
               <a:rPr lang="en-US" altLang="ko-KR" sz="1600" dirty="0" smtClean="0"/>
-              <a:t>], Vector[</a:t>
+              <a:t>Vector[</a:t>
             </a:r>
             <a:r>
               <a:rPr lang="en-US" altLang="ko-KR" sz="1600" dirty="0" err="1" smtClean="0"/>
@@ -5005,7 +6616,7 @@
 </p:sld>
 </file>
 
-<file path=ppt/slides/slide13.xml><?xml version="1.0" encoding="utf-8"?>
+<file path=ppt/slides/slide24.xml><?xml version="1.0" encoding="utf-8"?>
 <p:sld xmlns:a="http://schemas.openxmlformats.org/drawingml/2006/main" xmlns:r="http://schemas.openxmlformats.org/officeDocument/2006/relationships" xmlns:p="http://schemas.openxmlformats.org/presentationml/2006/main">
   <p:cSld>
     <p:spTree>
@@ -5076,11 +6687,7 @@
             </a:r>
             <a:r>
               <a:rPr lang="en-US" altLang="ko-KR" sz="2000" dirty="0" err="1" smtClean="0"/>
-              <a:t>Sample</a:t>
-            </a:r>
-            <a:r>
-              <a:rPr lang="en-US" altLang="ko-KR" sz="2000" dirty="0" err="1" smtClean="0"/>
-              <a:t>Message</a:t>
+              <a:t>SampleMessage</a:t>
             </a:r>
             <a:endParaRPr lang="en-US" altLang="ko-KR" sz="2000" dirty="0" smtClean="0"/>
           </a:p>
@@ -5120,7 +6727,6 @@
               <a:rPr lang="en-US" altLang="ko-KR" sz="1600" dirty="0"/>
               <a:t>Array[byte]</a:t>
             </a:r>
-            <a:endParaRPr lang="en-US" altLang="ko-KR" sz="1600" dirty="0"/>
           </a:p>
           <a:p>
             <a:pPr marL="742950" lvl="1" indent="-285750">
@@ -5140,11 +6746,7 @@
             </a:r>
             <a:r>
               <a:rPr lang="en-US" altLang="ko-KR" sz="2000" dirty="0" err="1" smtClean="0"/>
-              <a:t>Sample</a:t>
-            </a:r>
-            <a:r>
-              <a:rPr lang="en-US" altLang="ko-KR" sz="2000" dirty="0" err="1" smtClean="0"/>
-              <a:t>Message</a:t>
+              <a:t>SampleMessage</a:t>
             </a:r>
             <a:endParaRPr lang="en-US" altLang="ko-KR" sz="2000" dirty="0"/>
           </a:p>
@@ -5163,11 +6765,7 @@
             </a:r>
             <a:r>
               <a:rPr lang="en-US" altLang="ko-KR" sz="1600" dirty="0" err="1" smtClean="0"/>
-              <a:t>Sample</a:t>
-            </a:r>
-            <a:r>
-              <a:rPr lang="en-US" altLang="ko-KR" sz="1600" dirty="0" err="1" smtClean="0"/>
-              <a:t>Message</a:t>
+              <a:t>SampleMessage</a:t>
             </a:r>
             <a:endParaRPr lang="en-US" altLang="ko-KR" sz="1600" dirty="0" smtClean="0"/>
           </a:p>
@@ -5194,11 +6792,7 @@
             </a:r>
             <a:r>
               <a:rPr lang="en-US" altLang="ko-KR" sz="1600" dirty="0" err="1" smtClean="0"/>
-              <a:t>Sample</a:t>
-            </a:r>
-            <a:r>
-              <a:rPr lang="en-US" altLang="ko-KR" sz="1600" dirty="0" err="1" smtClean="0"/>
-              <a:t>Message</a:t>
+              <a:t>SampleMessage</a:t>
             </a:r>
             <a:endParaRPr lang="en-US" altLang="ko-KR" sz="1600" dirty="0" smtClean="0"/>
           </a:p>
@@ -5452,11 +7046,7 @@
             </a:pPr>
             <a:r>
               <a:rPr lang="en-US" altLang="ko-KR" sz="1600" dirty="0" smtClean="0"/>
-              <a:t>size</a:t>
-            </a:r>
-            <a:r>
-              <a:rPr lang="en-US" altLang="ko-KR" sz="1600" dirty="0" smtClean="0"/>
-              <a:t>: Vector[</a:t>
+              <a:t>size: Vector[</a:t>
             </a:r>
             <a:r>
               <a:rPr lang="en-US" altLang="ko-KR" sz="1600" dirty="0" err="1" smtClean="0"/>
@@ -5512,11 +7102,7 @@
             </a:pPr>
             <a:r>
               <a:rPr lang="en-US" altLang="ko-KR" sz="1600" dirty="0" smtClean="0"/>
-              <a:t>a</a:t>
-            </a:r>
-            <a:r>
-              <a:rPr lang="en-US" altLang="ko-KR" sz="1600" dirty="0" smtClean="0"/>
-              <a:t>pply(Vector[</a:t>
+              <a:t>apply(Vector[</a:t>
             </a:r>
             <a:r>
               <a:rPr lang="en-US" altLang="ko-KR" sz="1600" dirty="0" err="1" smtClean="0"/>
@@ -5690,11 +7276,7 @@
             </a:pPr>
             <a:r>
               <a:rPr lang="en-US" altLang="ko-KR" sz="1600" dirty="0" smtClean="0"/>
-              <a:t>a</a:t>
-            </a:r>
-            <a:r>
-              <a:rPr lang="en-US" altLang="ko-KR" sz="1600" dirty="0" smtClean="0"/>
-              <a:t>pply(</a:t>
+              <a:t>apply(</a:t>
             </a:r>
             <a:r>
               <a:rPr lang="en-US" altLang="ko-KR" sz="1600" dirty="0" err="1" smtClean="0"/>
@@ -5759,7 +7341,7 @@
 </p:sld>
 </file>
 
-<file path=ppt/slides/slide14.xml><?xml version="1.0" encoding="utf-8"?>
+<file path=ppt/slides/slide25.xml><?xml version="1.0" encoding="utf-8"?>
 <p:sld xmlns:a="http://schemas.openxmlformats.org/drawingml/2006/main" xmlns:r="http://schemas.openxmlformats.org/officeDocument/2006/relationships" xmlns:p="http://schemas.openxmlformats.org/presentationml/2006/main">
   <p:cSld>
     <p:spTree>
@@ -5849,29 +7431,22 @@
               <a:buChar char="-"/>
             </a:pPr>
             <a:r>
+              <a:rPr lang="en-US" altLang="ko-KR" sz="1600" dirty="0" err="1"/>
+              <a:t>v</a:t>
+            </a:r>
+            <a:r>
               <a:rPr lang="en-US" altLang="ko-KR" sz="1600" dirty="0" err="1" smtClean="0"/>
-              <a:t>var</a:t>
+              <a:t>ar</a:t>
             </a:r>
             <a:r>
               <a:rPr lang="en-US" altLang="ko-KR" sz="1600" dirty="0" smtClean="0"/>
-              <a:t> </a:t>
+              <a:t> socket: </a:t>
             </a:r>
             <a:r>
               <a:rPr lang="en-US" altLang="ko-KR" sz="1600" dirty="0" err="1" smtClean="0"/>
-              <a:t>slaveInfoList</a:t>
-            </a:r>
-            <a:r>
-              <a:rPr lang="en-US" altLang="ko-KR" sz="1600" dirty="0" smtClean="0"/>
-              <a:t>: List[</a:t>
-            </a:r>
-            <a:r>
-              <a:rPr lang="en-US" altLang="ko-KR" sz="1600" dirty="0" err="1" smtClean="0"/>
-              <a:t>SlaveInfo</a:t>
-            </a:r>
-            <a:r>
-              <a:rPr lang="en-US" altLang="ko-KR" sz="1600" dirty="0" smtClean="0"/>
-              <a:t>]</a:t>
-            </a:r>
+              <a:t>ServerSocket</a:t>
+            </a:r>
+            <a:endParaRPr lang="en-US" altLang="ko-KR" sz="1600" dirty="0" smtClean="0"/>
           </a:p>
           <a:p>
             <a:pPr lvl="1">
@@ -5880,6 +7455,59 @@
             </a:pPr>
             <a:r>
               <a:rPr lang="en-US" altLang="ko-KR" sz="1600" dirty="0" err="1" smtClean="0"/>
+              <a:t>var</a:t>
+            </a:r>
+            <a:r>
+              <a:rPr lang="en-US" altLang="ko-KR" sz="1600" dirty="0" smtClean="0"/>
+              <a:t> </a:t>
+            </a:r>
+            <a:r>
+              <a:rPr lang="en-US" altLang="ko-KR" sz="1600" dirty="0" err="1" smtClean="0"/>
+              <a:t>slaveList</a:t>
+            </a:r>
+            <a:r>
+              <a:rPr lang="en-US" altLang="ko-KR" sz="1600" dirty="0" smtClean="0"/>
+              <a:t>: </a:t>
+            </a:r>
+            <a:r>
+              <a:rPr lang="en-US" altLang="ko-KR" sz="1600" dirty="0" smtClean="0"/>
+              <a:t>List[Slave]</a:t>
+            </a:r>
+            <a:endParaRPr lang="en-US" altLang="ko-KR" sz="1600" dirty="0" smtClean="0"/>
+          </a:p>
+          <a:p>
+            <a:pPr lvl="1">
+              <a:buFontTx/>
+              <a:buChar char="-"/>
+            </a:pPr>
+            <a:r>
+              <a:rPr lang="en-US" altLang="ko-KR" sz="1600" dirty="0" err="1"/>
+              <a:t>v</a:t>
+            </a:r>
+            <a:r>
+              <a:rPr lang="en-US" altLang="ko-KR" sz="1600" dirty="0" err="1" smtClean="0"/>
+              <a:t>ar</a:t>
+            </a:r>
+            <a:r>
+              <a:rPr lang="en-US" altLang="ko-KR" sz="1600" dirty="0" smtClean="0"/>
+              <a:t> </a:t>
+            </a:r>
+            <a:r>
+              <a:rPr lang="en-US" altLang="ko-KR" sz="1600" dirty="0" err="1" smtClean="0"/>
+              <a:t>slaveSocketMap</a:t>
+            </a:r>
+            <a:r>
+              <a:rPr lang="en-US" altLang="ko-KR" sz="1600" dirty="0" smtClean="0"/>
+              <a:t>: Map[Slave, Socket]</a:t>
+            </a:r>
+          </a:p>
+          <a:p>
+            <a:pPr lvl="1">
+              <a:buFontTx/>
+              <a:buChar char="-"/>
+            </a:pPr>
+            <a:r>
+              <a:rPr lang="en-US" altLang="ko-KR" sz="1600" dirty="0" err="1" smtClean="0"/>
               <a:t>numSlave</a:t>
             </a:r>
             <a:r>
@@ -5911,9 +7539,10 @@
               <a:t>Init</a:t>
             </a:r>
             <a:r>
-              <a:rPr lang="en-US" altLang="ko-KR" sz="1600" dirty="0"/>
+              <a:rPr lang="en-US" altLang="ko-KR" sz="1600" dirty="0" smtClean="0"/>
               <a:t>)</a:t>
             </a:r>
+            <a:endParaRPr lang="en-US" altLang="ko-KR" sz="1600" dirty="0"/>
           </a:p>
           <a:p>
             <a:pPr lvl="1">
@@ -5922,7 +7551,7 @@
             </a:pPr>
             <a:r>
               <a:rPr lang="en-US" altLang="ko-KR" sz="1600" dirty="0" err="1" smtClean="0"/>
-              <a:t>init</a:t>
+              <a:t>initServerSocket</a:t>
             </a:r>
             <a:r>
               <a:rPr lang="en-US" altLang="ko-KR" sz="1600" dirty="0" smtClean="0"/>
@@ -5936,6 +7565,43 @@
             </a:pPr>
             <a:r>
               <a:rPr lang="en-US" altLang="ko-KR" sz="1600" dirty="0" err="1" smtClean="0"/>
+              <a:t>acceptConnections</a:t>
+            </a:r>
+            <a:r>
+              <a:rPr lang="en-US" altLang="ko-KR" sz="1600" dirty="0" smtClean="0"/>
+              <a:t>(</a:t>
+            </a:r>
+            <a:r>
+              <a:rPr lang="en-US" altLang="ko-KR" sz="1600" dirty="0" err="1" smtClean="0"/>
+              <a:t>Int</a:t>
+            </a:r>
+            <a:r>
+              <a:rPr lang="en-US" altLang="ko-KR" sz="1600" dirty="0" smtClean="0"/>
+              <a:t>): List[Future[List[Key]]]</a:t>
+            </a:r>
+          </a:p>
+          <a:p>
+            <a:pPr lvl="1">
+              <a:buFontTx/>
+              <a:buChar char="-"/>
+            </a:pPr>
+            <a:r>
+              <a:rPr lang="en-US" altLang="ko-KR" sz="1600" dirty="0" err="1" smtClean="0"/>
+              <a:t>connectionFuture</a:t>
+            </a:r>
+            <a:r>
+              <a:rPr lang="en-US" altLang="ko-KR" sz="1600" dirty="0" smtClean="0"/>
+              <a:t>(Socket): Future[Socket]</a:t>
+            </a:r>
+            <a:endParaRPr lang="en-US" altLang="ko-KR" sz="1600" dirty="0" smtClean="0"/>
+          </a:p>
+          <a:p>
+            <a:pPr lvl="1">
+              <a:buFontTx/>
+              <a:buChar char="-"/>
+            </a:pPr>
+            <a:r>
+              <a:rPr lang="en-US" altLang="ko-KR" sz="1600" dirty="0" err="1" smtClean="0"/>
               <a:t>samplingFuture</a:t>
             </a:r>
             <a:r>
@@ -5951,14 +7617,36 @@
             <a:endParaRPr lang="en-US" altLang="ko-KR" sz="1600" dirty="0" smtClean="0"/>
           </a:p>
           <a:p>
-            <a:pPr marL="457200" lvl="1" indent="0">
-              <a:buNone/>
-            </a:pPr>
-            <a:r>
-              <a:rPr lang="en-US" altLang="ko-KR" sz="1600" dirty="0" smtClean="0"/>
+            <a:endParaRPr lang="ko-KR" altLang="en-US" dirty="0"/>
+          </a:p>
+        </p:txBody>
+      </p:sp>
+      <p:sp>
+        <p:nvSpPr>
+          <p:cNvPr id="4" name="직사각형 3"/>
+          <p:cNvSpPr/>
+          <p:nvPr/>
+        </p:nvSpPr>
+        <p:spPr>
+          <a:xfrm>
+            <a:off x="6209159" y="735518"/>
+            <a:ext cx="6096000" cy="4770537"/>
+          </a:xfrm>
+          <a:prstGeom prst="rect">
+            <a:avLst/>
+          </a:prstGeom>
+        </p:spPr>
+        <p:txBody>
+          <a:bodyPr>
+            <a:spAutoFit/>
+          </a:bodyPr>
+          <a:lstStyle/>
+          <a:p>
+            <a:pPr lvl="1"/>
+            <a:r>
+              <a:rPr lang="en-US" altLang="ko-KR" sz="1600" dirty="0"/>
               <a:t>(Connect)</a:t>
             </a:r>
-            <a:endParaRPr lang="en-US" altLang="ko-KR" sz="1600" dirty="0"/>
           </a:p>
           <a:p>
             <a:pPr lvl="1">
@@ -5966,20 +7654,20 @@
               <a:buChar char="-"/>
             </a:pPr>
             <a:r>
+              <a:rPr lang="en-US" altLang="ko-KR" sz="1600" dirty="0" smtClean="0"/>
+              <a:t> </a:t>
+            </a:r>
+            <a:r>
               <a:rPr lang="en-US" altLang="ko-KR" sz="1600" dirty="0" err="1" smtClean="0"/>
               <a:t>recvConnectionMsg</a:t>
             </a:r>
             <a:r>
               <a:rPr lang="en-US" altLang="ko-KR" sz="1600" dirty="0" smtClean="0"/>
-              <a:t>(Socket): Future[</a:t>
-            </a:r>
-            <a:r>
-              <a:rPr lang="en-US" altLang="ko-KR" sz="1600" dirty="0" err="1" smtClean="0"/>
-              <a:t>SlaveInfo</a:t>
-            </a:r>
-            <a:r>
-              <a:rPr lang="en-US" altLang="ko-KR" sz="1600" dirty="0" smtClean="0"/>
-              <a:t>]</a:t>
+              <a:t>(Socket</a:t>
+            </a:r>
+            <a:r>
+              <a:rPr lang="en-US" altLang="ko-KR" sz="1600" dirty="0"/>
+              <a:t>): Future[Slave]</a:t>
             </a:r>
           </a:p>
           <a:p>
@@ -5988,60 +7676,40 @@
               <a:buChar char="-"/>
             </a:pPr>
             <a:r>
+              <a:rPr lang="en-US" altLang="ko-KR" sz="1600" dirty="0" smtClean="0"/>
+              <a:t> </a:t>
+            </a:r>
+            <a:r>
               <a:rPr lang="en-US" altLang="ko-KR" sz="1600" dirty="0" err="1" smtClean="0"/>
-              <a:t>addSlaveInfo</a:t>
+              <a:t>updateSlaveInfo</a:t>
             </a:r>
             <a:r>
               <a:rPr lang="en-US" altLang="ko-KR" sz="1600" dirty="0" smtClean="0"/>
-              <a:t>(Socket, </a:t>
-            </a:r>
-            <a:r>
-              <a:rPr lang="en-US" altLang="ko-KR" sz="1600" dirty="0" err="1" smtClean="0"/>
-              <a:t>Int</a:t>
+              <a:t>(Socket</a:t>
+            </a:r>
+            <a:r>
+              <a:rPr lang="en-US" altLang="ko-KR" sz="1600" dirty="0"/>
+              <a:t>, Slave): </a:t>
             </a:r>
             <a:r>
               <a:rPr lang="en-US" altLang="ko-KR" sz="1600" dirty="0" smtClean="0"/>
-              <a:t>): Unit</a:t>
-            </a:r>
+              <a:t>Unit</a:t>
+            </a:r>
+            <a:endParaRPr lang="en-US" altLang="ko-KR" sz="1600" dirty="0" smtClean="0"/>
+          </a:p>
+          <a:p>
+            <a:pPr lvl="1"/>
             <a:endParaRPr lang="en-US" altLang="ko-KR" sz="1600" dirty="0"/>
           </a:p>
           <a:p>
-            <a:pPr lvl="1">
-              <a:buFontTx/>
-              <a:buChar char="-"/>
-            </a:pPr>
-            <a:endParaRPr lang="en-US" altLang="ko-KR" sz="1600" dirty="0" smtClean="0"/>
-          </a:p>
-          <a:p>
-            <a:endParaRPr lang="ko-KR" altLang="en-US" dirty="0"/>
-          </a:p>
-        </p:txBody>
-      </p:sp>
-      <p:sp>
-        <p:nvSpPr>
-          <p:cNvPr id="4" name="직사각형 3"/>
-          <p:cNvSpPr/>
-          <p:nvPr/>
-        </p:nvSpPr>
-        <p:spPr>
-          <a:xfrm>
-            <a:off x="6209159" y="735518"/>
-            <a:ext cx="6096000" cy="2800767"/>
-          </a:xfrm>
-          <a:prstGeom prst="rect">
-            <a:avLst/>
-          </a:prstGeom>
-        </p:spPr>
-        <p:txBody>
-          <a:bodyPr>
-            <a:spAutoFit/>
-          </a:bodyPr>
-          <a:lstStyle/>
-          <a:p>
             <a:pPr lvl="1"/>
             <a:r>
               <a:rPr lang="en-US" altLang="ko-KR" sz="1600" dirty="0" smtClean="0"/>
-              <a:t>(Sample)</a:t>
+              <a:t>(</a:t>
+            </a:r>
+            <a:r>
+              <a:rPr lang="en-US" altLang="ko-KR" sz="1600" dirty="0" smtClean="0"/>
+              <a:t>Sample)</a:t>
             </a:r>
           </a:p>
           <a:p>
@@ -6100,6 +7768,22 @@
             </a:r>
             <a:r>
               <a:rPr lang="en-US" altLang="ko-KR" sz="1600" dirty="0" err="1" smtClean="0"/>
+              <a:t>waitSamples</a:t>
+            </a:r>
+            <a:r>
+              <a:rPr lang="en-US" altLang="ko-KR" sz="1600" dirty="0" smtClean="0"/>
+              <a:t>(List[Future[List[Key]]]): List[Key]</a:t>
+            </a:r>
+            <a:endParaRPr lang="en-US" altLang="ko-KR" sz="1600" dirty="0" smtClean="0"/>
+          </a:p>
+          <a:p>
+            <a:pPr lvl="1"/>
+            <a:r>
+              <a:rPr lang="en-US" altLang="ko-KR" sz="1600" dirty="0" smtClean="0"/>
+              <a:t>- </a:t>
+            </a:r>
+            <a:r>
+              <a:rPr lang="en-US" altLang="ko-KR" sz="1600" dirty="0" err="1" smtClean="0"/>
               <a:t>calcPivots</a:t>
             </a:r>
             <a:r>
@@ -6118,7 +7802,7 @@
             </a:r>
             <a:r>
               <a:rPr lang="en-US" altLang="ko-KR" sz="1600" dirty="0" err="1" smtClean="0"/>
-              <a:t>makeEvalFuture</a:t>
+              <a:t>makeComputeFuture</a:t>
             </a:r>
             <a:r>
               <a:rPr lang="en-US" altLang="ko-KR" sz="1600" dirty="0" smtClean="0"/>
@@ -6139,13 +7823,14 @@
               <a:t>(</a:t>
             </a:r>
             <a:r>
-              <a:rPr lang="en-US" altLang="ko-KR" sz="1600" dirty="0" err="1" smtClean="0"/>
-              <a:t>Eval</a:t>
+              <a:rPr lang="en-US" altLang="ko-KR" sz="1600" dirty="0" smtClean="0"/>
+              <a:t>Compute</a:t>
             </a:r>
             <a:r>
               <a:rPr lang="en-US" altLang="ko-KR" sz="1600" dirty="0" smtClean="0"/>
               <a:t>)</a:t>
             </a:r>
+            <a:endParaRPr lang="en-US" altLang="ko-KR" sz="1600" dirty="0" smtClean="0"/>
           </a:p>
           <a:p>
             <a:pPr lvl="1"/>
@@ -6166,20 +7851,53 @@
           <a:p>
             <a:pPr lvl="1"/>
             <a:r>
+              <a:rPr lang="en-US" altLang="ko-KR" sz="1600" dirty="0" smtClean="0"/>
+              <a:t>- </a:t>
+            </a:r>
+            <a:r>
+              <a:rPr lang="en-US" altLang="ko-KR" sz="1600" dirty="0" err="1" smtClean="0"/>
+              <a:t>waitDoneMessage</a:t>
+            </a:r>
+            <a:r>
+              <a:rPr lang="en-US" altLang="ko-KR" sz="1600" dirty="0" smtClean="0"/>
+              <a:t>(): </a:t>
+            </a:r>
+            <a:r>
               <a:rPr lang="en-US" altLang="ko-KR" sz="1600" dirty="0"/>
-              <a:t>- </a:t>
-            </a:r>
-            <a:r>
-              <a:rPr lang="en-US" altLang="ko-KR" sz="1600" dirty="0" err="1"/>
-              <a:t>waitDoneMessage</a:t>
-            </a:r>
-            <a:r>
-              <a:rPr lang="en-US" altLang="ko-KR" sz="1600" dirty="0"/>
-              <a:t>(List[Key): Future[Unit</a:t>
+              <a:t>Future[Unit</a:t>
             </a:r>
             <a:r>
               <a:rPr lang="en-US" altLang="ko-KR" sz="1600" dirty="0" smtClean="0"/>
               <a:t>]</a:t>
+            </a:r>
+          </a:p>
+          <a:p>
+            <a:pPr marL="742950" lvl="1" indent="-285750">
+              <a:buFontTx/>
+              <a:buChar char="-"/>
+            </a:pPr>
+            <a:endParaRPr lang="en-US" altLang="ko-KR" sz="1600" dirty="0"/>
+          </a:p>
+          <a:p>
+            <a:pPr lvl="1"/>
+            <a:r>
+              <a:rPr lang="en-US" altLang="ko-KR" sz="1600" dirty="0" smtClean="0"/>
+              <a:t>(Success)</a:t>
+            </a:r>
+          </a:p>
+          <a:p>
+            <a:pPr lvl="1"/>
+            <a:r>
+              <a:rPr lang="en-US" altLang="ko-KR" sz="1600" dirty="0" smtClean="0"/>
+              <a:t>- </a:t>
+            </a:r>
+            <a:r>
+              <a:rPr lang="en-US" altLang="ko-KR" sz="1600" dirty="0" err="1" smtClean="0"/>
+              <a:t>closeAllSocket</a:t>
+            </a:r>
+            <a:r>
+              <a:rPr lang="en-US" altLang="ko-KR" sz="1600" dirty="0" smtClean="0"/>
+              <a:t>(): Unit</a:t>
             </a:r>
             <a:endParaRPr lang="en-US" altLang="ko-KR" sz="1600" dirty="0"/>
           </a:p>
@@ -6209,7 +7927,7 @@
 </p:sld>
 </file>
 
-<file path=ppt/slides/slide15.xml><?xml version="1.0" encoding="utf-8"?>
+<file path=ppt/slides/slide26.xml><?xml version="1.0" encoding="utf-8"?>
 <p:sld xmlns:a="http://schemas.openxmlformats.org/drawingml/2006/main" xmlns:r="http://schemas.openxmlformats.org/officeDocument/2006/relationships" xmlns:p="http://schemas.openxmlformats.org/presentationml/2006/main">
   <p:cSld>
     <p:spTree>
@@ -6261,18 +7979,25 @@
         </p:nvSpPr>
         <p:spPr>
           <a:xfrm>
-            <a:off x="838200" y="1978024"/>
-            <a:ext cx="4856267" cy="4755865"/>
-          </a:xfrm>
-        </p:spPr>
-        <p:txBody>
-          <a:bodyPr/>
+            <a:off x="838199" y="1978024"/>
+            <a:ext cx="5650207" cy="4755865"/>
+          </a:xfrm>
+        </p:spPr>
+        <p:txBody>
+          <a:bodyPr>
+            <a:normAutofit/>
+          </a:bodyPr>
           <a:lstStyle/>
           <a:p>
             <a:r>
               <a:rPr lang="en-US" altLang="ko-KR" sz="2000" dirty="0"/>
-              <a:t>class Slave:</a:t>
-            </a:r>
+              <a:t>class Slave</a:t>
+            </a:r>
+            <a:r>
+              <a:rPr lang="en-US" altLang="ko-KR" sz="2000" dirty="0" smtClean="0"/>
+              <a:t>:</a:t>
+            </a:r>
+            <a:endParaRPr lang="en-US" altLang="ko-KR" sz="2000" dirty="0"/>
           </a:p>
           <a:p>
             <a:pPr lvl="1">
@@ -6347,16 +8072,32 @@
             </a:r>
             <a:r>
               <a:rPr lang="en-US" altLang="ko-KR" sz="1600" dirty="0" smtClean="0"/>
-              <a:t> slaves: List[</a:t>
+              <a:t> socket: Socket</a:t>
+            </a:r>
+            <a:endParaRPr lang="en-US" altLang="ko-KR" sz="1600" dirty="0" smtClean="0"/>
+          </a:p>
+          <a:p>
+            <a:pPr lvl="1">
+              <a:buFontTx/>
+              <a:buChar char="-"/>
+            </a:pPr>
+            <a:r>
+              <a:rPr lang="en-US" altLang="ko-KR" sz="1600" dirty="0" err="1"/>
+              <a:t>v</a:t>
             </a:r>
             <a:r>
               <a:rPr lang="en-US" altLang="ko-KR" sz="1600" dirty="0" err="1" smtClean="0"/>
-              <a:t>SlaveInfo</a:t>
+              <a:t>ar</a:t>
             </a:r>
             <a:r>
               <a:rPr lang="en-US" altLang="ko-KR" sz="1600" dirty="0" smtClean="0"/>
-              <a:t>]</a:t>
-            </a:r>
+              <a:t> slaves: </a:t>
+            </a:r>
+            <a:r>
+              <a:rPr lang="en-US" altLang="ko-KR" sz="1600" dirty="0" smtClean="0"/>
+              <a:t>List[Slave]</a:t>
+            </a:r>
+            <a:endParaRPr lang="en-US" altLang="ko-KR" sz="1600" dirty="0" smtClean="0"/>
           </a:p>
           <a:p>
             <a:pPr lvl="1">
@@ -6392,13 +8133,43 @@
             <a:endParaRPr lang="en-US" altLang="ko-KR" sz="1600" dirty="0"/>
           </a:p>
           <a:p>
+            <a:pPr marL="457200" lvl="1" indent="0">
+              <a:buNone/>
+            </a:pPr>
+            <a:r>
+              <a:rPr lang="en-US" altLang="ko-KR" sz="1600" dirty="0" smtClean="0"/>
+              <a:t>(connect</a:t>
+            </a:r>
+            <a:r>
+              <a:rPr lang="en-US" altLang="ko-KR" sz="1600" dirty="0" smtClean="0"/>
+              <a:t>)</a:t>
+            </a:r>
+            <a:endParaRPr lang="en-US" altLang="ko-KR" sz="1600" dirty="0" smtClean="0"/>
+          </a:p>
+          <a:p>
             <a:pPr lvl="1">
               <a:buFontTx/>
               <a:buChar char="-"/>
             </a:pPr>
             <a:r>
+              <a:rPr lang="en-US" altLang="ko-KR" sz="1600" dirty="0" err="1" smtClean="0"/>
+              <a:t>connectToMaster</a:t>
+            </a:r>
+            <a:r>
               <a:rPr lang="en-US" altLang="ko-KR" sz="1600" dirty="0" smtClean="0"/>
-              <a:t>(connect)</a:t>
+              <a:t>(String, </a:t>
+            </a:r>
+            <a:r>
+              <a:rPr lang="en-US" altLang="ko-KR" sz="1600" dirty="0" err="1" smtClean="0"/>
+              <a:t>Int</a:t>
+            </a:r>
+            <a:r>
+              <a:rPr lang="en-US" altLang="ko-KR" sz="1600" dirty="0" smtClean="0"/>
+              <a:t>): </a:t>
+            </a:r>
+            <a:r>
+              <a:rPr lang="en-US" altLang="ko-KR" sz="1600" dirty="0" smtClean="0"/>
+              <a:t>Socket</a:t>
             </a:r>
           </a:p>
           <a:p>
@@ -6407,17 +8178,18 @@
               <a:buChar char="-"/>
             </a:pPr>
             <a:r>
-              <a:rPr lang="en-US" altLang="ko-KR" sz="1600" dirty="0" err="1"/>
-              <a:t>i</a:t>
-            </a:r>
-            <a:r>
               <a:rPr lang="en-US" altLang="ko-KR" sz="1600" dirty="0" err="1" smtClean="0"/>
-              <a:t>nit</a:t>
+              <a:t>getDataSize</a:t>
             </a:r>
             <a:r>
               <a:rPr lang="en-US" altLang="ko-KR" sz="1600" dirty="0" smtClean="0"/>
-              <a:t>(): Unit</a:t>
-            </a:r>
+              <a:t>(): </a:t>
+            </a:r>
+            <a:r>
+              <a:rPr lang="en-US" altLang="ko-KR" sz="1600" dirty="0" err="1" smtClean="0"/>
+              <a:t>Int</a:t>
+            </a:r>
+            <a:endParaRPr lang="en-US" altLang="ko-KR" sz="1600" dirty="0" smtClean="0"/>
           </a:p>
           <a:p>
             <a:pPr lvl="1">
@@ -6426,20 +8198,13 @@
             </a:pPr>
             <a:r>
               <a:rPr lang="en-US" altLang="ko-KR" sz="1600" dirty="0" err="1" smtClean="0"/>
-              <a:t>connectToMaster</a:t>
+              <a:t>sendConnectMsg</a:t>
             </a:r>
             <a:r>
               <a:rPr lang="en-US" altLang="ko-KR" sz="1600" dirty="0" smtClean="0"/>
-              <a:t>(String, </a:t>
-            </a:r>
-            <a:r>
-              <a:rPr lang="en-US" altLang="ko-KR" sz="1600" dirty="0" err="1" smtClean="0"/>
-              <a:t>Int</a:t>
-            </a:r>
-            <a:r>
-              <a:rPr lang="en-US" altLang="ko-KR" sz="1600" dirty="0" smtClean="0"/>
-              <a:t>): Socket</a:t>
-            </a:r>
+              <a:t>(): Socket</a:t>
+            </a:r>
+            <a:endParaRPr lang="en-US" altLang="ko-KR" sz="1600" dirty="0" smtClean="0"/>
           </a:p>
           <a:p>
             <a:pPr lvl="1">
@@ -6449,13 +8214,55 @@
             <a:endParaRPr lang="en-US" altLang="ko-KR" sz="1600" dirty="0"/>
           </a:p>
           <a:p>
+            <a:pPr marL="457200" lvl="1" indent="0">
+              <a:buNone/>
+            </a:pPr>
+            <a:endParaRPr lang="en-US" altLang="ko-KR" dirty="0"/>
+          </a:p>
+          <a:p>
+            <a:endParaRPr lang="ko-KR" altLang="en-US" dirty="0"/>
+          </a:p>
+        </p:txBody>
+      </p:sp>
+      <p:sp>
+        <p:nvSpPr>
+          <p:cNvPr id="4" name="직사각형 3"/>
+          <p:cNvSpPr/>
+          <p:nvPr/>
+        </p:nvSpPr>
+        <p:spPr>
+          <a:xfrm>
+            <a:off x="5829528" y="510917"/>
+            <a:ext cx="6096000" cy="5755422"/>
+          </a:xfrm>
+          <a:prstGeom prst="rect">
+            <a:avLst/>
+          </a:prstGeom>
+        </p:spPr>
+        <p:txBody>
+          <a:bodyPr>
+            <a:spAutoFit/>
+          </a:bodyPr>
+          <a:lstStyle/>
+          <a:p>
+            <a:pPr lvl="1"/>
+            <a:r>
+              <a:rPr lang="en-US" altLang="ko-KR" sz="1600" dirty="0"/>
+              <a:t>(sample)</a:t>
+            </a:r>
+          </a:p>
+          <a:p>
             <a:pPr lvl="1">
               <a:buFontTx/>
               <a:buChar char="-"/>
             </a:pPr>
             <a:r>
               <a:rPr lang="en-US" altLang="ko-KR" sz="1600" dirty="0" smtClean="0"/>
-              <a:t>(sample)</a:t>
+              <a:t> sample</a:t>
+            </a:r>
+            <a:r>
+              <a:rPr lang="en-US" altLang="ko-KR" sz="1600" dirty="0"/>
+              <a:t>(): List[Key]</a:t>
             </a:r>
           </a:p>
           <a:p>
@@ -6464,12 +8271,16 @@
               <a:buChar char="-"/>
             </a:pPr>
             <a:r>
+              <a:rPr lang="en-US" altLang="ko-KR" sz="1600" dirty="0" smtClean="0"/>
+              <a:t> </a:t>
+            </a:r>
+            <a:r>
+              <a:rPr lang="en-US" altLang="ko-KR" sz="1600" dirty="0" err="1" smtClean="0"/>
+              <a:t>sampleSingleFile</a:t>
+            </a:r>
+            <a:r>
               <a:rPr lang="en-US" altLang="ko-KR" sz="1600" dirty="0"/>
-              <a:t>s</a:t>
-            </a:r>
-            <a:r>
-              <a:rPr lang="en-US" altLang="ko-KR" sz="1600" dirty="0" smtClean="0"/>
-              <a:t>ample(): List[Key]</a:t>
+              <a:t>(): List[Key]</a:t>
             </a:r>
           </a:p>
           <a:p>
@@ -6478,12 +8289,16 @@
               <a:buChar char="-"/>
             </a:pPr>
             <a:r>
+              <a:rPr lang="en-US" altLang="ko-KR" sz="1600" dirty="0" smtClean="0"/>
+              <a:t> </a:t>
+            </a:r>
+            <a:r>
               <a:rPr lang="en-US" altLang="ko-KR" sz="1600" dirty="0" err="1" smtClean="0"/>
-              <a:t>sampleSingleFile</a:t>
-            </a:r>
-            <a:r>
-              <a:rPr lang="en-US" altLang="ko-KR" sz="1600" dirty="0" smtClean="0"/>
-              <a:t>(): List[Key]</a:t>
+              <a:t>sendSampleMsg</a:t>
+            </a:r>
+            <a:r>
+              <a:rPr lang="en-US" altLang="ko-KR" sz="1600" dirty="0"/>
+              <a:t>(): Unit</a:t>
             </a:r>
           </a:p>
           <a:p>
@@ -6492,12 +8307,24 @@
               <a:buChar char="-"/>
             </a:pPr>
             <a:r>
+              <a:rPr lang="en-US" altLang="ko-KR" sz="1600" dirty="0" smtClean="0"/>
+              <a:t> </a:t>
+            </a:r>
+            <a:r>
               <a:rPr lang="en-US" altLang="ko-KR" sz="1600" dirty="0" err="1" smtClean="0"/>
-              <a:t>sendSampleMsg</a:t>
-            </a:r>
-            <a:r>
-              <a:rPr lang="en-US" altLang="ko-KR" sz="1600" dirty="0" smtClean="0"/>
-              <a:t>(): Unit</a:t>
+              <a:t>recvSlaveInfoMsg</a:t>
+            </a:r>
+            <a:r>
+              <a:rPr lang="en-US" altLang="ko-KR" sz="1600" dirty="0"/>
+              <a:t>(): Future[</a:t>
+            </a:r>
+            <a:r>
+              <a:rPr lang="en-US" altLang="ko-KR" sz="1600" dirty="0" err="1"/>
+              <a:t>SlaveInfoMsg</a:t>
+            </a:r>
+            <a:r>
+              <a:rPr lang="en-US" altLang="ko-KR" sz="1600" dirty="0"/>
+              <a:t>]</a:t>
             </a:r>
           </a:p>
           <a:p>
@@ -6506,17 +8333,247 @@
               <a:buChar char="-"/>
             </a:pPr>
             <a:r>
+              <a:rPr lang="en-US" altLang="ko-KR" sz="1600" dirty="0" smtClean="0"/>
+              <a:t> </a:t>
+            </a:r>
+            <a:r>
               <a:rPr lang="en-US" altLang="ko-KR" sz="1600" dirty="0" err="1" smtClean="0"/>
-              <a:t>recvSlaveInfoMsg</a:t>
+              <a:t>updateSlaveInfo</a:t>
             </a:r>
             <a:r>
               <a:rPr lang="en-US" altLang="ko-KR" sz="1600" dirty="0" smtClean="0"/>
-              <a:t>(): Future[]</a:t>
-            </a:r>
-            <a:endParaRPr lang="en-US" altLang="ko-KR" dirty="0"/>
-          </a:p>
-          <a:p>
-            <a:endParaRPr lang="ko-KR" altLang="en-US" dirty="0"/>
+              <a:t>(</a:t>
+            </a:r>
+            <a:r>
+              <a:rPr lang="en-US" altLang="ko-KR" sz="1600" dirty="0" err="1" smtClean="0"/>
+              <a:t>SlaveInfoMsg</a:t>
+            </a:r>
+            <a:r>
+              <a:rPr lang="en-US" altLang="ko-KR" sz="1600" dirty="0"/>
+              <a:t>): </a:t>
+            </a:r>
+            <a:r>
+              <a:rPr lang="en-US" altLang="ko-KR" sz="1600" dirty="0" smtClean="0"/>
+              <a:t>Unit</a:t>
+            </a:r>
+          </a:p>
+          <a:p>
+            <a:pPr lvl="1">
+              <a:buFontTx/>
+              <a:buChar char="-"/>
+            </a:pPr>
+            <a:endParaRPr lang="en-US" altLang="ko-KR" sz="1600" dirty="0" smtClean="0"/>
+          </a:p>
+          <a:p>
+            <a:pPr lvl="1"/>
+            <a:r>
+              <a:rPr lang="en-US" altLang="ko-KR" sz="1600" dirty="0" smtClean="0"/>
+              <a:t>(Compute)</a:t>
+            </a:r>
+            <a:endParaRPr lang="en-US" altLang="ko-KR" sz="1600" dirty="0"/>
+          </a:p>
+          <a:p>
+            <a:pPr lvl="1">
+              <a:buFontTx/>
+              <a:buChar char="-"/>
+            </a:pPr>
+            <a:r>
+              <a:rPr lang="en-US" altLang="ko-KR" sz="1600" dirty="0" smtClean="0"/>
+              <a:t> </a:t>
+            </a:r>
+            <a:r>
+              <a:rPr lang="en-US" altLang="ko-KR" sz="1600" dirty="0" err="1" smtClean="0"/>
+              <a:t>recvPartitions</a:t>
+            </a:r>
+            <a:r>
+              <a:rPr lang="en-US" altLang="ko-KR" sz="1600" dirty="0" smtClean="0"/>
+              <a:t>(): Future[Unit]</a:t>
+            </a:r>
+          </a:p>
+          <a:p>
+            <a:pPr lvl="1">
+              <a:buFontTx/>
+              <a:buChar char="-"/>
+            </a:pPr>
+            <a:r>
+              <a:rPr lang="en-US" altLang="ko-KR" sz="1600" dirty="0" smtClean="0"/>
+              <a:t> </a:t>
+            </a:r>
+            <a:r>
+              <a:rPr lang="en-US" altLang="ko-KR" sz="1600" dirty="0" err="1" smtClean="0"/>
+              <a:t>recvFromSingleSlave</a:t>
+            </a:r>
+            <a:r>
+              <a:rPr lang="en-US" altLang="ko-KR" sz="1600" dirty="0" smtClean="0"/>
+              <a:t>(): Future[Unit]</a:t>
+            </a:r>
+          </a:p>
+          <a:p>
+            <a:pPr lvl="1">
+              <a:buFontTx/>
+              <a:buChar char="-"/>
+            </a:pPr>
+            <a:endParaRPr lang="en-US" altLang="ko-KR" sz="1600" dirty="0"/>
+          </a:p>
+          <a:p>
+            <a:pPr lvl="1">
+              <a:buFontTx/>
+              <a:buChar char="-"/>
+            </a:pPr>
+            <a:r>
+              <a:rPr lang="en-US" altLang="ko-KR" sz="1600" dirty="0" smtClean="0"/>
+              <a:t> </a:t>
+            </a:r>
+            <a:r>
+              <a:rPr lang="en-US" altLang="ko-KR" sz="1600" dirty="0"/>
+              <a:t>p</a:t>
+            </a:r>
+            <a:r>
+              <a:rPr lang="en-US" altLang="ko-KR" sz="1600" dirty="0" smtClean="0"/>
+              <a:t>artition(): Future[Unit]</a:t>
+            </a:r>
+          </a:p>
+          <a:p>
+            <a:pPr lvl="1">
+              <a:buFontTx/>
+              <a:buChar char="-"/>
+            </a:pPr>
+            <a:r>
+              <a:rPr lang="en-US" altLang="ko-KR" sz="1600" dirty="0"/>
+              <a:t> </a:t>
+            </a:r>
+            <a:r>
+              <a:rPr lang="en-US" altLang="ko-KR" sz="1600" dirty="0" err="1" smtClean="0"/>
+              <a:t>partitionSingleFile</a:t>
+            </a:r>
+            <a:r>
+              <a:rPr lang="en-US" altLang="ko-KR" sz="1600" dirty="0" smtClean="0"/>
+              <a:t>(String): Unit</a:t>
+            </a:r>
+          </a:p>
+          <a:p>
+            <a:pPr lvl="1">
+              <a:buFontTx/>
+              <a:buChar char="-"/>
+            </a:pPr>
+            <a:endParaRPr lang="en-US" altLang="ko-KR" sz="1600" dirty="0"/>
+          </a:p>
+          <a:p>
+            <a:pPr lvl="1">
+              <a:buFontTx/>
+              <a:buChar char="-"/>
+            </a:pPr>
+            <a:r>
+              <a:rPr lang="en-US" altLang="ko-KR" sz="1600" dirty="0" smtClean="0"/>
+              <a:t> sort(): Future[Unit]</a:t>
+            </a:r>
+          </a:p>
+          <a:p>
+            <a:pPr lvl="1">
+              <a:buFontTx/>
+              <a:buChar char="-"/>
+            </a:pPr>
+            <a:r>
+              <a:rPr lang="en-US" altLang="ko-KR" sz="1600" dirty="0"/>
+              <a:t> </a:t>
+            </a:r>
+            <a:r>
+              <a:rPr lang="en-US" altLang="ko-KR" sz="1600" dirty="0" err="1" smtClean="0"/>
+              <a:t>sortSingleFile</a:t>
+            </a:r>
+            <a:r>
+              <a:rPr lang="en-US" altLang="ko-KR" sz="1600" dirty="0" smtClean="0"/>
+              <a:t>(String): Unit</a:t>
+            </a:r>
+          </a:p>
+          <a:p>
+            <a:pPr lvl="1">
+              <a:buFontTx/>
+              <a:buChar char="-"/>
+            </a:pPr>
+            <a:endParaRPr lang="en-US" altLang="ko-KR" sz="1600" dirty="0"/>
+          </a:p>
+          <a:p>
+            <a:pPr lvl="1">
+              <a:buFontTx/>
+              <a:buChar char="-"/>
+            </a:pPr>
+            <a:r>
+              <a:rPr lang="en-US" altLang="ko-KR" sz="1600" dirty="0"/>
+              <a:t> </a:t>
+            </a:r>
+            <a:r>
+              <a:rPr lang="en-US" altLang="ko-KR" sz="1600" dirty="0" smtClean="0"/>
+              <a:t>shuffle(): Future[Unit]</a:t>
+            </a:r>
+          </a:p>
+          <a:p>
+            <a:pPr lvl="1">
+              <a:buFontTx/>
+              <a:buChar char="-"/>
+            </a:pPr>
+            <a:endParaRPr lang="en-US" altLang="ko-KR" sz="1600" dirty="0"/>
+          </a:p>
+          <a:p>
+            <a:pPr lvl="1">
+              <a:buFontTx/>
+              <a:buChar char="-"/>
+            </a:pPr>
+            <a:r>
+              <a:rPr lang="en-US" altLang="ko-KR" sz="1600" dirty="0"/>
+              <a:t> </a:t>
+            </a:r>
+            <a:r>
+              <a:rPr lang="en-US" altLang="ko-KR" sz="1600" dirty="0" err="1" smtClean="0"/>
+              <a:t>sendPartitions</a:t>
+            </a:r>
+            <a:r>
+              <a:rPr lang="en-US" altLang="ko-KR" sz="1600" dirty="0" smtClean="0"/>
+              <a:t>(): Future[Unit]</a:t>
+            </a:r>
+          </a:p>
+          <a:p>
+            <a:pPr lvl="1">
+              <a:buFontTx/>
+              <a:buChar char="-"/>
+            </a:pPr>
+            <a:r>
+              <a:rPr lang="en-US" altLang="ko-KR" sz="1600" dirty="0" smtClean="0"/>
+              <a:t> </a:t>
+            </a:r>
+            <a:r>
+              <a:rPr lang="en-US" altLang="ko-KR" sz="1600" dirty="0" err="1" smtClean="0"/>
+              <a:t>sendPartitionTo</a:t>
+            </a:r>
+            <a:r>
+              <a:rPr lang="en-US" altLang="ko-KR" sz="1600" dirty="0" smtClean="0"/>
+              <a:t>(Slave): Unit</a:t>
+            </a:r>
+          </a:p>
+          <a:p>
+            <a:pPr lvl="1">
+              <a:buFontTx/>
+              <a:buChar char="-"/>
+            </a:pPr>
+            <a:endParaRPr lang="en-US" altLang="ko-KR" sz="1600" dirty="0"/>
+          </a:p>
+          <a:p>
+            <a:pPr lvl="1">
+              <a:buFontTx/>
+              <a:buChar char="-"/>
+            </a:pPr>
+            <a:r>
+              <a:rPr lang="en-US" altLang="ko-KR" sz="1600" dirty="0"/>
+              <a:t> </a:t>
+            </a:r>
+            <a:r>
+              <a:rPr lang="en-US" altLang="ko-KR" sz="1600" dirty="0" err="1" smtClean="0"/>
+              <a:t>sendDoneMsg</a:t>
+            </a:r>
+            <a:r>
+              <a:rPr lang="en-US" altLang="ko-KR" sz="1600" dirty="0" smtClean="0"/>
+              <a:t>(): Unit</a:t>
+            </a:r>
           </a:p>
         </p:txBody>
       </p:sp>
@@ -6524,72 +8581,6 @@
     <p:extLst>
       <p:ext uri="{BB962C8B-B14F-4D97-AF65-F5344CB8AC3E}">
         <p14:creationId xmlns:p14="http://schemas.microsoft.com/office/powerpoint/2010/main" val="4159145072"/>
-      </p:ext>
-    </p:extLst>
-  </p:cSld>
-  <p:clrMapOvr>
-    <a:masterClrMapping/>
-  </p:clrMapOvr>
-  <p:timing>
-    <p:tnLst>
-      <p:par>
-        <p:cTn id="1" dur="indefinite" restart="never" nodeType="tmRoot"/>
-      </p:par>
-    </p:tnLst>
-  </p:timing>
-</p:sld>
-</file>
-
-<file path=ppt/slides/slide2.xml><?xml version="1.0" encoding="utf-8"?>
-<p:sld xmlns:a="http://schemas.openxmlformats.org/drawingml/2006/main" xmlns:r="http://schemas.openxmlformats.org/officeDocument/2006/relationships" xmlns:p="http://schemas.openxmlformats.org/presentationml/2006/main">
-  <p:cSld>
-    <p:spTree>
-      <p:nvGrpSpPr>
-        <p:cNvPr id="1" name=""/>
-        <p:cNvGrpSpPr/>
-        <p:nvPr/>
-      </p:nvGrpSpPr>
-      <p:grpSpPr>
-        <a:xfrm>
-          <a:off x="0" y="0"/>
-          <a:ext cx="0" cy="0"/>
-          <a:chOff x="0" y="0"/>
-          <a:chExt cx="0" cy="0"/>
-        </a:xfrm>
-      </p:grpSpPr>
-      <p:sp>
-        <p:nvSpPr>
-          <p:cNvPr id="2" name="제목 1"/>
-          <p:cNvSpPr>
-            <a:spLocks noGrp="1"/>
-          </p:cNvSpPr>
-          <p:nvPr>
-            <p:ph type="title"/>
-          </p:nvPr>
-        </p:nvSpPr>
-        <p:spPr>
-          <a:xfrm>
-            <a:off x="197117" y="2763371"/>
-            <a:ext cx="11876248" cy="1325563"/>
-          </a:xfrm>
-        </p:spPr>
-        <p:txBody>
-          <a:bodyPr/>
-          <a:lstStyle/>
-          <a:p>
-            <a:pPr algn="ctr"/>
-            <a:r>
-              <a:rPr lang="en-US" altLang="ko-KR" dirty="0" smtClean="0"/>
-              <a:t>Conventions</a:t>
-            </a:r>
-            <a:endParaRPr lang="ko-KR" altLang="en-US" dirty="0"/>
-          </a:p>
-        </p:txBody>
-      </p:sp>
-    </p:spTree>
-    <p:extLst>
-      <p:ext uri="{BB962C8B-B14F-4D97-AF65-F5344CB8AC3E}">
-        <p14:creationId xmlns:p14="http://schemas.microsoft.com/office/powerpoint/2010/main" val="2859998143"/>
       </p:ext>
     </p:extLst>
   </p:cSld>
@@ -7078,13 +9069,8 @@
                       </a:pPr>
                       <a:r>
                         <a:rPr lang="en-US" altLang="ko-KR" sz="1400" baseline="0" dirty="0" smtClean="0"/>
-                        <a:t>IP (16 bytes, </a:t>
+                        <a:t>IP (16 bytes, Array[byte])</a:t>
                       </a:r>
-                      <a:r>
-                        <a:rPr lang="en-US" altLang="ko-KR" sz="1400" baseline="0" dirty="0" smtClean="0"/>
-                        <a:t>Array[byte])</a:t>
-                      </a:r>
-                      <a:endParaRPr lang="en-US" altLang="ko-KR" sz="1400" baseline="0" dirty="0" smtClean="0"/>
                     </a:p>
                     <a:p>
                       <a:pPr marL="285750" indent="-285750" latinLnBrk="1">
@@ -7093,15 +9079,7 @@
                       </a:pPr>
                       <a:r>
                         <a:rPr lang="en-US" altLang="ko-KR" sz="1400" baseline="0" dirty="0" smtClean="0"/>
-                        <a:t>Port (4 bytes, Integer</a:t>
-                      </a:r>
-                      <a:r>
-                        <a:rPr lang="en-US" altLang="ko-KR" sz="1400" baseline="0" dirty="0" smtClean="0"/>
-                        <a:t>)               * </a:t>
-                      </a:r>
-                      <a:r>
-                        <a:rPr lang="en-US" altLang="ko-KR" sz="1400" baseline="0" dirty="0" smtClean="0"/>
-                        <a:t>(# of slaves)</a:t>
+                        <a:t>Port (4 bytes, Integer)               * (# of slaves)</a:t>
                       </a:r>
                     </a:p>
                     <a:p>
@@ -8828,14 +10806,14 @@
           <p:nvPr/>
         </p:nvCxnSpPr>
         <p:spPr>
-          <a:xfrm rot="16200000" flipH="1">
-            <a:off x="6890264" y="5241685"/>
-            <a:ext cx="12700" cy="1835722"/>
+          <a:xfrm rot="5400000" flipH="1" flipV="1">
+            <a:off x="6888567" y="5232556"/>
+            <a:ext cx="10825" cy="1843155"/>
           </a:xfrm>
           <a:prstGeom prst="curvedConnector4">
             <a:avLst>
-              <a:gd name="adj1" fmla="val -1800000"/>
-              <a:gd name="adj2" fmla="val 55925"/>
+              <a:gd name="adj1" fmla="val -2111778"/>
+              <a:gd name="adj2" fmla="val 55902"/>
             </a:avLst>
           </a:prstGeom>
           <a:ln>
@@ -9758,8 +11736,8 @@
         </p:nvSpPr>
         <p:spPr>
           <a:xfrm>
-            <a:off x="7808125" y="5576411"/>
-            <a:ext cx="1485530" cy="1166270"/>
+            <a:off x="7815558" y="5565586"/>
+            <a:ext cx="1632893" cy="1166270"/>
           </a:xfrm>
           <a:prstGeom prst="ellipse">
             <a:avLst/>
@@ -9785,8 +11763,8 @@
           <a:p>
             <a:pPr algn="ctr"/>
             <a:r>
-              <a:rPr lang="en-US" altLang="ko-KR" dirty="0" err="1" smtClean="0"/>
-              <a:t>Eval</a:t>
+              <a:rPr lang="en-US" altLang="ko-KR" dirty="0" smtClean="0"/>
+              <a:t>Compute</a:t>
             </a:r>
             <a:endParaRPr lang="ko-KR" altLang="en-US" dirty="0"/>
           </a:p>
@@ -9803,8 +11781,8 @@
         </p:nvCxnSpPr>
         <p:spPr>
           <a:xfrm flipV="1">
-            <a:off x="9293655" y="5694847"/>
-            <a:ext cx="1041431" cy="464699"/>
+            <a:off x="9448451" y="5694847"/>
+            <a:ext cx="886635" cy="453874"/>
           </a:xfrm>
           <a:prstGeom prst="curvedConnector2">
             <a:avLst/>
@@ -9828,61 +11806,19 @@
           </a:fontRef>
         </p:style>
       </p:cxnSp>
-      <p:sp>
-        <p:nvSpPr>
-          <p:cNvPr id="110" name="타원 109"/>
-          <p:cNvSpPr/>
-          <p:nvPr/>
-        </p:nvSpPr>
-        <p:spPr>
-          <a:xfrm>
-            <a:off x="8456777" y="3617186"/>
-            <a:ext cx="1485530" cy="1166270"/>
-          </a:xfrm>
-          <a:prstGeom prst="ellipse">
-            <a:avLst/>
-          </a:prstGeom>
-        </p:spPr>
-        <p:style>
-          <a:lnRef idx="1">
-            <a:schemeClr val="accent4"/>
-          </a:lnRef>
-          <a:fillRef idx="2">
-            <a:schemeClr val="accent4"/>
-          </a:fillRef>
-          <a:effectRef idx="1">
-            <a:schemeClr val="accent4"/>
-          </a:effectRef>
-          <a:fontRef idx="minor">
-            <a:schemeClr val="dk1"/>
-          </a:fontRef>
-        </p:style>
-        <p:txBody>
-          <a:bodyPr rtlCol="0" anchor="ctr"/>
-          <a:lstStyle/>
-          <a:p>
-            <a:pPr algn="ctr"/>
-            <a:r>
-              <a:rPr lang="en-US" altLang="ko-KR" dirty="0" err="1" smtClean="0"/>
-              <a:t>Eval</a:t>
-            </a:r>
-            <a:endParaRPr lang="ko-KR" altLang="en-US" dirty="0"/>
-          </a:p>
-        </p:txBody>
-      </p:sp>
       <p:cxnSp>
         <p:nvCxnSpPr>
           <p:cNvPr id="130" name="구부러진 연결선 129"/>
           <p:cNvCxnSpPr>
-            <a:stCxn id="110" idx="5"/>
+            <a:stCxn id="54" idx="5"/>
             <a:endCxn id="41" idx="2"/>
           </p:cNvCxnSpPr>
           <p:nvPr/>
         </p:nvCxnSpPr>
         <p:spPr>
           <a:xfrm rot="16200000" flipH="1">
-            <a:off x="9586221" y="4751194"/>
-            <a:ext cx="669848" cy="392779"/>
+            <a:off x="9505310" y="4670282"/>
+            <a:ext cx="957453" cy="266997"/>
           </a:xfrm>
           <a:prstGeom prst="curvedConnector2">
             <a:avLst/>
@@ -9917,12 +11853,12 @@
         </p:nvCxnSpPr>
         <p:spPr>
           <a:xfrm flipH="1" flipV="1">
-            <a:off x="8550890" y="5576411"/>
-            <a:ext cx="742765" cy="583135"/>
+            <a:off x="8632005" y="5565586"/>
+            <a:ext cx="816446" cy="583135"/>
           </a:xfrm>
           <a:prstGeom prst="curvedConnector4">
             <a:avLst>
-              <a:gd name="adj1" fmla="val -30777"/>
+              <a:gd name="adj1" fmla="val -27999"/>
               <a:gd name="adj2" fmla="val 139202"/>
             </a:avLst>
           </a:prstGeom>
@@ -10202,14 +12138,14 @@
           <p:cNvPr id="128" name="구부러진 연결선 127"/>
           <p:cNvCxnSpPr>
             <a:stCxn id="40" idx="6"/>
-            <a:endCxn id="110" idx="2"/>
+            <a:endCxn id="54" idx="2"/>
           </p:cNvCxnSpPr>
           <p:nvPr/>
         </p:nvCxnSpPr>
         <p:spPr>
           <a:xfrm flipV="1">
-            <a:off x="6189954" y="4200321"/>
-            <a:ext cx="2266823" cy="1546886"/>
+            <a:off x="6189954" y="3912716"/>
+            <a:ext cx="2266823" cy="1834491"/>
           </a:xfrm>
           <a:prstGeom prst="curvedConnector3">
             <a:avLst>
@@ -10274,6 +12210,48 @@
               <a:t>PivotCalcDone</a:t>
             </a:r>
             <a:endParaRPr lang="ko-KR" altLang="en-US" sz="1400" dirty="0"/>
+          </a:p>
+        </p:txBody>
+      </p:sp>
+      <p:sp>
+        <p:nvSpPr>
+          <p:cNvPr id="54" name="타원 53"/>
+          <p:cNvSpPr/>
+          <p:nvPr/>
+        </p:nvSpPr>
+        <p:spPr>
+          <a:xfrm>
+            <a:off x="8456777" y="3329581"/>
+            <a:ext cx="1632893" cy="1166270"/>
+          </a:xfrm>
+          <a:prstGeom prst="ellipse">
+            <a:avLst/>
+          </a:prstGeom>
+        </p:spPr>
+        <p:style>
+          <a:lnRef idx="1">
+            <a:schemeClr val="accent4"/>
+          </a:lnRef>
+          <a:fillRef idx="2">
+            <a:schemeClr val="accent4"/>
+          </a:fillRef>
+          <a:effectRef idx="1">
+            <a:schemeClr val="accent4"/>
+          </a:effectRef>
+          <a:fontRef idx="minor">
+            <a:schemeClr val="dk1"/>
+          </a:fontRef>
+        </p:style>
+        <p:txBody>
+          <a:bodyPr rtlCol="0" anchor="ctr"/>
+          <a:lstStyle/>
+          <a:p>
+            <a:pPr algn="ctr"/>
+            <a:r>
+              <a:rPr lang="en-US" altLang="ko-KR" dirty="0" smtClean="0"/>
+              <a:t>Compute</a:t>
+            </a:r>
+            <a:endParaRPr lang="ko-KR" altLang="en-US" dirty="0"/>
           </a:p>
         </p:txBody>
       </p:sp>
@@ -10434,8 +12412,8 @@
         </p:nvSpPr>
         <p:spPr>
           <a:xfrm>
-            <a:off x="5671938" y="5113918"/>
-            <a:ext cx="1485530" cy="1166270"/>
+            <a:off x="5530204" y="5113918"/>
+            <a:ext cx="1627264" cy="1166270"/>
           </a:xfrm>
           <a:prstGeom prst="ellipse">
             <a:avLst/>
@@ -10461,8 +12439,8 @@
           <a:p>
             <a:pPr algn="ctr"/>
             <a:r>
-              <a:rPr lang="en-US" altLang="ko-KR" dirty="0" err="1" smtClean="0"/>
-              <a:t>Eval</a:t>
+              <a:rPr lang="en-US" altLang="ko-KR" dirty="0"/>
+              <a:t>Compute</a:t>
             </a:r>
             <a:endParaRPr lang="ko-KR" altLang="en-US" dirty="0"/>
           </a:p>
@@ -10515,8 +12493,8 @@
         </p:nvCxnSpPr>
         <p:spPr>
           <a:xfrm rot="16200000" flipH="1">
-            <a:off x="3863290" y="3888404"/>
-            <a:ext cx="1180721" cy="2436576"/>
+            <a:off x="3792423" y="3959271"/>
+            <a:ext cx="1180721" cy="2294842"/>
           </a:xfrm>
           <a:prstGeom prst="curvedConnector2">
             <a:avLst/>

</xml_diff>

<commit_message>
Simplified Msg, new tests
</commit_message>
<xml_diff>
--- a/project.pptx
+++ b/project.pptx
@@ -27,11 +27,14 @@
     <p:sldId id="284" r:id="rId21"/>
     <p:sldId id="277" r:id="rId22"/>
     <p:sldId id="278" r:id="rId23"/>
-    <p:sldId id="283" r:id="rId24"/>
+    <p:sldId id="297" r:id="rId24"/>
     <p:sldId id="281" r:id="rId25"/>
     <p:sldId id="282" r:id="rId26"/>
     <p:sldId id="295" r:id="rId27"/>
     <p:sldId id="296" r:id="rId28"/>
+    <p:sldId id="300" r:id="rId29"/>
+    <p:sldId id="298" r:id="rId30"/>
+    <p:sldId id="299" r:id="rId31"/>
   </p:sldIdLst>
   <p:sldSz cx="12192000" cy="6858000"/>
   <p:notesSz cx="6858000" cy="9144000"/>
@@ -269,7 +272,7 @@
           <a:p>
             <a:fld id="{33CC212C-81FB-40F3-BD5E-91ADD12CE53F}" type="datetimeFigureOut">
               <a:rPr lang="ko-KR" altLang="en-US" smtClean="0"/>
-              <a:t>2016-10-21</a:t>
+              <a:t>2016-10-24</a:t>
             </a:fld>
             <a:endParaRPr lang="ko-KR" altLang="en-US"/>
           </a:p>
@@ -439,7 +442,7 @@
           <a:p>
             <a:fld id="{33CC212C-81FB-40F3-BD5E-91ADD12CE53F}" type="datetimeFigureOut">
               <a:rPr lang="ko-KR" altLang="en-US" smtClean="0"/>
-              <a:t>2016-10-21</a:t>
+              <a:t>2016-10-24</a:t>
             </a:fld>
             <a:endParaRPr lang="ko-KR" altLang="en-US"/>
           </a:p>
@@ -619,7 +622,7 @@
           <a:p>
             <a:fld id="{33CC212C-81FB-40F3-BD5E-91ADD12CE53F}" type="datetimeFigureOut">
               <a:rPr lang="ko-KR" altLang="en-US" smtClean="0"/>
-              <a:t>2016-10-21</a:t>
+              <a:t>2016-10-24</a:t>
             </a:fld>
             <a:endParaRPr lang="ko-KR" altLang="en-US"/>
           </a:p>
@@ -789,7 +792,7 @@
           <a:p>
             <a:fld id="{33CC212C-81FB-40F3-BD5E-91ADD12CE53F}" type="datetimeFigureOut">
               <a:rPr lang="ko-KR" altLang="en-US" smtClean="0"/>
-              <a:t>2016-10-21</a:t>
+              <a:t>2016-10-24</a:t>
             </a:fld>
             <a:endParaRPr lang="ko-KR" altLang="en-US"/>
           </a:p>
@@ -1035,7 +1038,7 @@
           <a:p>
             <a:fld id="{33CC212C-81FB-40F3-BD5E-91ADD12CE53F}" type="datetimeFigureOut">
               <a:rPr lang="ko-KR" altLang="en-US" smtClean="0"/>
-              <a:t>2016-10-21</a:t>
+              <a:t>2016-10-24</a:t>
             </a:fld>
             <a:endParaRPr lang="ko-KR" altLang="en-US"/>
           </a:p>
@@ -1267,7 +1270,7 @@
           <a:p>
             <a:fld id="{33CC212C-81FB-40F3-BD5E-91ADD12CE53F}" type="datetimeFigureOut">
               <a:rPr lang="ko-KR" altLang="en-US" smtClean="0"/>
-              <a:t>2016-10-21</a:t>
+              <a:t>2016-10-24</a:t>
             </a:fld>
             <a:endParaRPr lang="ko-KR" altLang="en-US"/>
           </a:p>
@@ -1634,7 +1637,7 @@
           <a:p>
             <a:fld id="{33CC212C-81FB-40F3-BD5E-91ADD12CE53F}" type="datetimeFigureOut">
               <a:rPr lang="ko-KR" altLang="en-US" smtClean="0"/>
-              <a:t>2016-10-21</a:t>
+              <a:t>2016-10-24</a:t>
             </a:fld>
             <a:endParaRPr lang="ko-KR" altLang="en-US"/>
           </a:p>
@@ -1752,7 +1755,7 @@
           <a:p>
             <a:fld id="{33CC212C-81FB-40F3-BD5E-91ADD12CE53F}" type="datetimeFigureOut">
               <a:rPr lang="ko-KR" altLang="en-US" smtClean="0"/>
-              <a:t>2016-10-21</a:t>
+              <a:t>2016-10-24</a:t>
             </a:fld>
             <a:endParaRPr lang="ko-KR" altLang="en-US"/>
           </a:p>
@@ -1847,7 +1850,7 @@
           <a:p>
             <a:fld id="{33CC212C-81FB-40F3-BD5E-91ADD12CE53F}" type="datetimeFigureOut">
               <a:rPr lang="ko-KR" altLang="en-US" smtClean="0"/>
-              <a:t>2016-10-21</a:t>
+              <a:t>2016-10-24</a:t>
             </a:fld>
             <a:endParaRPr lang="ko-KR" altLang="en-US"/>
           </a:p>
@@ -2124,7 +2127,7 @@
           <a:p>
             <a:fld id="{33CC212C-81FB-40F3-BD5E-91ADD12CE53F}" type="datetimeFigureOut">
               <a:rPr lang="ko-KR" altLang="en-US" smtClean="0"/>
-              <a:t>2016-10-21</a:t>
+              <a:t>2016-10-24</a:t>
             </a:fld>
             <a:endParaRPr lang="ko-KR" altLang="en-US"/>
           </a:p>
@@ -2377,7 +2380,7 @@
           <a:p>
             <a:fld id="{33CC212C-81FB-40F3-BD5E-91ADD12CE53F}" type="datetimeFigureOut">
               <a:rPr lang="ko-KR" altLang="en-US" smtClean="0"/>
-              <a:t>2016-10-21</a:t>
+              <a:t>2016-10-24</a:t>
             </a:fld>
             <a:endParaRPr lang="ko-KR" altLang="en-US"/>
           </a:p>
@@ -2590,7 +2593,7 @@
           <a:p>
             <a:fld id="{33CC212C-81FB-40F3-BD5E-91ADD12CE53F}" type="datetimeFigureOut">
               <a:rPr lang="ko-KR" altLang="en-US" smtClean="0"/>
-              <a:t>2016-10-21</a:t>
+              <a:t>2016-10-24</a:t>
             </a:fld>
             <a:endParaRPr lang="ko-KR" altLang="en-US"/>
           </a:p>
@@ -3512,7 +3515,7 @@
             <a:pPr algn="ctr"/>
             <a:r>
               <a:rPr lang="en-US" altLang="ko-KR" dirty="0" smtClean="0"/>
-              <a:t>Sample</a:t>
+              <a:t>Connect</a:t>
             </a:r>
             <a:endParaRPr lang="ko-KR" altLang="en-US" dirty="0"/>
           </a:p>
@@ -4054,8 +4057,8 @@
           <a:p>
             <a:pPr algn="ctr"/>
             <a:r>
-              <a:rPr lang="en-US" altLang="ko-KR" dirty="0" err="1" smtClean="0"/>
-              <a:t>Calc</a:t>
+              <a:rPr lang="en-US" altLang="ko-KR" dirty="0" smtClean="0"/>
+              <a:t>Sample</a:t>
             </a:r>
             <a:endParaRPr lang="ko-KR" altLang="en-US" dirty="0"/>
           </a:p>
@@ -4328,11 +4331,7 @@
           <a:p>
             <a:r>
               <a:rPr lang="en-US" altLang="ko-KR" dirty="0" smtClean="0"/>
-              <a:t>Open </a:t>
-            </a:r>
-            <a:r>
-              <a:rPr lang="en-US" altLang="ko-KR" dirty="0" smtClean="0"/>
-              <a:t>socket</a:t>
+              <a:t>Open socket</a:t>
             </a:r>
           </a:p>
           <a:p>
@@ -4347,21 +4346,44 @@
           <a:p>
             <a:r>
               <a:rPr lang="en-US" altLang="ko-KR" dirty="0" smtClean="0"/>
-              <a:t>Whenever client connected, create </a:t>
+              <a:t>Whenever client </a:t>
             </a:r>
             <a:r>
               <a:rPr lang="en-US" altLang="ko-KR" dirty="0" smtClean="0"/>
-              <a:t>sampling </a:t>
+              <a:t>connected</a:t>
+            </a:r>
+          </a:p>
+          <a:p>
+            <a:pPr lvl="1">
+              <a:buFontTx/>
+              <a:buChar char="-"/>
+            </a:pPr>
+            <a:r>
+              <a:rPr lang="en-US" altLang="ko-KR" dirty="0"/>
+              <a:t>C</a:t>
             </a:r>
             <a:r>
               <a:rPr lang="en-US" altLang="ko-KR" dirty="0" smtClean="0"/>
-              <a:t>future for </a:t>
+              <a:t>reate </a:t>
+            </a:r>
+            <a:r>
+              <a:rPr lang="en-US" altLang="ko-KR" dirty="0" smtClean="0"/>
+              <a:t>sampling future for </a:t>
             </a:r>
             <a:r>
               <a:rPr lang="en-US" altLang="ko-KR" dirty="0" smtClean="0"/>
               <a:t>client</a:t>
             </a:r>
-            <a:endParaRPr lang="en-US" altLang="ko-KR" dirty="0" smtClean="0"/>
+          </a:p>
+          <a:p>
+            <a:pPr lvl="1">
+              <a:buFontTx/>
+              <a:buChar char="-"/>
+            </a:pPr>
+            <a:r>
+              <a:rPr lang="en-US" altLang="ko-KR" dirty="0" smtClean="0"/>
+              <a:t>Update slaves list</a:t>
+            </a:r>
           </a:p>
         </p:txBody>
       </p:sp>
@@ -4412,7 +4434,7 @@
           <a:p>
             <a:r>
               <a:rPr lang="en-US" altLang="ko-KR" dirty="0" smtClean="0"/>
-              <a:t>Sampling Future</a:t>
+              <a:t>Master Connect (Sampling Future)</a:t>
             </a:r>
             <a:endParaRPr lang="ko-KR" altLang="en-US" dirty="0"/>
           </a:p>
@@ -4441,16 +4463,7 @@
               <a:rPr lang="en-US" altLang="ko-KR" dirty="0" smtClean="0"/>
               <a:t>slave</a:t>
             </a:r>
-          </a:p>
-          <a:p>
-            <a:r>
-              <a:rPr lang="en-US" altLang="ko-KR" dirty="0" smtClean="0"/>
-              <a:t>Update slaves list</a:t>
-            </a:r>
             <a:endParaRPr lang="en-US" altLang="ko-KR" dirty="0" smtClean="0"/>
-          </a:p>
-          <a:p>
-            <a:endParaRPr lang="ko-KR" altLang="en-US" dirty="0"/>
           </a:p>
         </p:txBody>
       </p:sp>
@@ -4501,11 +4514,7 @@
           <a:p>
             <a:r>
               <a:rPr lang="en-US" altLang="ko-KR" dirty="0" smtClean="0"/>
-              <a:t>Master </a:t>
-            </a:r>
-            <a:r>
-              <a:rPr lang="en-US" altLang="ko-KR" dirty="0" err="1" smtClean="0"/>
-              <a:t>Calc</a:t>
+              <a:t>Master Sample</a:t>
             </a:r>
             <a:endParaRPr lang="ko-KR" altLang="en-US" dirty="0"/>
           </a:p>
@@ -4790,13 +4799,8 @@
           <a:p>
             <a:r>
               <a:rPr lang="en-US" altLang="ko-KR" dirty="0" smtClean="0"/>
-              <a:t>Make socket connection with </a:t>
-            </a:r>
-            <a:r>
-              <a:rPr lang="en-US" altLang="ko-KR" dirty="0" smtClean="0"/>
-              <a:t>Master</a:t>
-            </a:r>
-            <a:endParaRPr lang="en-US" altLang="ko-KR" dirty="0" smtClean="0"/>
+              <a:t>Make socket connection with Master</a:t>
+            </a:r>
           </a:p>
         </p:txBody>
       </p:sp>
@@ -4876,24 +4880,19 @@
               <a:rPr lang="en-US" altLang="ko-KR" dirty="0" smtClean="0"/>
               <a:t>pairs</a:t>
             </a:r>
-            <a:endParaRPr lang="en-US" altLang="ko-KR" dirty="0" smtClean="0"/>
           </a:p>
           <a:p>
             <a:r>
               <a:rPr lang="en-US" altLang="ko-KR" dirty="0" smtClean="0"/>
-              <a:t>Sample </a:t>
+              <a:t>Sample from data (Sample size is </a:t>
             </a:r>
             <a:r>
               <a:rPr lang="en-US" altLang="ko-KR" dirty="0" smtClean="0"/>
-              <a:t>from data (Sample size is </a:t>
-            </a:r>
-            <a:r>
-              <a:rPr lang="en-US" altLang="ko-KR" dirty="0" err="1" smtClean="0"/>
-              <a:t>proposional</a:t>
+              <a:t>proportional </a:t>
             </a:r>
             <a:r>
               <a:rPr lang="en-US" altLang="ko-KR" dirty="0" smtClean="0"/>
-              <a:t> to data size)</a:t>
+              <a:t>to data size)</a:t>
             </a:r>
           </a:p>
           <a:p>
@@ -5837,7 +5836,7 @@
         <p:spPr>
           <a:xfrm>
             <a:off x="838200" y="1978024"/>
-            <a:ext cx="4856267" cy="4755865"/>
+            <a:ext cx="8957441" cy="4755865"/>
           </a:xfrm>
         </p:spPr>
         <p:txBody>
@@ -5846,7 +5845,15 @@
           <a:p>
             <a:r>
               <a:rPr lang="en-US" altLang="ko-KR" sz="2000" dirty="0" smtClean="0"/>
-              <a:t>trait Message</a:t>
+              <a:t>abstract class</a:t>
+            </a:r>
+            <a:r>
+              <a:rPr lang="en-US" altLang="ko-KR" sz="2000" dirty="0" smtClean="0"/>
+              <a:t> </a:t>
+            </a:r>
+            <a:r>
+              <a:rPr lang="en-US" altLang="ko-KR" sz="2000" dirty="0" smtClean="0"/>
+              <a:t>Message</a:t>
             </a:r>
           </a:p>
           <a:p>
@@ -5855,14 +5862,39 @@
               <a:buChar char="-"/>
             </a:pPr>
             <a:r>
+              <a:rPr lang="en-US" altLang="ko-KR" sz="1600" dirty="0" err="1" smtClean="0"/>
+              <a:t>toByteArray</a:t>
+            </a:r>
+            <a:r>
               <a:rPr lang="en-US" altLang="ko-KR" sz="1600" dirty="0" smtClean="0"/>
-              <a:t>type: </a:t>
-            </a:r>
-            <a:r>
-              <a:rPr lang="en-US" altLang="ko-KR" sz="1600" dirty="0" err="1" smtClean="0"/>
-              <a:t>MessageType</a:t>
-            </a:r>
-            <a:endParaRPr lang="en-US" altLang="ko-KR" sz="1600" dirty="0" smtClean="0"/>
+              <a:t>(Message</a:t>
+            </a:r>
+            <a:r>
+              <a:rPr lang="en-US" altLang="ko-KR" sz="1600" dirty="0" smtClean="0"/>
+              <a:t>): </a:t>
+            </a:r>
+            <a:r>
+              <a:rPr lang="en-US" altLang="ko-KR" sz="1600" dirty="0"/>
+              <a:t>Array[byte</a:t>
+            </a:r>
+            <a:r>
+              <a:rPr lang="en-US" altLang="ko-KR" sz="1600" dirty="0" smtClean="0"/>
+              <a:t>]</a:t>
+            </a:r>
+          </a:p>
+          <a:p>
+            <a:endParaRPr lang="en-US" altLang="ko-KR" sz="2000" dirty="0" smtClean="0"/>
+          </a:p>
+          <a:p>
+            <a:r>
+              <a:rPr lang="en-US" altLang="ko-KR" sz="2000" dirty="0" smtClean="0"/>
+              <a:t>object </a:t>
+            </a:r>
+            <a:r>
+              <a:rPr lang="en-US" altLang="ko-KR" sz="2000" dirty="0" err="1" smtClean="0"/>
+              <a:t>MessageInterpreter</a:t>
+            </a:r>
+            <a:endParaRPr lang="en-US" altLang="ko-KR" sz="2000" dirty="0" smtClean="0"/>
           </a:p>
           <a:p>
             <a:pPr lvl="1">
@@ -5871,26 +5903,13 @@
             </a:pPr>
             <a:r>
               <a:rPr lang="en-US" altLang="ko-KR" sz="1600" dirty="0" err="1" smtClean="0"/>
-              <a:t>toByteArray</a:t>
+              <a:t>interpretMessage</a:t>
             </a:r>
             <a:r>
               <a:rPr lang="en-US" altLang="ko-KR" sz="1600" dirty="0" smtClean="0"/>
-              <a:t>(Message): </a:t>
-            </a:r>
-            <a:r>
-              <a:rPr lang="en-US" altLang="ko-KR" sz="1600" dirty="0"/>
-              <a:t>Array[byte</a:t>
-            </a:r>
-            <a:r>
-              <a:rPr lang="en-US" altLang="ko-KR" sz="1600" dirty="0" smtClean="0"/>
-              <a:t>]</a:t>
-            </a:r>
-          </a:p>
-          <a:p>
-            <a:r>
-              <a:rPr lang="en-US" altLang="ko-KR" sz="2000" dirty="0" smtClean="0"/>
-              <a:t>object Message</a:t>
-            </a:r>
+              <a:t>(Array[Byte]): Message</a:t>
+            </a:r>
+            <a:endParaRPr lang="en-US" altLang="ko-KR" sz="2000" dirty="0"/>
           </a:p>
           <a:p>
             <a:pPr lvl="1">
@@ -5899,31 +5918,73 @@
             </a:pPr>
             <a:r>
               <a:rPr lang="en-US" altLang="ko-KR" sz="1600" dirty="0" err="1" smtClean="0"/>
-              <a:t>getMessageType</a:t>
+              <a:t>interpretSlaveInfoMessage</a:t>
             </a:r>
             <a:r>
               <a:rPr lang="en-US" altLang="ko-KR" sz="1600" dirty="0" smtClean="0"/>
-              <a:t>(</a:t>
-            </a:r>
-            <a:r>
-              <a:rPr lang="en-US" altLang="ko-KR" sz="1600" dirty="0"/>
-              <a:t>Array[byte</a:t>
-            </a:r>
-            <a:r>
-              <a:rPr lang="en-US" altLang="ko-KR" sz="1600" dirty="0" smtClean="0"/>
-              <a:t>]): </a:t>
+              <a:t>(Array[Byte]): </a:t>
             </a:r>
             <a:r>
               <a:rPr lang="en-US" altLang="ko-KR" sz="1600" dirty="0" err="1" smtClean="0"/>
-              <a:t>MessageType</a:t>
-            </a:r>
-            <a:endParaRPr lang="en-US" altLang="ko-KR" sz="2000" dirty="0"/>
+              <a:t>SlaveInfoMessage</a:t>
+            </a:r>
+            <a:endParaRPr lang="en-US" altLang="ko-KR" sz="1600" dirty="0" smtClean="0"/>
           </a:p>
           <a:p>
             <a:pPr lvl="1">
               <a:buFontTx/>
               <a:buChar char="-"/>
             </a:pPr>
+            <a:r>
+              <a:rPr lang="en-US" altLang="ko-KR" sz="1600" dirty="0" err="1" smtClean="0"/>
+              <a:t>interpretSampleMessage</a:t>
+            </a:r>
+            <a:r>
+              <a:rPr lang="en-US" altLang="ko-KR" sz="1600" dirty="0" smtClean="0"/>
+              <a:t>(Array[Byte]): </a:t>
+            </a:r>
+            <a:r>
+              <a:rPr lang="en-US" altLang="ko-KR" sz="1600" dirty="0" err="1" smtClean="0"/>
+              <a:t>SampleMessage</a:t>
+            </a:r>
+            <a:endParaRPr lang="en-US" altLang="ko-KR" sz="1600" dirty="0" smtClean="0"/>
+          </a:p>
+          <a:p>
+            <a:pPr lvl="1">
+              <a:buFontTx/>
+              <a:buChar char="-"/>
+            </a:pPr>
+            <a:r>
+              <a:rPr lang="en-US" altLang="ko-KR" sz="1600" dirty="0" err="1" smtClean="0"/>
+              <a:t>InterpretDataInfoMessage</a:t>
+            </a:r>
+            <a:r>
+              <a:rPr lang="en-US" altLang="ko-KR" sz="1600" dirty="0" smtClean="0"/>
+              <a:t>(Array[Byte]): </a:t>
+            </a:r>
+            <a:r>
+              <a:rPr lang="en-US" altLang="ko-KR" sz="1600" dirty="0" err="1" smtClean="0"/>
+              <a:t>DataInfoMessage</a:t>
+            </a:r>
+            <a:endParaRPr lang="en-US" altLang="ko-KR" sz="1600" dirty="0" smtClean="0"/>
+          </a:p>
+          <a:p>
+            <a:pPr lvl="1">
+              <a:buFontTx/>
+              <a:buChar char="-"/>
+            </a:pPr>
+            <a:r>
+              <a:rPr lang="en-US" altLang="ko-KR" sz="1600" dirty="0" err="1" smtClean="0"/>
+              <a:t>interpretDataMessage</a:t>
+            </a:r>
+            <a:r>
+              <a:rPr lang="en-US" altLang="ko-KR" sz="1600" dirty="0" smtClean="0"/>
+              <a:t>(Array[Byte]): </a:t>
+            </a:r>
+            <a:r>
+              <a:rPr lang="en-US" altLang="ko-KR" sz="1600" dirty="0" err="1" smtClean="0"/>
+              <a:t>DataMessage</a:t>
+            </a:r>
             <a:endParaRPr lang="en-US" altLang="ko-KR" sz="1600" dirty="0"/>
           </a:p>
           <a:p>
@@ -5938,530 +5999,6 @@
           </a:p>
           <a:p>
             <a:pPr marL="457200" lvl="1" indent="0">
-              <a:buNone/>
-            </a:pPr>
-            <a:endParaRPr lang="en-US" altLang="ko-KR" dirty="0" smtClean="0"/>
-          </a:p>
-          <a:p>
-            <a:endParaRPr lang="ko-KR" altLang="en-US" dirty="0"/>
-          </a:p>
-        </p:txBody>
-      </p:sp>
-      <p:sp>
-        <p:nvSpPr>
-          <p:cNvPr id="5" name="직사각형 4"/>
-          <p:cNvSpPr/>
-          <p:nvPr/>
-        </p:nvSpPr>
-        <p:spPr>
-          <a:xfrm>
-            <a:off x="5768385" y="1978024"/>
-            <a:ext cx="6096000" cy="4708981"/>
-          </a:xfrm>
-          <a:prstGeom prst="rect">
-            <a:avLst/>
-          </a:prstGeom>
-        </p:spPr>
-        <p:txBody>
-          <a:bodyPr>
-            <a:spAutoFit/>
-          </a:bodyPr>
-          <a:lstStyle/>
-          <a:p>
-            <a:pPr marL="342900" indent="-342900">
-              <a:buFont typeface="Arial" panose="020B0604020202020204" pitchFamily="34" charset="0"/>
-              <a:buChar char="•"/>
-            </a:pPr>
-            <a:r>
-              <a:rPr lang="en-US" altLang="ko-KR" sz="2000" dirty="0" smtClean="0"/>
-              <a:t>class Slave</a:t>
-            </a:r>
-            <a:endParaRPr lang="en-US" altLang="ko-KR" sz="2000" dirty="0"/>
-          </a:p>
-          <a:p>
-            <a:pPr marL="742950" lvl="1" indent="-285750">
-              <a:buFontTx/>
-              <a:buChar char="-"/>
-            </a:pPr>
-            <a:r>
-              <a:rPr lang="en-US" altLang="ko-KR" sz="1600" dirty="0" err="1"/>
-              <a:t>i</a:t>
-            </a:r>
-            <a:r>
-              <a:rPr lang="en-US" altLang="ko-KR" sz="1600" dirty="0" err="1" smtClean="0"/>
-              <a:t>p</a:t>
-            </a:r>
-            <a:r>
-              <a:rPr lang="en-US" altLang="ko-KR" sz="1600" dirty="0" smtClean="0"/>
-              <a:t>: String</a:t>
-            </a:r>
-          </a:p>
-          <a:p>
-            <a:pPr marL="742950" lvl="1" indent="-285750">
-              <a:buFontTx/>
-              <a:buChar char="-"/>
-            </a:pPr>
-            <a:r>
-              <a:rPr lang="en-US" altLang="ko-KR" sz="1600" dirty="0"/>
-              <a:t>p</a:t>
-            </a:r>
-            <a:r>
-              <a:rPr lang="en-US" altLang="ko-KR" sz="1600" dirty="0" smtClean="0"/>
-              <a:t>ort: </a:t>
-            </a:r>
-            <a:r>
-              <a:rPr lang="en-US" altLang="ko-KR" sz="1600" dirty="0" err="1" smtClean="0"/>
-              <a:t>Int</a:t>
-            </a:r>
-            <a:endParaRPr lang="en-US" altLang="ko-KR" sz="1600" dirty="0" smtClean="0"/>
-          </a:p>
-          <a:p>
-            <a:pPr marL="742950" lvl="1" indent="-285750">
-              <a:buFontTx/>
-              <a:buChar char="-"/>
-            </a:pPr>
-            <a:r>
-              <a:rPr lang="en-US" altLang="ko-KR" sz="1600" dirty="0" err="1" smtClean="0"/>
-              <a:t>dataSize</a:t>
-            </a:r>
-            <a:r>
-              <a:rPr lang="en-US" altLang="ko-KR" sz="1600" dirty="0" smtClean="0"/>
-              <a:t>: </a:t>
-            </a:r>
-            <a:r>
-              <a:rPr lang="en-US" altLang="ko-KR" sz="1600" dirty="0" err="1" smtClean="0"/>
-              <a:t>Int</a:t>
-            </a:r>
-            <a:endParaRPr lang="en-US" altLang="ko-KR" sz="1600" dirty="0" smtClean="0"/>
-          </a:p>
-          <a:p>
-            <a:pPr marL="742950" lvl="1" indent="-285750">
-              <a:buFontTx/>
-              <a:buChar char="-"/>
-            </a:pPr>
-            <a:r>
-              <a:rPr lang="en-US" altLang="ko-KR" sz="1600" dirty="0" err="1" smtClean="0"/>
-              <a:t>toByteArray</a:t>
-            </a:r>
-            <a:r>
-              <a:rPr lang="en-US" altLang="ko-KR" sz="1600" dirty="0" smtClean="0"/>
-              <a:t>(): </a:t>
-            </a:r>
-            <a:r>
-              <a:rPr lang="en-US" altLang="ko-KR" sz="1600" dirty="0"/>
-              <a:t>Array[byte</a:t>
-            </a:r>
-            <a:r>
-              <a:rPr lang="en-US" altLang="ko-KR" sz="1600" dirty="0" smtClean="0"/>
-              <a:t>]</a:t>
-            </a:r>
-          </a:p>
-          <a:p>
-            <a:pPr marL="742950" lvl="1" indent="-285750">
-              <a:buFontTx/>
-              <a:buChar char="-"/>
-            </a:pPr>
-            <a:endParaRPr lang="en-US" altLang="ko-KR" sz="1600" dirty="0"/>
-          </a:p>
-          <a:p>
-            <a:pPr marL="342900" indent="-342900">
-              <a:buFont typeface="Arial" panose="020B0604020202020204" pitchFamily="34" charset="0"/>
-              <a:buChar char="•"/>
-            </a:pPr>
-            <a:r>
-              <a:rPr lang="en-US" altLang="ko-KR" sz="2000" dirty="0" smtClean="0"/>
-              <a:t>class </a:t>
-            </a:r>
-            <a:r>
-              <a:rPr lang="en-US" altLang="ko-KR" sz="2000" dirty="0" err="1" smtClean="0"/>
-              <a:t>SlaveInfoMessage</a:t>
-            </a:r>
-            <a:endParaRPr lang="en-US" altLang="ko-KR" sz="2000" dirty="0" smtClean="0"/>
-          </a:p>
-          <a:p>
-            <a:pPr marL="742950" lvl="1" indent="-285750">
-              <a:buFontTx/>
-              <a:buChar char="-"/>
-            </a:pPr>
-            <a:r>
-              <a:rPr lang="en-US" altLang="ko-KR" sz="1600" dirty="0" err="1" smtClean="0"/>
-              <a:t>numOfSlave</a:t>
-            </a:r>
-            <a:r>
-              <a:rPr lang="en-US" altLang="ko-KR" sz="1600" dirty="0"/>
-              <a:t>: </a:t>
-            </a:r>
-            <a:r>
-              <a:rPr lang="en-US" altLang="ko-KR" sz="1600" dirty="0" err="1" smtClean="0"/>
-              <a:t>Int</a:t>
-            </a:r>
-            <a:endParaRPr lang="en-US" altLang="ko-KR" sz="1600" dirty="0"/>
-          </a:p>
-          <a:p>
-            <a:pPr marL="742950" lvl="1" indent="-285750">
-              <a:buFontTx/>
-              <a:buChar char="-"/>
-            </a:pPr>
-            <a:r>
-              <a:rPr lang="en-US" altLang="ko-KR" sz="1600" dirty="0" err="1" smtClean="0"/>
-              <a:t>numOfPartition</a:t>
-            </a:r>
-            <a:r>
-              <a:rPr lang="en-US" altLang="ko-KR" sz="1600" dirty="0"/>
-              <a:t>: </a:t>
-            </a:r>
-            <a:r>
-              <a:rPr lang="en-US" altLang="ko-KR" sz="1600" dirty="0" err="1" smtClean="0"/>
-              <a:t>Int</a:t>
-            </a:r>
-            <a:endParaRPr lang="en-US" altLang="ko-KR" sz="1600" dirty="0" smtClean="0"/>
-          </a:p>
-          <a:p>
-            <a:pPr marL="742950" lvl="1" indent="-285750">
-              <a:buFontTx/>
-              <a:buChar char="-"/>
-            </a:pPr>
-            <a:r>
-              <a:rPr lang="en-US" altLang="ko-KR" sz="1600" dirty="0" err="1" smtClean="0"/>
-              <a:t>slaveInfos</a:t>
-            </a:r>
-            <a:r>
-              <a:rPr lang="en-US" altLang="ko-KR" sz="1600" dirty="0"/>
-              <a:t>: </a:t>
-            </a:r>
-            <a:r>
-              <a:rPr lang="en-US" altLang="ko-KR" sz="1600" dirty="0" smtClean="0"/>
-              <a:t>Vector[Slave]</a:t>
-            </a:r>
-          </a:p>
-          <a:p>
-            <a:pPr marL="742950" lvl="1" indent="-285750">
-              <a:buFontTx/>
-              <a:buChar char="-"/>
-            </a:pPr>
-            <a:r>
-              <a:rPr lang="en-US" altLang="ko-KR" sz="1600" dirty="0" err="1" smtClean="0"/>
-              <a:t>pivotValues</a:t>
-            </a:r>
-            <a:r>
-              <a:rPr lang="en-US" altLang="ko-KR" sz="1600" dirty="0"/>
-              <a:t>: </a:t>
-            </a:r>
-            <a:r>
-              <a:rPr lang="en-US" altLang="ko-KR" sz="1600" dirty="0" smtClean="0"/>
-              <a:t>Vector[Key]</a:t>
-            </a:r>
-            <a:endParaRPr lang="en-US" altLang="ko-KR" sz="1600" dirty="0"/>
-          </a:p>
-          <a:p>
-            <a:pPr marL="742950" lvl="1" indent="-285750">
-              <a:buFontTx/>
-              <a:buChar char="-"/>
-            </a:pPr>
-            <a:endParaRPr lang="en-US" altLang="ko-KR" sz="1600" dirty="0" smtClean="0"/>
-          </a:p>
-          <a:p>
-            <a:pPr marL="342900" indent="-342900">
-              <a:buFont typeface="Arial" panose="020B0604020202020204" pitchFamily="34" charset="0"/>
-              <a:buChar char="•"/>
-            </a:pPr>
-            <a:r>
-              <a:rPr lang="en-US" altLang="ko-KR" sz="2000" dirty="0" smtClean="0"/>
-              <a:t>object </a:t>
-            </a:r>
-            <a:r>
-              <a:rPr lang="en-US" altLang="ko-KR" sz="2000" dirty="0" err="1"/>
-              <a:t>SlaveInfoMessage</a:t>
-            </a:r>
-            <a:endParaRPr lang="en-US" altLang="ko-KR" sz="2000" dirty="0"/>
-          </a:p>
-          <a:p>
-            <a:pPr marL="742950" lvl="1" indent="-285750">
-              <a:buFontTx/>
-              <a:buChar char="-"/>
-            </a:pPr>
-            <a:r>
-              <a:rPr lang="en-US" altLang="ko-KR" sz="1600" dirty="0" err="1"/>
-              <a:t>analyzeMessage</a:t>
-            </a:r>
-            <a:r>
-              <a:rPr lang="en-US" altLang="ko-KR" sz="1600" dirty="0"/>
-              <a:t>(Array[byte</a:t>
-            </a:r>
-            <a:r>
-              <a:rPr lang="en-US" altLang="ko-KR" sz="1600" dirty="0" smtClean="0"/>
-              <a:t>]): </a:t>
-            </a:r>
-            <a:r>
-              <a:rPr lang="en-US" altLang="ko-KR" sz="1600" dirty="0" err="1" smtClean="0"/>
-              <a:t>SlaveInfoMessage</a:t>
-            </a:r>
-            <a:endParaRPr lang="en-US" altLang="ko-KR" sz="1600" dirty="0" smtClean="0"/>
-          </a:p>
-          <a:p>
-            <a:pPr marL="742950" lvl="1" indent="-285750">
-              <a:buFontTx/>
-              <a:buChar char="-"/>
-            </a:pPr>
-            <a:r>
-              <a:rPr lang="en-US" altLang="ko-KR" sz="1600" dirty="0" smtClean="0"/>
-              <a:t>apply(Vector[Slave], Vector[</a:t>
-            </a:r>
-            <a:r>
-              <a:rPr lang="en-US" altLang="ko-KR" sz="1600" dirty="0" err="1" smtClean="0"/>
-              <a:t>Int</a:t>
-            </a:r>
-            <a:r>
-              <a:rPr lang="en-US" altLang="ko-KR" sz="1600" dirty="0" smtClean="0"/>
-              <a:t>]): </a:t>
-            </a:r>
-            <a:r>
-              <a:rPr lang="en-US" altLang="ko-KR" sz="1600" dirty="0" err="1" smtClean="0"/>
-              <a:t>SlaveInfoMessage</a:t>
-            </a:r>
-            <a:endParaRPr lang="en-US" altLang="ko-KR" sz="1600" dirty="0" smtClean="0"/>
-          </a:p>
-          <a:p>
-            <a:pPr marL="742950" lvl="1" indent="-285750">
-              <a:buFontTx/>
-              <a:buChar char="-"/>
-            </a:pPr>
-            <a:endParaRPr lang="en-US" altLang="ko-KR" sz="1600" dirty="0" smtClean="0"/>
-          </a:p>
-          <a:p>
-            <a:pPr lvl="1"/>
-            <a:endParaRPr lang="en-US" altLang="ko-KR" sz="1600" dirty="0" smtClean="0"/>
-          </a:p>
-          <a:p>
-            <a:pPr lvl="1"/>
-            <a:endParaRPr lang="en-US" altLang="ko-KR" sz="1600" dirty="0" smtClean="0"/>
-          </a:p>
-        </p:txBody>
-      </p:sp>
-      <p:sp>
-        <p:nvSpPr>
-          <p:cNvPr id="6" name="내용 개체 틀 2"/>
-          <p:cNvSpPr txBox="1">
-            <a:spLocks/>
-          </p:cNvSpPr>
-          <p:nvPr/>
-        </p:nvSpPr>
-        <p:spPr>
-          <a:xfrm>
-            <a:off x="838199" y="4209404"/>
-            <a:ext cx="4856267" cy="4755865"/>
-          </a:xfrm>
-          <a:prstGeom prst="rect">
-            <a:avLst/>
-          </a:prstGeom>
-        </p:spPr>
-        <p:txBody>
-          <a:bodyPr vert="horz" lIns="91440" tIns="45720" rIns="91440" bIns="45720" rtlCol="0">
-            <a:normAutofit/>
-          </a:bodyPr>
-          <a:lstStyle>
-            <a:lvl1pPr marL="228600" indent="-228600" algn="l" defTabSz="914400" rtl="0" eaLnBrk="1" latinLnBrk="1" hangingPunct="1">
-              <a:lnSpc>
-                <a:spcPct val="90000"/>
-              </a:lnSpc>
-              <a:spcBef>
-                <a:spcPts val="1000"/>
-              </a:spcBef>
-              <a:buFont typeface="Arial" panose="020B0604020202020204" pitchFamily="34" charset="0"/>
-              <a:buChar char="•"/>
-              <a:defRPr sz="2800" kern="1200">
-                <a:solidFill>
-                  <a:schemeClr val="tx1"/>
-                </a:solidFill>
-                <a:latin typeface="+mn-lt"/>
-                <a:ea typeface="+mn-ea"/>
-                <a:cs typeface="+mn-cs"/>
-              </a:defRPr>
-            </a:lvl1pPr>
-            <a:lvl2pPr marL="685800" indent="-228600" algn="l" defTabSz="914400" rtl="0" eaLnBrk="1" latinLnBrk="1" hangingPunct="1">
-              <a:lnSpc>
-                <a:spcPct val="90000"/>
-              </a:lnSpc>
-              <a:spcBef>
-                <a:spcPts val="500"/>
-              </a:spcBef>
-              <a:buFont typeface="Arial" panose="020B0604020202020204" pitchFamily="34" charset="0"/>
-              <a:buChar char="•"/>
-              <a:defRPr sz="2400" kern="1200">
-                <a:solidFill>
-                  <a:schemeClr val="tx1"/>
-                </a:solidFill>
-                <a:latin typeface="+mn-lt"/>
-                <a:ea typeface="+mn-ea"/>
-                <a:cs typeface="+mn-cs"/>
-              </a:defRPr>
-            </a:lvl2pPr>
-            <a:lvl3pPr marL="1143000" indent="-228600" algn="l" defTabSz="914400" rtl="0" eaLnBrk="1" latinLnBrk="1" hangingPunct="1">
-              <a:lnSpc>
-                <a:spcPct val="90000"/>
-              </a:lnSpc>
-              <a:spcBef>
-                <a:spcPts val="500"/>
-              </a:spcBef>
-              <a:buFont typeface="Arial" panose="020B0604020202020204" pitchFamily="34" charset="0"/>
-              <a:buChar char="•"/>
-              <a:defRPr sz="2000" kern="1200">
-                <a:solidFill>
-                  <a:schemeClr val="tx1"/>
-                </a:solidFill>
-                <a:latin typeface="+mn-lt"/>
-                <a:ea typeface="+mn-ea"/>
-                <a:cs typeface="+mn-cs"/>
-              </a:defRPr>
-            </a:lvl3pPr>
-            <a:lvl4pPr marL="1600200" indent="-228600" algn="l" defTabSz="914400" rtl="0" eaLnBrk="1" latinLnBrk="1" hangingPunct="1">
-              <a:lnSpc>
-                <a:spcPct val="90000"/>
-              </a:lnSpc>
-              <a:spcBef>
-                <a:spcPts val="500"/>
-              </a:spcBef>
-              <a:buFont typeface="Arial" panose="020B0604020202020204" pitchFamily="34" charset="0"/>
-              <a:buChar char="•"/>
-              <a:defRPr sz="1800" kern="1200">
-                <a:solidFill>
-                  <a:schemeClr val="tx1"/>
-                </a:solidFill>
-                <a:latin typeface="+mn-lt"/>
-                <a:ea typeface="+mn-ea"/>
-                <a:cs typeface="+mn-cs"/>
-              </a:defRPr>
-            </a:lvl4pPr>
-            <a:lvl5pPr marL="2057400" indent="-228600" algn="l" defTabSz="914400" rtl="0" eaLnBrk="1" latinLnBrk="1" hangingPunct="1">
-              <a:lnSpc>
-                <a:spcPct val="90000"/>
-              </a:lnSpc>
-              <a:spcBef>
-                <a:spcPts val="500"/>
-              </a:spcBef>
-              <a:buFont typeface="Arial" panose="020B0604020202020204" pitchFamily="34" charset="0"/>
-              <a:buChar char="•"/>
-              <a:defRPr sz="1800" kern="1200">
-                <a:solidFill>
-                  <a:schemeClr val="tx1"/>
-                </a:solidFill>
-                <a:latin typeface="+mn-lt"/>
-                <a:ea typeface="+mn-ea"/>
-                <a:cs typeface="+mn-cs"/>
-              </a:defRPr>
-            </a:lvl5pPr>
-            <a:lvl6pPr marL="2514600" indent="-228600" algn="l" defTabSz="914400" rtl="0" eaLnBrk="1" latinLnBrk="1" hangingPunct="1">
-              <a:lnSpc>
-                <a:spcPct val="90000"/>
-              </a:lnSpc>
-              <a:spcBef>
-                <a:spcPts val="500"/>
-              </a:spcBef>
-              <a:buFont typeface="Arial" panose="020B0604020202020204" pitchFamily="34" charset="0"/>
-              <a:buChar char="•"/>
-              <a:defRPr sz="1800" kern="1200">
-                <a:solidFill>
-                  <a:schemeClr val="tx1"/>
-                </a:solidFill>
-                <a:latin typeface="+mn-lt"/>
-                <a:ea typeface="+mn-ea"/>
-                <a:cs typeface="+mn-cs"/>
-              </a:defRPr>
-            </a:lvl6pPr>
-            <a:lvl7pPr marL="2971800" indent="-228600" algn="l" defTabSz="914400" rtl="0" eaLnBrk="1" latinLnBrk="1" hangingPunct="1">
-              <a:lnSpc>
-                <a:spcPct val="90000"/>
-              </a:lnSpc>
-              <a:spcBef>
-                <a:spcPts val="500"/>
-              </a:spcBef>
-              <a:buFont typeface="Arial" panose="020B0604020202020204" pitchFamily="34" charset="0"/>
-              <a:buChar char="•"/>
-              <a:defRPr sz="1800" kern="1200">
-                <a:solidFill>
-                  <a:schemeClr val="tx1"/>
-                </a:solidFill>
-                <a:latin typeface="+mn-lt"/>
-                <a:ea typeface="+mn-ea"/>
-                <a:cs typeface="+mn-cs"/>
-              </a:defRPr>
-            </a:lvl7pPr>
-            <a:lvl8pPr marL="3429000" indent="-228600" algn="l" defTabSz="914400" rtl="0" eaLnBrk="1" latinLnBrk="1" hangingPunct="1">
-              <a:lnSpc>
-                <a:spcPct val="90000"/>
-              </a:lnSpc>
-              <a:spcBef>
-                <a:spcPts val="500"/>
-              </a:spcBef>
-              <a:buFont typeface="Arial" panose="020B0604020202020204" pitchFamily="34" charset="0"/>
-              <a:buChar char="•"/>
-              <a:defRPr sz="1800" kern="1200">
-                <a:solidFill>
-                  <a:schemeClr val="tx1"/>
-                </a:solidFill>
-                <a:latin typeface="+mn-lt"/>
-                <a:ea typeface="+mn-ea"/>
-                <a:cs typeface="+mn-cs"/>
-              </a:defRPr>
-            </a:lvl8pPr>
-            <a:lvl9pPr marL="3886200" indent="-228600" algn="l" defTabSz="914400" rtl="0" eaLnBrk="1" latinLnBrk="1" hangingPunct="1">
-              <a:lnSpc>
-                <a:spcPct val="90000"/>
-              </a:lnSpc>
-              <a:spcBef>
-                <a:spcPts val="500"/>
-              </a:spcBef>
-              <a:buFont typeface="Arial" panose="020B0604020202020204" pitchFamily="34" charset="0"/>
-              <a:buChar char="•"/>
-              <a:defRPr sz="1800" kern="1200">
-                <a:solidFill>
-                  <a:schemeClr val="tx1"/>
-                </a:solidFill>
-                <a:latin typeface="+mn-lt"/>
-                <a:ea typeface="+mn-ea"/>
-                <a:cs typeface="+mn-cs"/>
-              </a:defRPr>
-            </a:lvl9pPr>
-          </a:lstStyle>
-          <a:p>
-            <a:r>
-              <a:rPr lang="en-US" altLang="ko-KR" sz="2000" dirty="0"/>
-              <a:t>a</a:t>
-            </a:r>
-            <a:r>
-              <a:rPr lang="en-US" altLang="ko-KR" sz="2000" dirty="0" smtClean="0"/>
-              <a:t>bstract class </a:t>
-            </a:r>
-            <a:r>
-              <a:rPr lang="en-US" altLang="ko-KR" sz="2000" dirty="0" err="1" smtClean="0"/>
-              <a:t>MessageType</a:t>
-            </a:r>
-            <a:endParaRPr lang="en-US" altLang="ko-KR" sz="2000" dirty="0" smtClean="0"/>
-          </a:p>
-          <a:p>
-            <a:r>
-              <a:rPr lang="en-US" altLang="ko-KR" sz="2000" dirty="0"/>
-              <a:t>c</a:t>
-            </a:r>
-            <a:r>
-              <a:rPr lang="en-US" altLang="ko-KR" sz="2000" dirty="0" smtClean="0"/>
-              <a:t>ase class …Message</a:t>
-            </a:r>
-            <a:endParaRPr lang="en-US" altLang="ko-KR" sz="1600" dirty="0" smtClean="0"/>
-          </a:p>
-          <a:p>
-            <a:endParaRPr lang="en-US" altLang="ko-KR" sz="2000" dirty="0" smtClean="0"/>
-          </a:p>
-          <a:p>
-            <a:pPr lvl="1">
-              <a:buFontTx/>
-              <a:buChar char="-"/>
-            </a:pPr>
-            <a:endParaRPr lang="en-US" altLang="ko-KR" sz="1600" dirty="0" smtClean="0"/>
-          </a:p>
-          <a:p>
-            <a:pPr marL="457200" lvl="1" indent="0">
-              <a:buFont typeface="Arial" panose="020B0604020202020204" pitchFamily="34" charset="0"/>
               <a:buNone/>
             </a:pPr>
             <a:endParaRPr lang="en-US" altLang="ko-KR" dirty="0" smtClean="0"/>
@@ -6533,21 +6070,21 @@
       </p:sp>
       <p:sp>
         <p:nvSpPr>
-          <p:cNvPr id="6" name="직사각형 5"/>
+          <p:cNvPr id="5" name="직사각형 4"/>
           <p:cNvSpPr/>
           <p:nvPr/>
         </p:nvSpPr>
         <p:spPr>
           <a:xfrm>
-            <a:off x="838200" y="1924306"/>
-            <a:ext cx="6096000" cy="3416320"/>
+            <a:off x="970412" y="2020066"/>
+            <a:ext cx="10383387" cy="4616648"/>
           </a:xfrm>
           <a:prstGeom prst="rect">
             <a:avLst/>
           </a:prstGeom>
         </p:spPr>
         <p:txBody>
-          <a:bodyPr>
+          <a:bodyPr wrap="square">
             <a:spAutoFit/>
           </a:bodyPr>
           <a:lstStyle/>
@@ -6558,13 +6095,9 @@
             </a:pPr>
             <a:r>
               <a:rPr lang="en-US" altLang="ko-KR" sz="2000" dirty="0" smtClean="0"/>
-              <a:t>class </a:t>
-            </a:r>
-            <a:r>
-              <a:rPr lang="en-US" altLang="ko-KR" sz="2000" dirty="0" err="1" smtClean="0"/>
-              <a:t>SampleMessage</a:t>
-            </a:r>
-            <a:endParaRPr lang="en-US" altLang="ko-KR" sz="2000" dirty="0" smtClean="0"/>
+              <a:t>class Slave</a:t>
+            </a:r>
+            <a:endParaRPr lang="en-US" altLang="ko-KR" sz="2000" dirty="0"/>
           </a:p>
           <a:p>
             <a:pPr marL="742950" lvl="1" indent="-285750">
@@ -6572,14 +6105,73 @@
               <a:buChar char="-"/>
             </a:pPr>
             <a:r>
+              <a:rPr lang="en-US" altLang="ko-KR" sz="1600" dirty="0" err="1"/>
+              <a:t>i</a:t>
+            </a:r>
+            <a:r>
+              <a:rPr lang="en-US" altLang="ko-KR" sz="1600" dirty="0" err="1" smtClean="0"/>
+              <a:t>p</a:t>
+            </a:r>
+            <a:r>
+              <a:rPr lang="en-US" altLang="ko-KR" sz="1600" dirty="0" smtClean="0"/>
+              <a:t>: String</a:t>
+            </a:r>
+          </a:p>
+          <a:p>
+            <a:pPr marL="742950" lvl="1" indent="-285750">
+              <a:buFontTx/>
+              <a:buChar char="-"/>
+            </a:pPr>
+            <a:r>
               <a:rPr lang="en-US" altLang="ko-KR" sz="1600" dirty="0"/>
-              <a:t>type Key = </a:t>
+              <a:t>p</a:t>
             </a:r>
             <a:r>
               <a:rPr lang="en-US" altLang="ko-KR" sz="1600" dirty="0" smtClean="0"/>
-              <a:t>Array[Byte]</a:t>
+              <a:t>ort: </a:t>
+            </a:r>
+            <a:r>
+              <a:rPr lang="en-US" altLang="ko-KR" sz="1600" dirty="0" err="1" smtClean="0"/>
+              <a:t>Int</a:t>
             </a:r>
             <a:endParaRPr lang="en-US" altLang="ko-KR" sz="1600" dirty="0" smtClean="0"/>
+          </a:p>
+          <a:p>
+            <a:pPr marL="742950" lvl="1" indent="-285750">
+              <a:buFontTx/>
+              <a:buChar char="-"/>
+            </a:pPr>
+            <a:r>
+              <a:rPr lang="en-US" altLang="ko-KR" sz="1600" dirty="0" err="1" smtClean="0"/>
+              <a:t>dataSize</a:t>
+            </a:r>
+            <a:r>
+              <a:rPr lang="en-US" altLang="ko-KR" sz="1600" dirty="0" smtClean="0"/>
+              <a:t>: </a:t>
+            </a:r>
+            <a:r>
+              <a:rPr lang="en-US" altLang="ko-KR" sz="1600" dirty="0" err="1" smtClean="0"/>
+              <a:t>Int</a:t>
+            </a:r>
+            <a:endParaRPr lang="en-US" altLang="ko-KR" sz="1600" dirty="0" smtClean="0"/>
+          </a:p>
+          <a:p>
+            <a:pPr marL="742950" lvl="1" indent="-285750">
+              <a:buFontTx/>
+              <a:buChar char="-"/>
+            </a:pPr>
+            <a:r>
+              <a:rPr lang="en-US" altLang="ko-KR" sz="1600" dirty="0" err="1" smtClean="0"/>
+              <a:t>toByteArray</a:t>
+            </a:r>
+            <a:r>
+              <a:rPr lang="en-US" altLang="ko-KR" sz="1600" dirty="0" smtClean="0"/>
+              <a:t>(): </a:t>
+            </a:r>
+            <a:r>
+              <a:rPr lang="en-US" altLang="ko-KR" sz="1600" dirty="0" smtClean="0"/>
+              <a:t>Array[byte]</a:t>
+            </a:r>
           </a:p>
           <a:p>
             <a:pPr marL="742950" lvl="1" indent="-285750">
@@ -6589,68 +6181,31 @@
             <a:endParaRPr lang="en-US" altLang="ko-KR" sz="1600" dirty="0"/>
           </a:p>
           <a:p>
-            <a:pPr marL="742950" lvl="1" indent="-285750">
-              <a:buFontTx/>
-              <a:buChar char="-"/>
+            <a:pPr marL="285750" indent="-285750">
+              <a:buFont typeface="Arial" panose="020B0604020202020204" pitchFamily="34" charset="0"/>
+              <a:buChar char="•"/>
             </a:pPr>
             <a:r>
-              <a:rPr lang="en-US" altLang="ko-KR" sz="1600" dirty="0" err="1" smtClean="0"/>
-              <a:t>dataSize</a:t>
-            </a:r>
-            <a:r>
-              <a:rPr lang="en-US" altLang="ko-KR" sz="1600" dirty="0" smtClean="0"/>
-              <a:t>: Long</a:t>
-            </a:r>
-            <a:endParaRPr lang="en-US" altLang="ko-KR" sz="1600" dirty="0" smtClean="0"/>
-          </a:p>
-          <a:p>
-            <a:pPr marL="742950" lvl="1" indent="-285750">
-              <a:buFontTx/>
-              <a:buChar char="-"/>
-            </a:pPr>
-            <a:r>
-              <a:rPr lang="en-US" altLang="ko-KR" sz="1600" dirty="0" err="1" smtClean="0"/>
-              <a:t>sampleSize</a:t>
-            </a:r>
-            <a:r>
-              <a:rPr lang="en-US" altLang="ko-KR" sz="1600" dirty="0" smtClean="0"/>
-              <a:t>: </a:t>
-            </a:r>
-            <a:r>
-              <a:rPr lang="en-US" altLang="ko-KR" sz="1600" dirty="0" err="1" smtClean="0"/>
-              <a:t>Int</a:t>
-            </a:r>
-            <a:endParaRPr lang="en-US" altLang="ko-KR" sz="1600" dirty="0" smtClean="0"/>
-          </a:p>
-          <a:p>
-            <a:pPr marL="742950" lvl="1" indent="-285750">
-              <a:buFontTx/>
-              <a:buChar char="-"/>
-            </a:pPr>
-            <a:r>
-              <a:rPr lang="en-US" altLang="ko-KR" sz="1600" dirty="0"/>
-              <a:t>s</a:t>
-            </a:r>
-            <a:r>
-              <a:rPr lang="en-US" altLang="ko-KR" sz="1600" dirty="0" smtClean="0"/>
-              <a:t>amples: </a:t>
-            </a:r>
-            <a:r>
-              <a:rPr lang="en-US" altLang="ko-KR" sz="1600" dirty="0" smtClean="0"/>
-              <a:t>List[Key</a:t>
-            </a:r>
-            <a:r>
-              <a:rPr lang="en-US" altLang="ko-KR" sz="1600" dirty="0" smtClean="0"/>
+              <a:rPr lang="en-US" altLang="ko-KR" sz="2000" dirty="0" smtClean="0"/>
+              <a:t>type </a:t>
+            </a:r>
+            <a:r>
+              <a:rPr lang="en-US" altLang="ko-KR" sz="2000" dirty="0"/>
+              <a:t>Key = Array[Byte</a:t>
+            </a:r>
+            <a:r>
+              <a:rPr lang="en-US" altLang="ko-KR" sz="2000" dirty="0" smtClean="0"/>
               <a:t>]</a:t>
             </a:r>
+            <a:endParaRPr lang="en-US" altLang="ko-KR" sz="2000" dirty="0"/>
+          </a:p>
+          <a:p>
+            <a:pPr lvl="1"/>
             <a:endParaRPr lang="en-US" altLang="ko-KR" sz="1600" dirty="0"/>
           </a:p>
           <a:p>
-            <a:pPr marL="742950" lvl="1" indent="-285750">
-              <a:buFontTx/>
-              <a:buChar char="-"/>
-            </a:pPr>
-            <a:endParaRPr lang="en-US" altLang="ko-KR" sz="1600" dirty="0" smtClean="0"/>
+            <a:pPr lvl="1"/>
+            <a:endParaRPr lang="en-US" altLang="ko-KR" sz="1600" dirty="0"/>
           </a:p>
           <a:p>
             <a:pPr marL="342900" indent="-342900">
@@ -6658,186 +6213,129 @@
               <a:buChar char="•"/>
             </a:pPr>
             <a:r>
-              <a:rPr lang="en-US" altLang="ko-KR" sz="2000" dirty="0" smtClean="0"/>
-              <a:t>object </a:t>
-            </a:r>
-            <a:r>
-              <a:rPr lang="en-US" altLang="ko-KR" sz="2000" dirty="0" err="1" smtClean="0"/>
-              <a:t>SampleMessage</a:t>
-            </a:r>
-            <a:endParaRPr lang="en-US" altLang="ko-KR" sz="2000" dirty="0"/>
-          </a:p>
-          <a:p>
-            <a:pPr marL="742950" lvl="1" indent="-285750">
-              <a:buFontTx/>
-              <a:buChar char="-"/>
-            </a:pPr>
-            <a:r>
-              <a:rPr lang="en-US" altLang="ko-KR" sz="1600" dirty="0" err="1"/>
-              <a:t>analyzeMessage</a:t>
-            </a:r>
-            <a:r>
-              <a:rPr lang="en-US" altLang="ko-KR" sz="1600" dirty="0"/>
-              <a:t>(Array[byte]): </a:t>
-            </a:r>
-            <a:r>
-              <a:rPr lang="en-US" altLang="ko-KR" sz="1600" dirty="0" err="1" smtClean="0"/>
-              <a:t>SampleMessage</a:t>
-            </a:r>
-            <a:endParaRPr lang="en-US" altLang="ko-KR" sz="1600" dirty="0" smtClean="0"/>
-          </a:p>
-          <a:p>
-            <a:pPr marL="742950" lvl="1" indent="-285750">
-              <a:buFontTx/>
-              <a:buChar char="-"/>
-            </a:pPr>
-            <a:r>
-              <a:rPr lang="en-US" altLang="ko-KR" sz="1600" dirty="0" smtClean="0"/>
-              <a:t>apply(Long, </a:t>
-            </a:r>
-            <a:r>
-              <a:rPr lang="en-US" altLang="ko-KR" sz="1600" dirty="0" err="1" smtClean="0"/>
-              <a:t>Int</a:t>
-            </a:r>
-            <a:r>
-              <a:rPr lang="en-US" altLang="ko-KR" sz="1600" dirty="0"/>
-              <a:t>, Array[byte]): </a:t>
-            </a:r>
-            <a:r>
-              <a:rPr lang="en-US" altLang="ko-KR" sz="1600" dirty="0" err="1" smtClean="0"/>
-              <a:t>SampleMessage</a:t>
-            </a:r>
-            <a:endParaRPr lang="en-US" altLang="ko-KR" sz="1600" dirty="0" smtClean="0"/>
-          </a:p>
-          <a:p>
-            <a:pPr marL="742950" lvl="1" indent="-285750">
-              <a:buFontTx/>
-              <a:buChar char="-"/>
-            </a:pPr>
-            <a:endParaRPr lang="en-US" altLang="ko-KR" sz="1600" dirty="0" smtClean="0"/>
-          </a:p>
-          <a:p>
-            <a:pPr lvl="1"/>
-            <a:endParaRPr lang="en-US" altLang="ko-KR" sz="1600" dirty="0" smtClean="0"/>
-          </a:p>
-          <a:p>
-            <a:pPr lvl="1"/>
-            <a:endParaRPr lang="en-US" altLang="ko-KR" sz="1600" dirty="0" smtClean="0"/>
-          </a:p>
-        </p:txBody>
-      </p:sp>
-      <p:sp>
-        <p:nvSpPr>
-          <p:cNvPr id="8" name="직사각형 7"/>
-          <p:cNvSpPr/>
-          <p:nvPr/>
-        </p:nvSpPr>
-        <p:spPr>
-          <a:xfrm>
-            <a:off x="838200" y="5270785"/>
-            <a:ext cx="6096000" cy="1138773"/>
-          </a:xfrm>
-          <a:prstGeom prst="rect">
-            <a:avLst/>
-          </a:prstGeom>
-        </p:spPr>
-        <p:txBody>
-          <a:bodyPr>
-            <a:spAutoFit/>
-          </a:bodyPr>
-          <a:lstStyle/>
+              <a:rPr lang="en-US" altLang="ko-KR" dirty="0"/>
+              <a:t>c</a:t>
+            </a:r>
+            <a:r>
+              <a:rPr lang="en-US" altLang="ko-KR" dirty="0" smtClean="0"/>
+              <a:t>ase class </a:t>
+            </a:r>
+            <a:r>
+              <a:rPr lang="en-US" altLang="ko-KR" dirty="0" err="1" smtClean="0"/>
+              <a:t>SlaveInfoMessage</a:t>
+            </a:r>
+            <a:r>
+              <a:rPr lang="en-US" altLang="ko-KR" dirty="0" smtClean="0"/>
+              <a:t>(</a:t>
+            </a:r>
+            <a:r>
+              <a:rPr lang="en-US" altLang="ko-KR" dirty="0" err="1" smtClean="0"/>
+              <a:t>val</a:t>
+            </a:r>
+            <a:r>
+              <a:rPr lang="en-US" altLang="ko-KR" dirty="0" smtClean="0"/>
+              <a:t> </a:t>
+            </a:r>
+            <a:r>
+              <a:rPr lang="en-US" altLang="ko-KR" dirty="0" err="1" smtClean="0"/>
+              <a:t>slaveInfos</a:t>
+            </a:r>
+            <a:r>
+              <a:rPr lang="en-US" altLang="ko-KR" dirty="0" smtClean="0"/>
+              <a:t>: Vector[Slave], </a:t>
+            </a:r>
+            <a:r>
+              <a:rPr lang="en-US" altLang="ko-KR" dirty="0" err="1" smtClean="0"/>
+              <a:t>val</a:t>
+            </a:r>
+            <a:r>
+              <a:rPr lang="en-US" altLang="ko-KR" dirty="0" smtClean="0"/>
+              <a:t> </a:t>
+            </a:r>
+            <a:r>
+              <a:rPr lang="en-US" altLang="ko-KR" dirty="0" err="1" smtClean="0"/>
+              <a:t>pivotValues</a:t>
+            </a:r>
+            <a:r>
+              <a:rPr lang="en-US" altLang="ko-KR" dirty="0" smtClean="0"/>
+              <a:t>) extends Message</a:t>
+            </a:r>
+          </a:p>
           <a:p>
             <a:pPr marL="342900" indent="-342900">
               <a:buFont typeface="Arial" panose="020B0604020202020204" pitchFamily="34" charset="0"/>
               <a:buChar char="•"/>
             </a:pPr>
             <a:r>
-              <a:rPr lang="en-US" altLang="ko-KR" sz="2000" dirty="0"/>
-              <a:t>o</a:t>
-            </a:r>
-            <a:r>
-              <a:rPr lang="en-US" altLang="ko-KR" sz="2000" dirty="0" smtClean="0"/>
-              <a:t>bject </a:t>
-            </a:r>
-            <a:r>
-              <a:rPr lang="en-US" altLang="ko-KR" sz="2000" dirty="0" err="1" smtClean="0"/>
-              <a:t>DoneMessage</a:t>
-            </a:r>
-            <a:endParaRPr lang="en-US" altLang="ko-KR" sz="1600" dirty="0" smtClean="0"/>
-          </a:p>
-          <a:p>
-            <a:pPr marL="742950" lvl="1" indent="-285750">
-              <a:buFontTx/>
-              <a:buChar char="-"/>
-            </a:pPr>
-            <a:endParaRPr lang="en-US" altLang="ko-KR" sz="1600" dirty="0" smtClean="0"/>
-          </a:p>
-          <a:p>
-            <a:pPr lvl="1"/>
-            <a:endParaRPr lang="en-US" altLang="ko-KR" sz="1600" dirty="0" smtClean="0"/>
-          </a:p>
-          <a:p>
-            <a:pPr lvl="1"/>
-            <a:endParaRPr lang="en-US" altLang="ko-KR" sz="1600" dirty="0" smtClean="0"/>
-          </a:p>
-        </p:txBody>
-      </p:sp>
-      <p:sp>
-        <p:nvSpPr>
-          <p:cNvPr id="11" name="직사각형 10"/>
-          <p:cNvSpPr/>
-          <p:nvPr/>
-        </p:nvSpPr>
-        <p:spPr>
-          <a:xfrm>
-            <a:off x="6009305" y="1730263"/>
-            <a:ext cx="6096000" cy="2492990"/>
-          </a:xfrm>
-          <a:prstGeom prst="rect">
-            <a:avLst/>
-          </a:prstGeom>
-        </p:spPr>
-        <p:txBody>
-          <a:bodyPr>
-            <a:spAutoFit/>
-          </a:bodyPr>
-          <a:lstStyle/>
+              <a:rPr lang="en-US" altLang="ko-KR" dirty="0"/>
+              <a:t>c</a:t>
+            </a:r>
+            <a:r>
+              <a:rPr lang="en-US" altLang="ko-KR" dirty="0" smtClean="0"/>
+              <a:t>ase class </a:t>
+            </a:r>
+            <a:r>
+              <a:rPr lang="en-US" altLang="ko-KR" dirty="0" err="1" smtClean="0"/>
+              <a:t>SampleMessage</a:t>
+            </a:r>
+            <a:r>
+              <a:rPr lang="en-US" altLang="ko-KR" dirty="0" smtClean="0"/>
+              <a:t>(</a:t>
+            </a:r>
+            <a:r>
+              <a:rPr lang="en-US" altLang="ko-KR" dirty="0" err="1" smtClean="0"/>
+              <a:t>val</a:t>
+            </a:r>
+            <a:r>
+              <a:rPr lang="en-US" altLang="ko-KR" dirty="0" smtClean="0"/>
+              <a:t> </a:t>
+            </a:r>
+            <a:r>
+              <a:rPr lang="en-US" altLang="ko-KR" dirty="0" err="1" smtClean="0"/>
+              <a:t>dataSize</a:t>
+            </a:r>
+            <a:r>
+              <a:rPr lang="en-US" altLang="ko-KR" dirty="0" smtClean="0"/>
+              <a:t>: </a:t>
+            </a:r>
+            <a:r>
+              <a:rPr lang="en-US" altLang="ko-KR" dirty="0" err="1" smtClean="0"/>
+              <a:t>Int</a:t>
+            </a:r>
+            <a:r>
+              <a:rPr lang="en-US" altLang="ko-KR" dirty="0" smtClean="0"/>
+              <a:t>, </a:t>
+            </a:r>
+            <a:r>
+              <a:rPr lang="en-US" altLang="ko-KR" dirty="0" err="1" smtClean="0"/>
+              <a:t>val</a:t>
+            </a:r>
+            <a:r>
+              <a:rPr lang="en-US" altLang="ko-KR" dirty="0" smtClean="0"/>
+              <a:t> samples: Vector[Key]) extends Message</a:t>
+            </a:r>
+          </a:p>
           <a:p>
             <a:pPr marL="342900" indent="-342900">
               <a:buFont typeface="Arial" panose="020B0604020202020204" pitchFamily="34" charset="0"/>
               <a:buChar char="•"/>
             </a:pPr>
             <a:r>
-              <a:rPr lang="en-US" altLang="ko-KR" sz="2000" dirty="0" smtClean="0"/>
-              <a:t>class </a:t>
-            </a:r>
-            <a:r>
-              <a:rPr lang="en-US" altLang="ko-KR" sz="2000" dirty="0" err="1" smtClean="0"/>
-              <a:t>DataInfoMessage</a:t>
-            </a:r>
-            <a:endParaRPr lang="en-US" altLang="ko-KR" sz="2000" dirty="0" smtClean="0"/>
-          </a:p>
-          <a:p>
-            <a:pPr marL="742950" lvl="1" indent="-285750">
-              <a:buFontTx/>
-              <a:buChar char="-"/>
-            </a:pPr>
-            <a:r>
-              <a:rPr lang="en-US" altLang="ko-KR" sz="1600" dirty="0" smtClean="0"/>
-              <a:t>size: Vector[</a:t>
-            </a:r>
-            <a:r>
-              <a:rPr lang="en-US" altLang="ko-KR" sz="1600" dirty="0" err="1" smtClean="0"/>
-              <a:t>Int</a:t>
-            </a:r>
-            <a:r>
-              <a:rPr lang="en-US" altLang="ko-KR" sz="1600" dirty="0" smtClean="0"/>
-              <a:t>]</a:t>
-            </a:r>
-          </a:p>
-          <a:p>
-            <a:pPr lvl="1"/>
-            <a:endParaRPr lang="en-US" altLang="ko-KR" sz="1600" dirty="0" smtClean="0"/>
+              <a:rPr lang="en-US" altLang="ko-KR" dirty="0" smtClean="0"/>
+              <a:t>object</a:t>
+            </a:r>
+            <a:r>
+              <a:rPr lang="en-US" altLang="ko-KR" dirty="0" smtClean="0"/>
+              <a:t> </a:t>
+            </a:r>
+            <a:r>
+              <a:rPr lang="en-US" altLang="ko-KR" dirty="0" err="1" smtClean="0"/>
+              <a:t>DoneMessage</a:t>
+            </a:r>
+            <a:r>
+              <a:rPr lang="en-US" altLang="ko-KR" dirty="0" smtClean="0"/>
+              <a:t> extends Message</a:t>
+            </a:r>
           </a:p>
           <a:p>
             <a:pPr marL="342900" indent="-342900">
@@ -6845,269 +6343,121 @@
               <a:buChar char="•"/>
             </a:pPr>
             <a:r>
-              <a:rPr lang="en-US" altLang="ko-KR" sz="2000" dirty="0" smtClean="0"/>
-              <a:t>object </a:t>
-            </a:r>
-            <a:r>
-              <a:rPr lang="en-US" altLang="ko-KR" sz="2000" dirty="0" err="1"/>
+              <a:rPr lang="en-US" altLang="ko-KR" dirty="0"/>
+              <a:t>c</a:t>
+            </a:r>
+            <a:r>
+              <a:rPr lang="en-US" altLang="ko-KR" dirty="0" smtClean="0"/>
+              <a:t>ase class </a:t>
+            </a:r>
+            <a:r>
+              <a:rPr lang="en-US" altLang="ko-KR" dirty="0" err="1" smtClean="0"/>
               <a:t>DataInfoMessage</a:t>
             </a:r>
-            <a:endParaRPr lang="en-US" altLang="ko-KR" sz="2000" dirty="0"/>
-          </a:p>
-          <a:p>
-            <a:pPr marL="742950" lvl="1" indent="-285750">
-              <a:buFontTx/>
-              <a:buChar char="-"/>
-            </a:pPr>
-            <a:r>
-              <a:rPr lang="en-US" altLang="ko-KR" sz="1600" dirty="0" err="1" smtClean="0"/>
-              <a:t>analyzeMessage</a:t>
-            </a:r>
-            <a:r>
-              <a:rPr lang="en-US" altLang="ko-KR" sz="1600" dirty="0" smtClean="0"/>
-              <a:t>(Array[Byte</a:t>
-            </a:r>
-            <a:r>
-              <a:rPr lang="en-US" altLang="ko-KR" sz="1600" dirty="0"/>
-              <a:t>]): </a:t>
-            </a:r>
-            <a:r>
-              <a:rPr lang="en-US" altLang="ko-KR" sz="1600" dirty="0" err="1"/>
-              <a:t>DataInfoMessage</a:t>
-            </a:r>
-            <a:endParaRPr lang="en-US" altLang="ko-KR" sz="1600" dirty="0" smtClean="0"/>
-          </a:p>
-          <a:p>
-            <a:pPr marL="742950" lvl="1" indent="-285750">
-              <a:buFontTx/>
-              <a:buChar char="-"/>
-            </a:pPr>
-            <a:r>
-              <a:rPr lang="en-US" altLang="ko-KR" sz="1600" dirty="0" smtClean="0"/>
-              <a:t>apply(Vector[</a:t>
-            </a:r>
-            <a:r>
-              <a:rPr lang="en-US" altLang="ko-KR" sz="1600" dirty="0" err="1" smtClean="0"/>
+            <a:r>
+              <a:rPr lang="en-US" altLang="ko-KR" dirty="0" smtClean="0"/>
+              <a:t>(</a:t>
+            </a:r>
+            <a:r>
+              <a:rPr lang="en-US" altLang="ko-KR" dirty="0" err="1" smtClean="0"/>
+              <a:t>val</a:t>
+            </a:r>
+            <a:r>
+              <a:rPr lang="en-US" altLang="ko-KR" dirty="0" smtClean="0"/>
+              <a:t> sizes: Vector[</a:t>
+            </a:r>
+            <a:r>
+              <a:rPr lang="en-US" altLang="ko-KR" dirty="0" err="1" smtClean="0"/>
               <a:t>Int</a:t>
             </a:r>
             <a:r>
-              <a:rPr lang="en-US" altLang="ko-KR" sz="1600" dirty="0"/>
-              <a:t>]): </a:t>
-            </a:r>
-            <a:r>
-              <a:rPr lang="en-US" altLang="ko-KR" sz="1600" dirty="0" err="1"/>
-              <a:t>DataInfoMessage</a:t>
-            </a:r>
-            <a:endParaRPr lang="en-US" altLang="ko-KR" sz="1600" dirty="0" smtClean="0"/>
-          </a:p>
-          <a:p>
-            <a:pPr marL="742950" lvl="1" indent="-285750">
-              <a:buFontTx/>
-              <a:buChar char="-"/>
-            </a:pPr>
-            <a:endParaRPr lang="en-US" altLang="ko-KR" sz="1600" dirty="0" smtClean="0"/>
-          </a:p>
-          <a:p>
-            <a:pPr lvl="1"/>
-            <a:endParaRPr lang="en-US" altLang="ko-KR" sz="1600" dirty="0" smtClean="0"/>
-          </a:p>
-          <a:p>
-            <a:pPr lvl="1"/>
-            <a:endParaRPr lang="en-US" altLang="ko-KR" sz="1600" dirty="0" smtClean="0"/>
-          </a:p>
-        </p:txBody>
-      </p:sp>
-      <p:sp>
-        <p:nvSpPr>
-          <p:cNvPr id="12" name="직사각형 11"/>
-          <p:cNvSpPr/>
-          <p:nvPr/>
-        </p:nvSpPr>
-        <p:spPr>
-          <a:xfrm>
-            <a:off x="6009305" y="3965654"/>
-            <a:ext cx="6096000" cy="2923877"/>
-          </a:xfrm>
-          <a:prstGeom prst="rect">
-            <a:avLst/>
-          </a:prstGeom>
-        </p:spPr>
-        <p:txBody>
-          <a:bodyPr>
-            <a:spAutoFit/>
-          </a:bodyPr>
-          <a:lstStyle/>
+              <a:rPr lang="en-US" altLang="ko-KR" dirty="0" smtClean="0"/>
+              <a:t>]) extends Message</a:t>
+            </a:r>
+          </a:p>
           <a:p>
             <a:pPr marL="342900" indent="-342900">
               <a:buFont typeface="Arial" panose="020B0604020202020204" pitchFamily="34" charset="0"/>
               <a:buChar char="•"/>
             </a:pPr>
             <a:r>
-              <a:rPr lang="en-US" altLang="ko-KR" sz="2000" dirty="0" smtClean="0"/>
-              <a:t>class </a:t>
-            </a:r>
-            <a:r>
-              <a:rPr lang="en-US" altLang="ko-KR" sz="2000" dirty="0" err="1" smtClean="0"/>
+              <a:rPr lang="en-US" altLang="ko-KR" dirty="0"/>
+              <a:t>c</a:t>
+            </a:r>
+            <a:r>
+              <a:rPr lang="en-US" altLang="ko-KR" dirty="0" smtClean="0"/>
+              <a:t>ase class </a:t>
+            </a:r>
+            <a:r>
+              <a:rPr lang="en-US" altLang="ko-KR" dirty="0" err="1" smtClean="0"/>
               <a:t>DataMessage</a:t>
             </a:r>
-            <a:endParaRPr lang="en-US" altLang="ko-KR" sz="2000" dirty="0" smtClean="0"/>
-          </a:p>
-          <a:p>
-            <a:pPr marL="742950" lvl="1" indent="-285750">
-              <a:buFontTx/>
-              <a:buChar char="-"/>
-            </a:pPr>
-            <a:r>
-              <a:rPr lang="en-US" altLang="ko-KR" sz="1600" dirty="0" err="1" smtClean="0"/>
+            <a:r>
+              <a:rPr lang="en-US" altLang="ko-KR" dirty="0" smtClean="0"/>
+              <a:t>(</a:t>
+            </a:r>
+            <a:r>
+              <a:rPr lang="en-US" altLang="ko-KR" dirty="0" err="1" smtClean="0"/>
+              <a:t>val</a:t>
+            </a:r>
+            <a:r>
+              <a:rPr lang="en-US" altLang="ko-KR" dirty="0" smtClean="0"/>
+              <a:t> </a:t>
+            </a:r>
+            <a:r>
+              <a:rPr lang="en-US" altLang="ko-KR" dirty="0" err="1" smtClean="0"/>
               <a:t>partitionNum</a:t>
             </a:r>
             <a:r>
-              <a:rPr lang="en-US" altLang="ko-KR" sz="1600" dirty="0" smtClean="0"/>
+              <a:rPr lang="en-US" altLang="ko-KR" dirty="0" smtClean="0"/>
               <a:t>: </a:t>
             </a:r>
             <a:r>
-              <a:rPr lang="en-US" altLang="ko-KR" sz="1600" dirty="0" err="1" smtClean="0"/>
+              <a:rPr lang="en-US" altLang="ko-KR" dirty="0" err="1" smtClean="0"/>
               <a:t>Int</a:t>
             </a:r>
-            <a:endParaRPr lang="en-US" altLang="ko-KR" sz="1600" dirty="0" smtClean="0"/>
-          </a:p>
-          <a:p>
-            <a:pPr marL="742950" lvl="1" indent="-285750">
-              <a:buFontTx/>
-              <a:buChar char="-"/>
-            </a:pPr>
-            <a:r>
-              <a:rPr lang="en-US" altLang="ko-KR" sz="1600" dirty="0" err="1"/>
-              <a:t>i</a:t>
-            </a:r>
-            <a:r>
-              <a:rPr lang="en-US" altLang="ko-KR" sz="1600" dirty="0" err="1" smtClean="0"/>
-              <a:t>dx</a:t>
-            </a:r>
-            <a:r>
-              <a:rPr lang="en-US" altLang="ko-KR" sz="1600" dirty="0" smtClean="0"/>
+            <a:r>
+              <a:rPr lang="en-US" altLang="ko-KR" dirty="0" smtClean="0"/>
+              <a:t>, </a:t>
+            </a:r>
+            <a:r>
+              <a:rPr lang="en-US" altLang="ko-KR" dirty="0" err="1" smtClean="0"/>
+              <a:t>val</a:t>
+            </a:r>
+            <a:r>
+              <a:rPr lang="en-US" altLang="ko-KR" dirty="0" smtClean="0"/>
+              <a:t> </a:t>
+            </a:r>
+            <a:r>
+              <a:rPr lang="en-US" altLang="ko-KR" dirty="0" err="1" smtClean="0"/>
+              <a:t>idx</a:t>
+            </a:r>
+            <a:r>
+              <a:rPr lang="en-US" altLang="ko-KR" dirty="0" smtClean="0"/>
               <a:t>: </a:t>
             </a:r>
             <a:r>
-              <a:rPr lang="en-US" altLang="ko-KR" sz="1600" dirty="0" err="1" smtClean="0"/>
+              <a:rPr lang="en-US" altLang="ko-KR" dirty="0" err="1" smtClean="0"/>
               <a:t>Int</a:t>
             </a:r>
-            <a:endParaRPr lang="en-US" altLang="ko-KR" sz="1600" dirty="0" smtClean="0"/>
-          </a:p>
-          <a:p>
-            <a:pPr marL="742950" lvl="1" indent="-285750">
-              <a:buFontTx/>
-              <a:buChar char="-"/>
-            </a:pPr>
-            <a:r>
-              <a:rPr lang="en-US" altLang="ko-KR" sz="1600" dirty="0"/>
-              <a:t>d</a:t>
-            </a:r>
-            <a:r>
-              <a:rPr lang="en-US" altLang="ko-KR" sz="1600" dirty="0" smtClean="0"/>
-              <a:t>ata</a:t>
-            </a:r>
-            <a:r>
-              <a:rPr lang="en-US" altLang="ko-KR" sz="1600" dirty="0"/>
-              <a:t>: Array[byte]</a:t>
-            </a:r>
-            <a:endParaRPr lang="en-US" altLang="ko-KR" sz="1600" dirty="0" smtClean="0"/>
-          </a:p>
-          <a:p>
-            <a:pPr lvl="1"/>
-            <a:endParaRPr lang="en-US" altLang="ko-KR" sz="1600" dirty="0" smtClean="0"/>
+            <a:r>
+              <a:rPr lang="en-US" altLang="ko-KR" dirty="0" smtClean="0"/>
+              <a:t>, data: Array[Byte]) extends Message</a:t>
+            </a:r>
           </a:p>
           <a:p>
             <a:pPr marL="342900" indent="-342900">
               <a:buFont typeface="Arial" panose="020B0604020202020204" pitchFamily="34" charset="0"/>
               <a:buChar char="•"/>
             </a:pPr>
-            <a:r>
-              <a:rPr lang="en-US" altLang="ko-KR" sz="2000" dirty="0" smtClean="0"/>
-              <a:t>object </a:t>
-            </a:r>
-            <a:r>
-              <a:rPr lang="en-US" altLang="ko-KR" sz="2000" dirty="0" err="1" smtClean="0"/>
-              <a:t>DataMessage</a:t>
-            </a:r>
-            <a:endParaRPr lang="en-US" altLang="ko-KR" sz="2000" dirty="0"/>
-          </a:p>
-          <a:p>
-            <a:pPr marL="742950" lvl="1" indent="-285750">
-              <a:buFontTx/>
-              <a:buChar char="-"/>
+            <a:endParaRPr lang="en-US" altLang="ko-KR" dirty="0" smtClean="0"/>
+          </a:p>
+          <a:p>
+            <a:pPr marL="342900" indent="-342900">
+              <a:buFont typeface="Arial" panose="020B0604020202020204" pitchFamily="34" charset="0"/>
+              <a:buChar char="•"/>
             </a:pPr>
-            <a:r>
-              <a:rPr lang="en-US" altLang="ko-KR" sz="1600" dirty="0" err="1" smtClean="0"/>
-              <a:t>analyzeMessage</a:t>
-            </a:r>
-            <a:r>
-              <a:rPr lang="en-US" altLang="ko-KR" sz="1600" dirty="0" smtClean="0"/>
-              <a:t>(Array[Byte</a:t>
-            </a:r>
-            <a:r>
-              <a:rPr lang="en-US" altLang="ko-KR" sz="1600" dirty="0"/>
-              <a:t>]): </a:t>
-            </a:r>
-            <a:r>
-              <a:rPr lang="en-US" altLang="ko-KR" sz="1600" dirty="0" err="1" smtClean="0"/>
-              <a:t>DataMessage</a:t>
-            </a:r>
-            <a:endParaRPr lang="en-US" altLang="ko-KR" sz="1600" dirty="0" smtClean="0"/>
-          </a:p>
-          <a:p>
-            <a:pPr marL="742950" lvl="1" indent="-285750">
-              <a:buFontTx/>
-              <a:buChar char="-"/>
-            </a:pPr>
-            <a:r>
-              <a:rPr lang="en-US" altLang="ko-KR" sz="1600" dirty="0" smtClean="0"/>
-              <a:t>apply(</a:t>
-            </a:r>
-            <a:r>
-              <a:rPr lang="en-US" altLang="ko-KR" sz="1600" dirty="0" err="1" smtClean="0"/>
-              <a:t>Int</a:t>
-            </a:r>
-            <a:r>
-              <a:rPr lang="en-US" altLang="ko-KR" sz="1600" dirty="0" smtClean="0"/>
-              <a:t>, </a:t>
-            </a:r>
-            <a:r>
-              <a:rPr lang="en-US" altLang="ko-KR" sz="1600" dirty="0" err="1" smtClean="0"/>
-              <a:t>Int</a:t>
-            </a:r>
-            <a:r>
-              <a:rPr lang="en-US" altLang="ko-KR" sz="1600" dirty="0"/>
-              <a:t>, </a:t>
-            </a:r>
-            <a:r>
-              <a:rPr lang="en-US" altLang="ko-KR" sz="1600" dirty="0" smtClean="0"/>
-              <a:t>Array[Byte</a:t>
-            </a:r>
-            <a:r>
-              <a:rPr lang="en-US" altLang="ko-KR" sz="1600" dirty="0"/>
-              <a:t>]</a:t>
-            </a:r>
-            <a:r>
-              <a:rPr lang="en-US" altLang="ko-KR" sz="1600" dirty="0" smtClean="0"/>
-              <a:t>): </a:t>
-            </a:r>
-            <a:r>
-              <a:rPr lang="en-US" altLang="ko-KR" sz="1600" dirty="0" err="1" smtClean="0"/>
-              <a:t>DataMessage</a:t>
-            </a:r>
-            <a:endParaRPr lang="en-US" altLang="ko-KR" sz="1600" dirty="0" smtClean="0"/>
-          </a:p>
-          <a:p>
-            <a:pPr marL="742950" lvl="1" indent="-285750">
-              <a:buFontTx/>
-              <a:buChar char="-"/>
-            </a:pPr>
-            <a:endParaRPr lang="en-US" altLang="ko-KR" sz="1600" dirty="0" smtClean="0"/>
-          </a:p>
-          <a:p>
-            <a:pPr lvl="1"/>
-            <a:endParaRPr lang="en-US" altLang="ko-KR" sz="1600" dirty="0" smtClean="0"/>
+            <a:endParaRPr lang="en-US" altLang="ko-KR" dirty="0" smtClean="0"/>
           </a:p>
           <a:p>
             <a:pPr lvl="1"/>
@@ -7118,7 +6468,7 @@
     </p:spTree>
     <p:extLst>
       <p:ext uri="{BB962C8B-B14F-4D97-AF65-F5344CB8AC3E}">
-        <p14:creationId xmlns:p14="http://schemas.microsoft.com/office/powerpoint/2010/main" val="1291798499"/>
+        <p14:creationId xmlns:p14="http://schemas.microsoft.com/office/powerpoint/2010/main" val="1055633754"/>
       </p:ext>
     </p:extLst>
   </p:cSld>
@@ -7199,11 +6549,7 @@
           <a:p>
             <a:r>
               <a:rPr lang="en-US" altLang="ko-KR" sz="2000" dirty="0" smtClean="0"/>
-              <a:t>class </a:t>
-            </a:r>
-            <a:r>
-              <a:rPr lang="en-US" altLang="ko-KR" sz="2000" dirty="0" smtClean="0"/>
-              <a:t>Master</a:t>
+              <a:t>class Master</a:t>
             </a:r>
             <a:endParaRPr lang="en-US" altLang="ko-KR" sz="1600" dirty="0" smtClean="0"/>
           </a:p>
@@ -7354,13 +6700,8 @@
             </a:r>
             <a:r>
               <a:rPr lang="en-US" altLang="ko-KR" sz="1600" dirty="0" smtClean="0"/>
-              <a:t>): List[Future[List[Key</a:t>
-            </a:r>
-            <a:r>
-              <a:rPr lang="en-US" altLang="ko-KR" sz="1600" dirty="0" smtClean="0"/>
-              <a:t>]]]</a:t>
-            </a:r>
-            <a:endParaRPr lang="en-US" altLang="ko-KR" sz="1600" dirty="0" smtClean="0"/>
+              <a:t>): List[Future[List[Key]]]</a:t>
+            </a:r>
           </a:p>
           <a:p>
             <a:pPr lvl="1">
@@ -7373,50 +6714,11 @@
             </a:r>
             <a:r>
               <a:rPr lang="en-US" altLang="ko-KR" sz="1600" dirty="0" smtClean="0"/>
-              <a:t>(Socket): Future[List[Key]]</a:t>
-            </a:r>
-            <a:endParaRPr lang="en-US" altLang="ko-KR" sz="1600" dirty="0"/>
-          </a:p>
-          <a:p>
-            <a:pPr marL="457200" lvl="1" indent="0">
-              <a:buNone/>
-            </a:pPr>
-            <a:endParaRPr lang="en-US" altLang="ko-KR" sz="1600" dirty="0" smtClean="0"/>
-          </a:p>
-          <a:p>
-            <a:endParaRPr lang="ko-KR" altLang="en-US" dirty="0"/>
-          </a:p>
-        </p:txBody>
-      </p:sp>
-      <p:sp>
-        <p:nvSpPr>
-          <p:cNvPr id="4" name="직사각형 3"/>
-          <p:cNvSpPr/>
-          <p:nvPr/>
-        </p:nvSpPr>
-        <p:spPr>
-          <a:xfrm>
-            <a:off x="6209159" y="735518"/>
-            <a:ext cx="6096000" cy="4031873"/>
-          </a:xfrm>
-          <a:prstGeom prst="rect">
-            <a:avLst/>
-          </a:prstGeom>
-        </p:spPr>
-        <p:txBody>
-          <a:bodyPr>
-            <a:spAutoFit/>
-          </a:bodyPr>
-          <a:lstStyle/>
-          <a:p>
-            <a:pPr lvl="1"/>
+              <a:t>(Socket): Future[List[Key</a:t>
+            </a:r>
             <a:r>
               <a:rPr lang="en-US" altLang="ko-KR" sz="1600" dirty="0" smtClean="0"/>
-              <a:t>(</a:t>
-            </a:r>
-            <a:r>
-              <a:rPr lang="en-US" altLang="ko-KR" sz="1600" dirty="0" smtClean="0"/>
-              <a:t>Sample)</a:t>
+              <a:t>]]</a:t>
             </a:r>
           </a:p>
           <a:p>
@@ -7425,12 +6727,8 @@
               <a:buChar char="-"/>
             </a:pPr>
             <a:r>
-              <a:rPr lang="en-US" altLang="ko-KR" sz="1600" dirty="0" smtClean="0"/>
-              <a:t> </a:t>
-            </a:r>
-            <a:r>
               <a:rPr lang="en-US" altLang="ko-KR" sz="1600" dirty="0" err="1" smtClean="0"/>
-              <a:t>recvSampleMsg</a:t>
+              <a:t>updateSlaveInfo</a:t>
             </a:r>
             <a:r>
               <a:rPr lang="en-US" altLang="ko-KR" sz="1600" dirty="0" smtClean="0"/>
@@ -7438,44 +6736,8 @@
             </a:r>
             <a:r>
               <a:rPr lang="en-US" altLang="ko-KR" sz="1600" dirty="0"/>
-              <a:t>): </a:t>
-            </a:r>
-            <a:r>
-              <a:rPr lang="en-US" altLang="ko-KR" sz="1600" dirty="0" smtClean="0"/>
-              <a:t>Future[</a:t>
-            </a:r>
-            <a:r>
-              <a:rPr lang="en-US" altLang="ko-KR" sz="1600" dirty="0" err="1" smtClean="0"/>
-              <a:t>SampleMsg</a:t>
-            </a:r>
-            <a:r>
-              <a:rPr lang="en-US" altLang="ko-KR" sz="1600" dirty="0" smtClean="0"/>
-              <a:t>]</a:t>
-            </a:r>
-            <a:endParaRPr lang="en-US" altLang="ko-KR" sz="1600" dirty="0" smtClean="0"/>
-          </a:p>
-          <a:p>
-            <a:pPr lvl="1">
-              <a:buFontTx/>
-              <a:buChar char="-"/>
-            </a:pPr>
-            <a:r>
-              <a:rPr lang="en-US" altLang="ko-KR" sz="1600" dirty="0"/>
-              <a:t> </a:t>
-            </a:r>
-            <a:r>
-              <a:rPr lang="en-US" altLang="ko-KR" sz="1600" dirty="0" err="1"/>
-              <a:t>updateSlaveInfo</a:t>
-            </a:r>
-            <a:r>
-              <a:rPr lang="en-US" altLang="ko-KR" sz="1600" dirty="0"/>
-              <a:t>(Socket, Slave): </a:t>
-            </a:r>
-            <a:r>
-              <a:rPr lang="en-US" altLang="ko-KR" sz="1600" dirty="0" smtClean="0"/>
-              <a:t>Unit</a:t>
-            </a:r>
-            <a:endParaRPr lang="en-US" altLang="ko-KR" sz="1600" dirty="0" smtClean="0"/>
+              <a:t>, Slave): Unit</a:t>
+            </a:r>
           </a:p>
           <a:p>
             <a:pPr lvl="1">
@@ -7485,18 +6747,79 @@
             <a:endParaRPr lang="en-US" altLang="ko-KR" sz="1600" dirty="0"/>
           </a:p>
           <a:p>
+            <a:pPr marL="457200" lvl="1" indent="0">
+              <a:buNone/>
+            </a:pPr>
+            <a:endParaRPr lang="en-US" altLang="ko-KR" sz="1600" dirty="0" smtClean="0"/>
+          </a:p>
+          <a:p>
+            <a:endParaRPr lang="ko-KR" altLang="en-US" dirty="0"/>
+          </a:p>
+        </p:txBody>
+      </p:sp>
+      <p:sp>
+        <p:nvSpPr>
+          <p:cNvPr id="4" name="직사각형 3"/>
+          <p:cNvSpPr/>
+          <p:nvPr/>
+        </p:nvSpPr>
+        <p:spPr>
+          <a:xfrm>
+            <a:off x="6209159" y="735518"/>
+            <a:ext cx="6096000" cy="3785652"/>
+          </a:xfrm>
+          <a:prstGeom prst="rect">
+            <a:avLst/>
+          </a:prstGeom>
+        </p:spPr>
+        <p:txBody>
+          <a:bodyPr>
+            <a:spAutoFit/>
+          </a:bodyPr>
+          <a:lstStyle/>
+          <a:p>
             <a:pPr lvl="1"/>
             <a:r>
               <a:rPr lang="en-US" altLang="ko-KR" sz="1600" dirty="0" smtClean="0"/>
-              <a:t>(</a:t>
+              <a:t>(Connect)</a:t>
+            </a:r>
+          </a:p>
+          <a:p>
+            <a:pPr lvl="1">
+              <a:buFontTx/>
+              <a:buChar char="-"/>
+            </a:pPr>
+            <a:r>
+              <a:rPr lang="en-US" altLang="ko-KR" sz="1600" dirty="0" smtClean="0"/>
+              <a:t> </a:t>
             </a:r>
             <a:r>
               <a:rPr lang="en-US" altLang="ko-KR" sz="1600" dirty="0" err="1" smtClean="0"/>
-              <a:t>Calc</a:t>
+              <a:t>recvSampleMsg</a:t>
             </a:r>
             <a:r>
               <a:rPr lang="en-US" altLang="ko-KR" sz="1600" dirty="0" smtClean="0"/>
-              <a:t>)</a:t>
+              <a:t>(Socket</a:t>
+            </a:r>
+            <a:r>
+              <a:rPr lang="en-US" altLang="ko-KR" sz="1600" dirty="0"/>
+              <a:t>): </a:t>
+            </a:r>
+            <a:r>
+              <a:rPr lang="en-US" altLang="ko-KR" sz="1600" dirty="0" err="1" smtClean="0"/>
+              <a:t>SampleMsg</a:t>
+            </a:r>
+            <a:endParaRPr lang="en-US" altLang="ko-KR" sz="1600" dirty="0" smtClean="0"/>
+          </a:p>
+          <a:p>
+            <a:pPr lvl="1"/>
+            <a:endParaRPr lang="en-US" altLang="ko-KR" sz="1600" dirty="0"/>
+          </a:p>
+          <a:p>
+            <a:pPr lvl="1"/>
+            <a:r>
+              <a:rPr lang="en-US" altLang="ko-KR" sz="1600" dirty="0" smtClean="0"/>
+              <a:t>(Sample)</a:t>
             </a:r>
           </a:p>
           <a:p>
@@ -7573,7 +6896,11 @@
             </a:r>
             <a:r>
               <a:rPr lang="en-US" altLang="ko-KR" sz="1600" dirty="0" smtClean="0"/>
-              <a:t>(): Future[Unit]</a:t>
+              <a:t>(): </a:t>
+            </a:r>
+            <a:r>
+              <a:rPr lang="en-US" altLang="ko-KR" sz="1600" dirty="0" smtClean="0"/>
+              <a:t>Unit</a:t>
             </a:r>
             <a:endParaRPr lang="en-US" altLang="ko-KR" sz="1600" dirty="0"/>
           </a:p>
@@ -7592,13 +6919,10 @@
               <a:t>(): </a:t>
             </a:r>
             <a:r>
-              <a:rPr lang="en-US" altLang="ko-KR" sz="1600" dirty="0"/>
-              <a:t>Future[Unit</a:t>
-            </a:r>
-            <a:r>
               <a:rPr lang="en-US" altLang="ko-KR" sz="1600" dirty="0" smtClean="0"/>
-              <a:t>]</a:t>
-            </a:r>
+              <a:t>Unit</a:t>
+            </a:r>
+            <a:endParaRPr lang="en-US" altLang="ko-KR" sz="1600" dirty="0" smtClean="0"/>
           </a:p>
           <a:p>
             <a:pPr marL="742950" lvl="1" indent="-285750">
@@ -7879,13 +7203,8 @@
             </a:r>
             <a:r>
               <a:rPr lang="en-US" altLang="ko-KR" sz="1600" dirty="0" smtClean="0"/>
-              <a:t>): </a:t>
-            </a:r>
-            <a:r>
-              <a:rPr lang="en-US" altLang="ko-KR" sz="1600" dirty="0" smtClean="0"/>
-              <a:t>Unit</a:t>
-            </a:r>
-            <a:endParaRPr lang="en-US" altLang="ko-KR" sz="1600" dirty="0" smtClean="0"/>
+              <a:t>): Unit</a:t>
+            </a:r>
           </a:p>
           <a:p>
             <a:pPr lvl="1">
@@ -7975,16 +7294,13 @@
             </a:r>
             <a:r>
               <a:rPr lang="en-US" altLang="ko-KR" sz="1600" dirty="0"/>
-              <a:t>(): Future[</a:t>
-            </a:r>
-            <a:r>
-              <a:rPr lang="en-US" altLang="ko-KR" sz="1600" dirty="0" err="1"/>
+              <a:t>(): </a:t>
+            </a:r>
+            <a:r>
+              <a:rPr lang="en-US" altLang="ko-KR" sz="1600" dirty="0" err="1" smtClean="0"/>
               <a:t>SlaveInfoMsg</a:t>
             </a:r>
-            <a:r>
-              <a:rPr lang="en-US" altLang="ko-KR" sz="1600" dirty="0"/>
-              <a:t>]</a:t>
-            </a:r>
+            <a:endParaRPr lang="en-US" altLang="ko-KR" sz="1600" dirty="0"/>
           </a:p>
           <a:p>
             <a:pPr lvl="1">
@@ -8044,11 +7360,7 @@
             <a:pPr lvl="1"/>
             <a:r>
               <a:rPr lang="en-US" altLang="ko-KR" sz="1600" dirty="0" smtClean="0"/>
-              <a:t>(</a:t>
-            </a:r>
-            <a:r>
-              <a:rPr lang="en-US" altLang="ko-KR" sz="1600" dirty="0" smtClean="0"/>
-              <a:t>Compute)</a:t>
+              <a:t>(Compute)</a:t>
             </a:r>
             <a:endParaRPr lang="en-US" altLang="ko-KR" sz="1600" dirty="0"/>
           </a:p>
@@ -8375,7 +7687,11 @@
           <a:bodyPr/>
           <a:lstStyle/>
           <a:p>
-            <a:endParaRPr lang="ko-KR" altLang="en-US"/>
+            <a:r>
+              <a:rPr lang="en-US" altLang="ko-KR" dirty="0" smtClean="0"/>
+              <a:t>Message</a:t>
+            </a:r>
+            <a:endParaRPr lang="ko-KR" altLang="en-US" dirty="0"/>
           </a:p>
         </p:txBody>
       </p:sp>
@@ -8394,14 +7710,236 @@
           <a:bodyPr/>
           <a:lstStyle/>
           <a:p>
-            <a:endParaRPr lang="ko-KR" altLang="en-US"/>
+            <a:r>
+              <a:rPr lang="en-US" altLang="ko-KR" dirty="0" smtClean="0"/>
+              <a:t>…</a:t>
+            </a:r>
+            <a:r>
+              <a:rPr lang="en-US" altLang="ko-KR" dirty="0" err="1" smtClean="0"/>
+              <a:t>MsgEqualsToInterpretationOfItsByteArray</a:t>
+            </a:r>
+            <a:endParaRPr lang="ko-KR" altLang="en-US" dirty="0"/>
           </a:p>
         </p:txBody>
       </p:sp>
     </p:spTree>
     <p:extLst>
       <p:ext uri="{BB962C8B-B14F-4D97-AF65-F5344CB8AC3E}">
-        <p14:creationId xmlns:p14="http://schemas.microsoft.com/office/powerpoint/2010/main" val="3215969989"/>
+        <p14:creationId xmlns:p14="http://schemas.microsoft.com/office/powerpoint/2010/main" val="462376432"/>
+      </p:ext>
+    </p:extLst>
+  </p:cSld>
+  <p:clrMapOvr>
+    <a:masterClrMapping/>
+  </p:clrMapOvr>
+</p:sld>
+</file>
+
+<file path=ppt/slides/slide28.xml><?xml version="1.0" encoding="utf-8"?>
+<p:sld xmlns:a="http://schemas.openxmlformats.org/drawingml/2006/main" xmlns:r="http://schemas.openxmlformats.org/officeDocument/2006/relationships" xmlns:p="http://schemas.openxmlformats.org/presentationml/2006/main">
+  <p:cSld>
+    <p:spTree>
+      <p:nvGrpSpPr>
+        <p:cNvPr id="1" name=""/>
+        <p:cNvGrpSpPr/>
+        <p:nvPr/>
+      </p:nvGrpSpPr>
+      <p:grpSpPr>
+        <a:xfrm>
+          <a:off x="0" y="0"/>
+          <a:ext cx="0" cy="0"/>
+          <a:chOff x="0" y="0"/>
+          <a:chExt cx="0" cy="0"/>
+        </a:xfrm>
+      </p:grpSpPr>
+      <p:sp>
+        <p:nvSpPr>
+          <p:cNvPr id="2" name="제목 1"/>
+          <p:cNvSpPr>
+            <a:spLocks noGrp="1"/>
+          </p:cNvSpPr>
+          <p:nvPr>
+            <p:ph type="title"/>
+          </p:nvPr>
+        </p:nvSpPr>
+        <p:spPr/>
+        <p:txBody>
+          <a:bodyPr/>
+          <a:lstStyle/>
+          <a:p>
+            <a:r>
+              <a:rPr lang="en-US" altLang="ko-KR" dirty="0" smtClean="0"/>
+              <a:t>State</a:t>
+            </a:r>
+            <a:endParaRPr lang="ko-KR" altLang="en-US" dirty="0"/>
+          </a:p>
+        </p:txBody>
+      </p:sp>
+      <p:sp>
+        <p:nvSpPr>
+          <p:cNvPr id="3" name="내용 개체 틀 2"/>
+          <p:cNvSpPr>
+            <a:spLocks noGrp="1"/>
+          </p:cNvSpPr>
+          <p:nvPr>
+            <p:ph idx="1"/>
+          </p:nvPr>
+        </p:nvSpPr>
+        <p:spPr/>
+        <p:txBody>
+          <a:bodyPr/>
+          <a:lstStyle/>
+          <a:p>
+            <a:r>
+              <a:rPr lang="en-US" altLang="ko-KR" dirty="0" err="1" smtClean="0"/>
+              <a:t>SlaveListUpdatedAfterConnection</a:t>
+            </a:r>
+            <a:endParaRPr lang="en-US" altLang="ko-KR" dirty="0" smtClean="0"/>
+          </a:p>
+          <a:p>
+            <a:endParaRPr lang="ko-KR" altLang="en-US" dirty="0"/>
+          </a:p>
+        </p:txBody>
+      </p:sp>
+    </p:spTree>
+    <p:extLst>
+      <p:ext uri="{BB962C8B-B14F-4D97-AF65-F5344CB8AC3E}">
+        <p14:creationId xmlns:p14="http://schemas.microsoft.com/office/powerpoint/2010/main" val="1484116259"/>
+      </p:ext>
+    </p:extLst>
+  </p:cSld>
+  <p:clrMapOvr>
+    <a:masterClrMapping/>
+  </p:clrMapOvr>
+</p:sld>
+</file>
+
+<file path=ppt/slides/slide29.xml><?xml version="1.0" encoding="utf-8"?>
+<p:sld xmlns:a="http://schemas.openxmlformats.org/drawingml/2006/main" xmlns:r="http://schemas.openxmlformats.org/officeDocument/2006/relationships" xmlns:p="http://schemas.openxmlformats.org/presentationml/2006/main">
+  <p:cSld>
+    <p:spTree>
+      <p:nvGrpSpPr>
+        <p:cNvPr id="1" name=""/>
+        <p:cNvGrpSpPr/>
+        <p:nvPr/>
+      </p:nvGrpSpPr>
+      <p:grpSpPr>
+        <a:xfrm>
+          <a:off x="0" y="0"/>
+          <a:ext cx="0" cy="0"/>
+          <a:chOff x="0" y="0"/>
+          <a:chExt cx="0" cy="0"/>
+        </a:xfrm>
+      </p:grpSpPr>
+      <p:sp>
+        <p:nvSpPr>
+          <p:cNvPr id="2" name="제목 1"/>
+          <p:cNvSpPr>
+            <a:spLocks noGrp="1"/>
+          </p:cNvSpPr>
+          <p:nvPr>
+            <p:ph type="title"/>
+          </p:nvPr>
+        </p:nvSpPr>
+        <p:spPr/>
+        <p:txBody>
+          <a:bodyPr/>
+          <a:lstStyle/>
+          <a:p>
+            <a:r>
+              <a:rPr lang="en-US" altLang="ko-KR" dirty="0" smtClean="0"/>
+              <a:t>Futures</a:t>
+            </a:r>
+            <a:endParaRPr lang="ko-KR" altLang="en-US" dirty="0"/>
+          </a:p>
+        </p:txBody>
+      </p:sp>
+      <p:sp>
+        <p:nvSpPr>
+          <p:cNvPr id="3" name="내용 개체 틀 2"/>
+          <p:cNvSpPr>
+            <a:spLocks noGrp="1"/>
+          </p:cNvSpPr>
+          <p:nvPr>
+            <p:ph idx="1"/>
+          </p:nvPr>
+        </p:nvSpPr>
+        <p:spPr/>
+        <p:txBody>
+          <a:bodyPr/>
+          <a:lstStyle/>
+          <a:p>
+            <a:r>
+              <a:rPr lang="en-US" altLang="ko-KR" dirty="0" err="1" smtClean="0"/>
+              <a:t>samplingFutureCompletesAfterSampleMsg</a:t>
+            </a:r>
+            <a:endParaRPr lang="en-US" altLang="ko-KR" dirty="0" smtClean="0"/>
+          </a:p>
+          <a:p>
+            <a:r>
+              <a:rPr lang="en-US" altLang="ko-KR" dirty="0" err="1" smtClean="0"/>
+              <a:t>samplingFutureDoesNotCompletesAfter</a:t>
+            </a:r>
+            <a:r>
+              <a:rPr lang="en-US" altLang="ko-KR" dirty="0" smtClean="0"/>
+              <a:t>…</a:t>
+            </a:r>
+            <a:r>
+              <a:rPr lang="en-US" altLang="ko-KR" dirty="0" err="1" smtClean="0"/>
+              <a:t>Msg</a:t>
+            </a:r>
+            <a:endParaRPr lang="en-US" altLang="ko-KR" dirty="0"/>
+          </a:p>
+          <a:p>
+            <a:endParaRPr lang="en-US" altLang="ko-KR" dirty="0" smtClean="0"/>
+          </a:p>
+          <a:p>
+            <a:r>
+              <a:rPr lang="en-US" altLang="ko-KR" dirty="0" err="1" smtClean="0"/>
+              <a:t>computeFuture</a:t>
+            </a:r>
+            <a:r>
+              <a:rPr lang="en-US" altLang="ko-KR" dirty="0" err="1"/>
+              <a:t>Complete</a:t>
+            </a:r>
+            <a:r>
+              <a:rPr lang="en-US" altLang="ko-KR" dirty="0" err="1" smtClean="0"/>
+              <a:t>sAfterDoneMsg</a:t>
+            </a:r>
+            <a:endParaRPr lang="en-US" altLang="ko-KR" dirty="0" smtClean="0"/>
+          </a:p>
+          <a:p>
+            <a:r>
+              <a:rPr lang="en-US" altLang="ko-KR" dirty="0" err="1" smtClean="0"/>
+              <a:t>computeFutureDoesNot</a:t>
+            </a:r>
+            <a:r>
+              <a:rPr lang="en-US" altLang="ko-KR" dirty="0" err="1"/>
+              <a:t>Complete</a:t>
+            </a:r>
+            <a:r>
+              <a:rPr lang="en-US" altLang="ko-KR" dirty="0" err="1" smtClean="0"/>
+              <a:t>sAfter</a:t>
+            </a:r>
+            <a:r>
+              <a:rPr lang="en-US" altLang="ko-KR" dirty="0" smtClean="0"/>
+              <a:t>…</a:t>
+            </a:r>
+            <a:r>
+              <a:rPr lang="en-US" altLang="ko-KR" dirty="0" err="1" smtClean="0"/>
+              <a:t>Msg</a:t>
+            </a:r>
+            <a:endParaRPr lang="en-US" altLang="ko-KR" dirty="0"/>
+          </a:p>
+          <a:p>
+            <a:endParaRPr lang="ko-KR" altLang="en-US" dirty="0"/>
+          </a:p>
+        </p:txBody>
+      </p:sp>
+    </p:spTree>
+    <p:extLst>
+      <p:ext uri="{BB962C8B-B14F-4D97-AF65-F5344CB8AC3E}">
+        <p14:creationId xmlns:p14="http://schemas.microsoft.com/office/powerpoint/2010/main" val="363375175"/>
       </p:ext>
     </p:extLst>
   </p:cSld>
@@ -8472,11 +8010,7 @@
             </a:r>
             <a:r>
               <a:rPr lang="en-US" altLang="ko-KR" dirty="0" smtClean="0"/>
-              <a:t> as </a:t>
-            </a:r>
-            <a:r>
-              <a:rPr lang="en-US" altLang="ko-KR" dirty="0" smtClean="0"/>
-              <a:t>Array[Byte]</a:t>
+              <a:t> as Array[Byte]</a:t>
             </a:r>
             <a:endParaRPr lang="ko-KR" altLang="en-US" dirty="0"/>
           </a:p>
@@ -8499,6 +8033,82 @@
       </p:par>
     </p:tnLst>
   </p:timing>
+</p:sld>
+</file>
+
+<file path=ppt/slides/slide30.xml><?xml version="1.0" encoding="utf-8"?>
+<p:sld xmlns:a="http://schemas.openxmlformats.org/drawingml/2006/main" xmlns:r="http://schemas.openxmlformats.org/officeDocument/2006/relationships" xmlns:p="http://schemas.openxmlformats.org/presentationml/2006/main">
+  <p:cSld>
+    <p:spTree>
+      <p:nvGrpSpPr>
+        <p:cNvPr id="1" name=""/>
+        <p:cNvGrpSpPr/>
+        <p:nvPr/>
+      </p:nvGrpSpPr>
+      <p:grpSpPr>
+        <a:xfrm>
+          <a:off x="0" y="0"/>
+          <a:ext cx="0" cy="0"/>
+          <a:chOff x="0" y="0"/>
+          <a:chExt cx="0" cy="0"/>
+        </a:xfrm>
+      </p:grpSpPr>
+      <p:sp>
+        <p:nvSpPr>
+          <p:cNvPr id="2" name="제목 1"/>
+          <p:cNvSpPr>
+            <a:spLocks noGrp="1"/>
+          </p:cNvSpPr>
+          <p:nvPr>
+            <p:ph type="title"/>
+          </p:nvPr>
+        </p:nvSpPr>
+        <p:spPr/>
+        <p:txBody>
+          <a:bodyPr/>
+          <a:lstStyle/>
+          <a:p>
+            <a:r>
+              <a:rPr lang="en-US" altLang="ko-KR" dirty="0" smtClean="0"/>
+              <a:t>Sample Calculation</a:t>
+            </a:r>
+            <a:endParaRPr lang="ko-KR" altLang="en-US" dirty="0"/>
+          </a:p>
+        </p:txBody>
+      </p:sp>
+      <p:sp>
+        <p:nvSpPr>
+          <p:cNvPr id="3" name="내용 개체 틀 2"/>
+          <p:cNvSpPr>
+            <a:spLocks noGrp="1"/>
+          </p:cNvSpPr>
+          <p:nvPr>
+            <p:ph idx="1"/>
+          </p:nvPr>
+        </p:nvSpPr>
+        <p:spPr/>
+        <p:txBody>
+          <a:bodyPr/>
+          <a:lstStyle/>
+          <a:p>
+            <a:r>
+              <a:rPr lang="en-US" altLang="ko-KR" dirty="0" err="1" smtClean="0"/>
+              <a:t>calculatesCorrectPivot</a:t>
+            </a:r>
+            <a:endParaRPr lang="ko-KR" altLang="en-US" dirty="0"/>
+          </a:p>
+        </p:txBody>
+      </p:sp>
+    </p:spTree>
+    <p:extLst>
+      <p:ext uri="{BB962C8B-B14F-4D97-AF65-F5344CB8AC3E}">
+        <p14:creationId xmlns:p14="http://schemas.microsoft.com/office/powerpoint/2010/main" val="81598223"/>
+      </p:ext>
+    </p:extLst>
+  </p:cSld>
+  <p:clrMapOvr>
+    <a:masterClrMapping/>
+  </p:clrMapOvr>
 </p:sld>
 </file>
 
@@ -8925,23 +8535,7 @@
                       </a:r>
                       <a:r>
                         <a:rPr lang="en-US" altLang="ko-KR" sz="1400" baseline="0" dirty="0" smtClean="0"/>
-                        <a:t> </a:t>
-                      </a:r>
-                      <a:r>
-                        <a:rPr lang="en-US" altLang="ko-KR" sz="1400" baseline="0" dirty="0" smtClean="0"/>
-                        <a:t>(10 </a:t>
-                      </a:r>
-                      <a:r>
-                        <a:rPr lang="en-US" altLang="ko-KR" sz="1400" baseline="0" dirty="0" smtClean="0"/>
-                        <a:t>bytes, </a:t>
-                      </a:r>
-                      <a:r>
-                        <a:rPr lang="en-US" altLang="ko-KR" sz="1400" baseline="0" dirty="0" smtClean="0"/>
-                        <a:t>Key) </a:t>
-                      </a:r>
-                      <a:r>
-                        <a:rPr lang="en-US" altLang="ko-KR" sz="1400" baseline="0" dirty="0" smtClean="0"/>
-                        <a:t>* ((# of slaves) - 1)</a:t>
+                        <a:t> (10 bytes, Key) * ((# of slaves) - 1)</a:t>
                       </a:r>
                       <a:endParaRPr lang="ko-KR" altLang="en-US" sz="1400" b="0" dirty="0"/>
                     </a:p>
@@ -9352,11 +8946,7 @@
                       </a:pPr>
                       <a:r>
                         <a:rPr lang="en-US" altLang="ko-KR" sz="1400" b="0" dirty="0" smtClean="0"/>
-                        <a:t># </a:t>
-                      </a:r>
-                      <a:r>
-                        <a:rPr lang="en-US" altLang="ko-KR" sz="1400" b="0" dirty="0" smtClean="0"/>
-                        <a:t>of samples</a:t>
+                        <a:t># of samples</a:t>
                       </a:r>
                     </a:p>
                     <a:p>
@@ -9454,11 +9044,7 @@
                       </a:pPr>
                       <a:r>
                         <a:rPr lang="en-US" altLang="ko-KR" sz="1400" b="0" baseline="0" dirty="0" smtClean="0"/>
-                        <a:t># </a:t>
-                      </a:r>
-                      <a:r>
-                        <a:rPr lang="en-US" altLang="ko-KR" sz="1400" b="0" baseline="0" dirty="0" smtClean="0"/>
-                        <a:t>of samples (4 bytes, Integer)</a:t>
+                        <a:t># of samples (4 bytes, Integer)</a:t>
                       </a:r>
                     </a:p>
                     <a:p>
@@ -9634,7 +9220,7 @@
           <p:nvPr>
             <p:extLst>
               <p:ext uri="{D42A27DB-BD31-4B8C-83A1-F6EECF244321}">
-                <p14:modId xmlns:p14="http://schemas.microsoft.com/office/powerpoint/2010/main" val="2999418484"/>
+                <p14:modId xmlns:p14="http://schemas.microsoft.com/office/powerpoint/2010/main" val="1933420308"/>
               </p:ext>
             </p:extLst>
           </p:nvPr>
@@ -9987,7 +9573,15 @@
                       </a:pPr>
                       <a:r>
                         <a:rPr lang="en-US" altLang="ko-KR" sz="1400" b="0" baseline="0" dirty="0" smtClean="0"/>
-                        <a:t>Data (1000 bytes, </a:t>
+                        <a:t>Data </a:t>
+                      </a:r>
+                      <a:r>
+                        <a:rPr lang="en-US" altLang="ko-KR" sz="1400" b="0" baseline="0" dirty="0" smtClean="0"/>
+                        <a:t>(4000 </a:t>
+                      </a:r>
+                      <a:r>
+                        <a:rPr lang="en-US" altLang="ko-KR" sz="1400" b="0" baseline="0" dirty="0" smtClean="0"/>
+                        <a:t>bytes, </a:t>
                       </a:r>
                       <a:r>
                         <a:rPr lang="en-US" altLang="ko-KR" sz="1400" baseline="0" dirty="0" smtClean="0"/>
@@ -10263,7 +9857,7 @@
             <a:pPr algn="ctr"/>
             <a:r>
               <a:rPr lang="en-US" altLang="ko-KR" dirty="0" smtClean="0"/>
-              <a:t>Sample</a:t>
+              <a:t>Connect</a:t>
             </a:r>
             <a:endParaRPr lang="ko-KR" altLang="en-US" dirty="0"/>
           </a:p>
@@ -10304,8 +9898,8 @@
           <a:p>
             <a:pPr algn="ctr"/>
             <a:r>
-              <a:rPr lang="en-US" altLang="ko-KR" dirty="0" err="1" smtClean="0"/>
-              <a:t>Calc</a:t>
+              <a:rPr lang="en-US" altLang="ko-KR" dirty="0" smtClean="0"/>
+              <a:t>Sample</a:t>
             </a:r>
             <a:endParaRPr lang="ko-KR" altLang="en-US" dirty="0"/>
           </a:p>
@@ -10949,7 +10543,7 @@
             <a:pPr algn="ctr"/>
             <a:r>
               <a:rPr lang="en-US" altLang="ko-KR" dirty="0" smtClean="0"/>
-              <a:t>Sample</a:t>
+              <a:t>Connect</a:t>
             </a:r>
             <a:endParaRPr lang="ko-KR" altLang="en-US" dirty="0"/>
           </a:p>

</xml_diff>

<commit_message>
More detail for each state
</commit_message>
<xml_diff>
--- a/project.pptx
+++ b/project.pptx
@@ -272,7 +272,7 @@
           <a:p>
             <a:fld id="{33CC212C-81FB-40F3-BD5E-91ADD12CE53F}" type="datetimeFigureOut">
               <a:rPr lang="ko-KR" altLang="en-US" smtClean="0"/>
-              <a:t>2016-10-24</a:t>
+              <a:t>2016-10-27</a:t>
             </a:fld>
             <a:endParaRPr lang="ko-KR" altLang="en-US"/>
           </a:p>
@@ -442,7 +442,7 @@
           <a:p>
             <a:fld id="{33CC212C-81FB-40F3-BD5E-91ADD12CE53F}" type="datetimeFigureOut">
               <a:rPr lang="ko-KR" altLang="en-US" smtClean="0"/>
-              <a:t>2016-10-24</a:t>
+              <a:t>2016-10-27</a:t>
             </a:fld>
             <a:endParaRPr lang="ko-KR" altLang="en-US"/>
           </a:p>
@@ -622,7 +622,7 @@
           <a:p>
             <a:fld id="{33CC212C-81FB-40F3-BD5E-91ADD12CE53F}" type="datetimeFigureOut">
               <a:rPr lang="ko-KR" altLang="en-US" smtClean="0"/>
-              <a:t>2016-10-24</a:t>
+              <a:t>2016-10-27</a:t>
             </a:fld>
             <a:endParaRPr lang="ko-KR" altLang="en-US"/>
           </a:p>
@@ -792,7 +792,7 @@
           <a:p>
             <a:fld id="{33CC212C-81FB-40F3-BD5E-91ADD12CE53F}" type="datetimeFigureOut">
               <a:rPr lang="ko-KR" altLang="en-US" smtClean="0"/>
-              <a:t>2016-10-24</a:t>
+              <a:t>2016-10-27</a:t>
             </a:fld>
             <a:endParaRPr lang="ko-KR" altLang="en-US"/>
           </a:p>
@@ -1038,7 +1038,7 @@
           <a:p>
             <a:fld id="{33CC212C-81FB-40F3-BD5E-91ADD12CE53F}" type="datetimeFigureOut">
               <a:rPr lang="ko-KR" altLang="en-US" smtClean="0"/>
-              <a:t>2016-10-24</a:t>
+              <a:t>2016-10-27</a:t>
             </a:fld>
             <a:endParaRPr lang="ko-KR" altLang="en-US"/>
           </a:p>
@@ -1270,7 +1270,7 @@
           <a:p>
             <a:fld id="{33CC212C-81FB-40F3-BD5E-91ADD12CE53F}" type="datetimeFigureOut">
               <a:rPr lang="ko-KR" altLang="en-US" smtClean="0"/>
-              <a:t>2016-10-24</a:t>
+              <a:t>2016-10-27</a:t>
             </a:fld>
             <a:endParaRPr lang="ko-KR" altLang="en-US"/>
           </a:p>
@@ -1637,7 +1637,7 @@
           <a:p>
             <a:fld id="{33CC212C-81FB-40F3-BD5E-91ADD12CE53F}" type="datetimeFigureOut">
               <a:rPr lang="ko-KR" altLang="en-US" smtClean="0"/>
-              <a:t>2016-10-24</a:t>
+              <a:t>2016-10-27</a:t>
             </a:fld>
             <a:endParaRPr lang="ko-KR" altLang="en-US"/>
           </a:p>
@@ -1755,7 +1755,7 @@
           <a:p>
             <a:fld id="{33CC212C-81FB-40F3-BD5E-91ADD12CE53F}" type="datetimeFigureOut">
               <a:rPr lang="ko-KR" altLang="en-US" smtClean="0"/>
-              <a:t>2016-10-24</a:t>
+              <a:t>2016-10-27</a:t>
             </a:fld>
             <a:endParaRPr lang="ko-KR" altLang="en-US"/>
           </a:p>
@@ -1850,7 +1850,7 @@
           <a:p>
             <a:fld id="{33CC212C-81FB-40F3-BD5E-91ADD12CE53F}" type="datetimeFigureOut">
               <a:rPr lang="ko-KR" altLang="en-US" smtClean="0"/>
-              <a:t>2016-10-24</a:t>
+              <a:t>2016-10-27</a:t>
             </a:fld>
             <a:endParaRPr lang="ko-KR" altLang="en-US"/>
           </a:p>
@@ -2127,7 +2127,7 @@
           <a:p>
             <a:fld id="{33CC212C-81FB-40F3-BD5E-91ADD12CE53F}" type="datetimeFigureOut">
               <a:rPr lang="ko-KR" altLang="en-US" smtClean="0"/>
-              <a:t>2016-10-24</a:t>
+              <a:t>2016-10-27</a:t>
             </a:fld>
             <a:endParaRPr lang="ko-KR" altLang="en-US"/>
           </a:p>
@@ -2380,7 +2380,7 @@
           <a:p>
             <a:fld id="{33CC212C-81FB-40F3-BD5E-91ADD12CE53F}" type="datetimeFigureOut">
               <a:rPr lang="ko-KR" altLang="en-US" smtClean="0"/>
-              <a:t>2016-10-24</a:t>
+              <a:t>2016-10-27</a:t>
             </a:fld>
             <a:endParaRPr lang="ko-KR" altLang="en-US"/>
           </a:p>
@@ -2593,7 +2593,7 @@
           <a:p>
             <a:fld id="{33CC212C-81FB-40F3-BD5E-91ADD12CE53F}" type="datetimeFigureOut">
               <a:rPr lang="ko-KR" altLang="en-US" smtClean="0"/>
-              <a:t>2016-10-24</a:t>
+              <a:t>2016-10-27</a:t>
             </a:fld>
             <a:endParaRPr lang="ko-KR" altLang="en-US"/>
           </a:p>
@@ -4340,17 +4340,11 @@
           <a:p>
             <a:r>
               <a:rPr lang="en-US" altLang="ko-KR" dirty="0" smtClean="0"/>
-              <a:t>Accept connection with loop</a:t>
-            </a:r>
-          </a:p>
-          <a:p>
-            <a:r>
-              <a:rPr lang="en-US" altLang="ko-KR" dirty="0" smtClean="0"/>
-              <a:t>Whenever client </a:t>
-            </a:r>
-            <a:r>
-              <a:rPr lang="en-US" altLang="ko-KR" dirty="0" smtClean="0"/>
-              <a:t>connected</a:t>
+              <a:t>Accept connection with </a:t>
+            </a:r>
+            <a:r>
+              <a:rPr lang="en-US" altLang="ko-KR" dirty="0" smtClean="0"/>
+              <a:t>loop</a:t>
             </a:r>
           </a:p>
           <a:p>
@@ -4359,31 +4353,70 @@
               <a:buChar char="-"/>
             </a:pPr>
             <a:r>
-              <a:rPr lang="en-US" altLang="ko-KR" dirty="0"/>
-              <a:t>C</a:t>
-            </a:r>
-            <a:r>
-              <a:rPr lang="en-US" altLang="ko-KR" dirty="0" smtClean="0"/>
-              <a:t>reate </a:t>
-            </a:r>
-            <a:r>
-              <a:rPr lang="en-US" altLang="ko-KR" dirty="0" smtClean="0"/>
-              <a:t>sampling future for </a:t>
-            </a:r>
-            <a:r>
-              <a:rPr lang="en-US" altLang="ko-KR" dirty="0" smtClean="0"/>
-              <a:t>client</a:t>
-            </a:r>
+              <a:rPr lang="en-US" altLang="ko-KR" dirty="0" smtClean="0"/>
+              <a:t>Terminates after (</a:t>
+            </a:r>
+            <a:r>
+              <a:rPr lang="en-US" altLang="ko-KR" dirty="0" err="1" smtClean="0"/>
+              <a:t>numSlaveExpected</a:t>
+            </a:r>
+            <a:r>
+              <a:rPr lang="en-US" altLang="ko-KR" dirty="0" smtClean="0"/>
+              <a:t>) connection is </a:t>
+            </a:r>
+            <a:r>
+              <a:rPr lang="en-US" altLang="ko-KR" dirty="0" err="1" smtClean="0"/>
+              <a:t>occured</a:t>
+            </a:r>
+            <a:endParaRPr lang="en-US" altLang="ko-KR" dirty="0" smtClean="0"/>
           </a:p>
           <a:p>
             <a:pPr lvl="1">
               <a:buFontTx/>
               <a:buChar char="-"/>
             </a:pPr>
-            <a:r>
-              <a:rPr lang="en-US" altLang="ko-KR" dirty="0" smtClean="0"/>
-              <a:t>Update slaves list</a:t>
-            </a:r>
+            <a:endParaRPr lang="en-US" altLang="ko-KR" dirty="0" smtClean="0"/>
+          </a:p>
+          <a:p>
+            <a:r>
+              <a:rPr lang="en-US" altLang="ko-KR" dirty="0" smtClean="0"/>
+              <a:t>Whenever client connected</a:t>
+            </a:r>
+          </a:p>
+          <a:p>
+            <a:pPr lvl="1">
+              <a:buFontTx/>
+              <a:buChar char="-"/>
+            </a:pPr>
+            <a:r>
+              <a:rPr lang="en-US" altLang="ko-KR" dirty="0"/>
+              <a:t>C</a:t>
+            </a:r>
+            <a:r>
+              <a:rPr lang="en-US" altLang="ko-KR" dirty="0" smtClean="0"/>
+              <a:t>reate sampling future for client</a:t>
+            </a:r>
+          </a:p>
+          <a:p>
+            <a:pPr lvl="1">
+              <a:buFontTx/>
+              <a:buChar char="-"/>
+            </a:pPr>
+            <a:r>
+              <a:rPr lang="en-US" altLang="ko-KR" dirty="0" smtClean="0"/>
+              <a:t>Update slaves </a:t>
+            </a:r>
+            <a:r>
+              <a:rPr lang="en-US" altLang="ko-KR" dirty="0" smtClean="0"/>
+              <a:t>list</a:t>
+            </a:r>
+          </a:p>
+          <a:p>
+            <a:pPr lvl="1">
+              <a:buFontTx/>
+              <a:buChar char="-"/>
+            </a:pPr>
+            <a:endParaRPr lang="en-US" altLang="ko-KR" dirty="0"/>
           </a:p>
         </p:txBody>
       </p:sp>
@@ -4463,6 +4496,24 @@
               <a:rPr lang="en-US" altLang="ko-KR" dirty="0" smtClean="0"/>
               <a:t>slave</a:t>
             </a:r>
+          </a:p>
+          <a:p>
+            <a:r>
+              <a:rPr lang="en-US" altLang="ko-KR" dirty="0" smtClean="0"/>
+              <a:t>Check whether received message is </a:t>
+            </a:r>
+            <a:r>
+              <a:rPr lang="en-US" altLang="ko-KR" dirty="0" err="1" smtClean="0"/>
+              <a:t>SampleMsg</a:t>
+            </a:r>
+            <a:endParaRPr lang="en-US" altLang="ko-KR" dirty="0" smtClean="0"/>
+          </a:p>
+          <a:p>
+            <a:pPr lvl="1"/>
+            <a:r>
+              <a:rPr lang="en-US" altLang="ko-KR" dirty="0" smtClean="0"/>
+              <a:t>And return interpreted value</a:t>
+            </a:r>
             <a:endParaRPr lang="en-US" altLang="ko-KR" dirty="0" smtClean="0"/>
           </a:p>
         </p:txBody>
@@ -4882,26 +4933,68 @@
             </a:r>
           </a:p>
           <a:p>
-            <a:r>
-              <a:rPr lang="en-US" altLang="ko-KR" dirty="0" smtClean="0"/>
-              <a:t>Sample from data (Sample size is </a:t>
-            </a:r>
-            <a:r>
-              <a:rPr lang="en-US" altLang="ko-KR" dirty="0" smtClean="0"/>
-              <a:t>proportional </a:t>
-            </a:r>
-            <a:r>
-              <a:rPr lang="en-US" altLang="ko-KR" dirty="0" smtClean="0"/>
-              <a:t>to data size)</a:t>
-            </a:r>
-          </a:p>
-          <a:p>
-            <a:r>
-              <a:rPr lang="en-US" altLang="ko-KR" dirty="0" smtClean="0"/>
-              <a:t>Send samples to master</a:t>
-            </a:r>
-          </a:p>
-          <a:p>
+            <a:pPr lvl="1">
+              <a:buFontTx/>
+              <a:buChar char="-"/>
+            </a:pPr>
+            <a:r>
+              <a:rPr lang="en-US" altLang="ko-KR" dirty="0" smtClean="0"/>
+              <a:t>From file size</a:t>
+            </a:r>
+          </a:p>
+          <a:p>
+            <a:pPr marL="457200" lvl="1" indent="0">
+              <a:buNone/>
+            </a:pPr>
+            <a:endParaRPr lang="en-US" altLang="ko-KR" dirty="0" smtClean="0"/>
+          </a:p>
+          <a:p>
+            <a:r>
+              <a:rPr lang="en-US" altLang="ko-KR" dirty="0" smtClean="0"/>
+              <a:t>Sample </a:t>
+            </a:r>
+            <a:r>
+              <a:rPr lang="en-US" altLang="ko-KR" dirty="0" smtClean="0"/>
+              <a:t>from data (Sample size is proportional to data size</a:t>
+            </a:r>
+            <a:r>
+              <a:rPr lang="en-US" altLang="ko-KR" dirty="0" smtClean="0"/>
+              <a:t>)</a:t>
+            </a:r>
+          </a:p>
+          <a:p>
+            <a:pPr lvl="1">
+              <a:buFontTx/>
+              <a:buChar char="-"/>
+            </a:pPr>
+            <a:r>
+              <a:rPr lang="en-US" altLang="ko-KR" dirty="0" smtClean="0"/>
+              <a:t>Does not open all the files (Just some files)</a:t>
+            </a:r>
+          </a:p>
+          <a:p>
+            <a:pPr lvl="1">
+              <a:buFontTx/>
+              <a:buChar char="-"/>
+            </a:pPr>
+            <a:r>
+              <a:rPr lang="en-US" altLang="ko-KR" dirty="0" smtClean="0"/>
+              <a:t>Sample by random access</a:t>
+            </a:r>
+          </a:p>
+          <a:p>
+            <a:pPr lvl="1"/>
+            <a:endParaRPr lang="en-US" altLang="ko-KR" dirty="0" smtClean="0"/>
+          </a:p>
+          <a:p>
+            <a:r>
+              <a:rPr lang="en-US" altLang="ko-KR" dirty="0" smtClean="0"/>
+              <a:t>Send samples to </a:t>
+            </a:r>
+            <a:r>
+              <a:rPr lang="en-US" altLang="ko-KR" dirty="0" smtClean="0"/>
+              <a:t>master</a:t>
+            </a:r>
             <a:endParaRPr lang="en-US" altLang="ko-KR" dirty="0"/>
           </a:p>
           <a:p>
@@ -5845,15 +5938,7 @@
           <a:p>
             <a:r>
               <a:rPr lang="en-US" altLang="ko-KR" sz="2000" dirty="0" smtClean="0"/>
-              <a:t>abstract class</a:t>
-            </a:r>
-            <a:r>
-              <a:rPr lang="en-US" altLang="ko-KR" sz="2000" dirty="0" smtClean="0"/>
-              <a:t> </a:t>
-            </a:r>
-            <a:r>
-              <a:rPr lang="en-US" altLang="ko-KR" sz="2000" dirty="0" smtClean="0"/>
-              <a:t>Message</a:t>
+              <a:t>abstract class Message</a:t>
             </a:r>
           </a:p>
           <a:p>
@@ -5867,11 +5952,7 @@
             </a:r>
             <a:r>
               <a:rPr lang="en-US" altLang="ko-KR" sz="1600" dirty="0" smtClean="0"/>
-              <a:t>(Message</a:t>
-            </a:r>
-            <a:r>
-              <a:rPr lang="en-US" altLang="ko-KR" sz="1600" dirty="0" smtClean="0"/>
-              <a:t>): </a:t>
+              <a:t>(Message): </a:t>
             </a:r>
             <a:r>
               <a:rPr lang="en-US" altLang="ko-KR" sz="1600" dirty="0"/>
@@ -6166,11 +6247,7 @@
             </a:r>
             <a:r>
               <a:rPr lang="en-US" altLang="ko-KR" sz="1600" dirty="0" smtClean="0"/>
-              <a:t>(): </a:t>
-            </a:r>
-            <a:r>
-              <a:rPr lang="en-US" altLang="ko-KR" sz="1600" dirty="0" smtClean="0"/>
-              <a:t>Array[byte]</a:t>
+              <a:t>(): Array[byte]</a:t>
             </a:r>
           </a:p>
           <a:p>
@@ -6322,11 +6399,7 @@
             </a:pPr>
             <a:r>
               <a:rPr lang="en-US" altLang="ko-KR" dirty="0" smtClean="0"/>
-              <a:t>object</a:t>
-            </a:r>
-            <a:r>
-              <a:rPr lang="en-US" altLang="ko-KR" dirty="0" smtClean="0"/>
-              <a:t> </a:t>
+              <a:t>object </a:t>
             </a:r>
             <a:r>
               <a:rPr lang="en-US" altLang="ko-KR" dirty="0" err="1" smtClean="0"/>
@@ -6714,11 +6787,7 @@
             </a:r>
             <a:r>
               <a:rPr lang="en-US" altLang="ko-KR" sz="1600" dirty="0" smtClean="0"/>
-              <a:t>(Socket): Future[List[Key</a:t>
-            </a:r>
-            <a:r>
-              <a:rPr lang="en-US" altLang="ko-KR" sz="1600" dirty="0" smtClean="0"/>
-              <a:t>]]</a:t>
+              <a:t>(Socket): Future[List[Key]]</a:t>
             </a:r>
           </a:p>
           <a:p>
@@ -6896,11 +6965,7 @@
             </a:r>
             <a:r>
               <a:rPr lang="en-US" altLang="ko-KR" sz="1600" dirty="0" smtClean="0"/>
-              <a:t>(): </a:t>
-            </a:r>
-            <a:r>
-              <a:rPr lang="en-US" altLang="ko-KR" sz="1600" dirty="0" smtClean="0"/>
-              <a:t>Unit</a:t>
+              <a:t>(): Unit</a:t>
             </a:r>
             <a:endParaRPr lang="en-US" altLang="ko-KR" sz="1600" dirty="0"/>
           </a:p>
@@ -6916,13 +6981,8 @@
             </a:r>
             <a:r>
               <a:rPr lang="en-US" altLang="ko-KR" sz="1600" dirty="0" smtClean="0"/>
-              <a:t>(): </a:t>
-            </a:r>
-            <a:r>
-              <a:rPr lang="en-US" altLang="ko-KR" sz="1600" dirty="0" smtClean="0"/>
-              <a:t>Unit</a:t>
-            </a:r>
-            <a:endParaRPr lang="en-US" altLang="ko-KR" sz="1600" dirty="0" smtClean="0"/>
+              <a:t>(): Unit</a:t>
+            </a:r>
           </a:p>
           <a:p>
             <a:pPr marL="742950" lvl="1" indent="-285750">
@@ -7716,7 +7776,7 @@
             </a:r>
             <a:r>
               <a:rPr lang="en-US" altLang="ko-KR" dirty="0" err="1" smtClean="0"/>
-              <a:t>MsgEqualsToInterpretationOfItsByteArray</a:t>
+              <a:t>MsgEqualsToInterpretation</a:t>
             </a:r>
             <a:endParaRPr lang="ko-KR" altLang="en-US" dirty="0"/>
           </a:p>
@@ -7793,6 +7853,13 @@
             <a:r>
               <a:rPr lang="en-US" altLang="ko-KR" dirty="0" err="1" smtClean="0"/>
               <a:t>SlaveListUpdatedAfterConnection</a:t>
+            </a:r>
+            <a:endParaRPr lang="en-US" altLang="ko-KR" dirty="0" smtClean="0"/>
+          </a:p>
+          <a:p>
+            <a:r>
+              <a:rPr lang="en-US" altLang="ko-KR" dirty="0" err="1" smtClean="0"/>
+              <a:t>AcceptLoopTerminatesAfterExpectedNumOfConnections</a:t>
             </a:r>
             <a:endParaRPr lang="en-US" altLang="ko-KR" dirty="0" smtClean="0"/>
           </a:p>
@@ -9573,15 +9640,7 @@
                       </a:pPr>
                       <a:r>
                         <a:rPr lang="en-US" altLang="ko-KR" sz="1400" b="0" baseline="0" dirty="0" smtClean="0"/>
-                        <a:t>Data </a:t>
-                      </a:r>
-                      <a:r>
-                        <a:rPr lang="en-US" altLang="ko-KR" sz="1400" b="0" baseline="0" dirty="0" smtClean="0"/>
-                        <a:t>(4000 </a:t>
-                      </a:r>
-                      <a:r>
-                        <a:rPr lang="en-US" altLang="ko-KR" sz="1400" b="0" baseline="0" dirty="0" smtClean="0"/>
-                        <a:t>bytes, </a:t>
+                        <a:t>Data (4000 bytes, </a:t>
                       </a:r>
                       <a:r>
                         <a:rPr lang="en-US" altLang="ko-KR" sz="1400" baseline="0" dirty="0" smtClean="0"/>

</xml_diff>

<commit_message>
Sample into single string
</commit_message>
<xml_diff>
--- a/project.pptx
+++ b/project.pptx
@@ -271,7 +271,7 @@
           <a:p>
             <a:fld id="{33CC212C-81FB-40F3-BD5E-91ADD12CE53F}" type="datetimeFigureOut">
               <a:rPr lang="ko-KR" altLang="en-US" smtClean="0"/>
-              <a:t>2016-10-30</a:t>
+              <a:t>2016-10-31</a:t>
             </a:fld>
             <a:endParaRPr lang="ko-KR" altLang="en-US"/>
           </a:p>
@@ -441,7 +441,7 @@
           <a:p>
             <a:fld id="{33CC212C-81FB-40F3-BD5E-91ADD12CE53F}" type="datetimeFigureOut">
               <a:rPr lang="ko-KR" altLang="en-US" smtClean="0"/>
-              <a:t>2016-10-30</a:t>
+              <a:t>2016-10-31</a:t>
             </a:fld>
             <a:endParaRPr lang="ko-KR" altLang="en-US"/>
           </a:p>
@@ -621,7 +621,7 @@
           <a:p>
             <a:fld id="{33CC212C-81FB-40F3-BD5E-91ADD12CE53F}" type="datetimeFigureOut">
               <a:rPr lang="ko-KR" altLang="en-US" smtClean="0"/>
-              <a:t>2016-10-30</a:t>
+              <a:t>2016-10-31</a:t>
             </a:fld>
             <a:endParaRPr lang="ko-KR" altLang="en-US"/>
           </a:p>
@@ -791,7 +791,7 @@
           <a:p>
             <a:fld id="{33CC212C-81FB-40F3-BD5E-91ADD12CE53F}" type="datetimeFigureOut">
               <a:rPr lang="ko-KR" altLang="en-US" smtClean="0"/>
-              <a:t>2016-10-30</a:t>
+              <a:t>2016-10-31</a:t>
             </a:fld>
             <a:endParaRPr lang="ko-KR" altLang="en-US"/>
           </a:p>
@@ -1037,7 +1037,7 @@
           <a:p>
             <a:fld id="{33CC212C-81FB-40F3-BD5E-91ADD12CE53F}" type="datetimeFigureOut">
               <a:rPr lang="ko-KR" altLang="en-US" smtClean="0"/>
-              <a:t>2016-10-30</a:t>
+              <a:t>2016-10-31</a:t>
             </a:fld>
             <a:endParaRPr lang="ko-KR" altLang="en-US"/>
           </a:p>
@@ -1269,7 +1269,7 @@
           <a:p>
             <a:fld id="{33CC212C-81FB-40F3-BD5E-91ADD12CE53F}" type="datetimeFigureOut">
               <a:rPr lang="ko-KR" altLang="en-US" smtClean="0"/>
-              <a:t>2016-10-30</a:t>
+              <a:t>2016-10-31</a:t>
             </a:fld>
             <a:endParaRPr lang="ko-KR" altLang="en-US"/>
           </a:p>
@@ -1636,7 +1636,7 @@
           <a:p>
             <a:fld id="{33CC212C-81FB-40F3-BD5E-91ADD12CE53F}" type="datetimeFigureOut">
               <a:rPr lang="ko-KR" altLang="en-US" smtClean="0"/>
-              <a:t>2016-10-30</a:t>
+              <a:t>2016-10-31</a:t>
             </a:fld>
             <a:endParaRPr lang="ko-KR" altLang="en-US"/>
           </a:p>
@@ -1754,7 +1754,7 @@
           <a:p>
             <a:fld id="{33CC212C-81FB-40F3-BD5E-91ADD12CE53F}" type="datetimeFigureOut">
               <a:rPr lang="ko-KR" altLang="en-US" smtClean="0"/>
-              <a:t>2016-10-30</a:t>
+              <a:t>2016-10-31</a:t>
             </a:fld>
             <a:endParaRPr lang="ko-KR" altLang="en-US"/>
           </a:p>
@@ -1849,7 +1849,7 @@
           <a:p>
             <a:fld id="{33CC212C-81FB-40F3-BD5E-91ADD12CE53F}" type="datetimeFigureOut">
               <a:rPr lang="ko-KR" altLang="en-US" smtClean="0"/>
-              <a:t>2016-10-30</a:t>
+              <a:t>2016-10-31</a:t>
             </a:fld>
             <a:endParaRPr lang="ko-KR" altLang="en-US"/>
           </a:p>
@@ -2126,7 +2126,7 @@
           <a:p>
             <a:fld id="{33CC212C-81FB-40F3-BD5E-91ADD12CE53F}" type="datetimeFigureOut">
               <a:rPr lang="ko-KR" altLang="en-US" smtClean="0"/>
-              <a:t>2016-10-30</a:t>
+              <a:t>2016-10-31</a:t>
             </a:fld>
             <a:endParaRPr lang="ko-KR" altLang="en-US"/>
           </a:p>
@@ -2379,7 +2379,7 @@
           <a:p>
             <a:fld id="{33CC212C-81FB-40F3-BD5E-91ADD12CE53F}" type="datetimeFigureOut">
               <a:rPr lang="ko-KR" altLang="en-US" smtClean="0"/>
-              <a:t>2016-10-30</a:t>
+              <a:t>2016-10-31</a:t>
             </a:fld>
             <a:endParaRPr lang="ko-KR" altLang="en-US"/>
           </a:p>
@@ -2592,7 +2592,7 @@
           <a:p>
             <a:fld id="{33CC212C-81FB-40F3-BD5E-91ADD12CE53F}" type="datetimeFigureOut">
               <a:rPr lang="ko-KR" altLang="en-US" smtClean="0"/>
-              <a:t>2016-10-30</a:t>
+              <a:t>2016-10-31</a:t>
             </a:fld>
             <a:endParaRPr lang="ko-KR" altLang="en-US"/>
           </a:p>
@@ -8184,11 +8184,7 @@
             </a:r>
             <a:r>
               <a:rPr lang="en-US" altLang="ko-KR" sz="1100" dirty="0" err="1" smtClean="0"/>
-              <a:t>Mutable</a:t>
-            </a:r>
-            <a:r>
-              <a:rPr lang="en-US" altLang="ko-KR" sz="1100" dirty="0" err="1" smtClean="0"/>
-              <a:t>List</a:t>
+              <a:t>MutableList</a:t>
             </a:r>
             <a:r>
               <a:rPr lang="en-US" altLang="ko-KR" sz="1100" dirty="0" smtClean="0"/>
@@ -8207,19 +8203,11 @@
             <a:pPr algn="ctr"/>
             <a:r>
               <a:rPr lang="en-US" altLang="ko-KR" sz="1100" dirty="0" smtClean="0"/>
-              <a:t>slaves</a:t>
-            </a:r>
-            <a:r>
-              <a:rPr lang="en-US" altLang="ko-KR" sz="1100" dirty="0" smtClean="0"/>
-              <a:t>: </a:t>
+              <a:t>slaves: </a:t>
             </a:r>
             <a:r>
               <a:rPr lang="en-US" altLang="ko-KR" sz="1100" dirty="0" err="1" smtClean="0"/>
-              <a:t>Mutable</a:t>
-            </a:r>
-            <a:r>
-              <a:rPr lang="en-US" altLang="ko-KR" sz="1100" dirty="0" err="1" smtClean="0"/>
-              <a:t>List</a:t>
+              <a:t>MutableList</a:t>
             </a:r>
             <a:r>
               <a:rPr lang="en-US" altLang="ko-KR" sz="1100" dirty="0" smtClean="0"/>
@@ -8227,11 +8215,7 @@
             </a:r>
             <a:r>
               <a:rPr lang="en-US" altLang="ko-KR" sz="1100" dirty="0" err="1" smtClean="0"/>
-              <a:t>Socket</a:t>
-            </a:r>
-            <a:r>
-              <a:rPr lang="en-US" altLang="ko-KR" sz="1100" dirty="0" err="1" smtClean="0"/>
-              <a:t>Handler</a:t>
+              <a:t>SocketHandler</a:t>
             </a:r>
             <a:r>
               <a:rPr lang="en-US" altLang="ko-KR" sz="1100" dirty="0" smtClean="0"/>
@@ -8539,15 +8523,7 @@
             </a:pPr>
             <a:r>
               <a:rPr lang="en-US" altLang="ko-KR" sz="1100" dirty="0" smtClean="0"/>
-              <a:t>Append handler </a:t>
-            </a:r>
-            <a:r>
-              <a:rPr lang="en-US" altLang="ko-KR" sz="1100" dirty="0" smtClean="0"/>
-              <a:t>to </a:t>
-            </a:r>
-            <a:r>
-              <a:rPr lang="en-US" altLang="ko-KR" sz="1100" dirty="0" smtClean="0"/>
-              <a:t>slaves</a:t>
+              <a:t>Append handler to slaves</a:t>
             </a:r>
           </a:p>
           <a:p>
@@ -8559,7 +8535,6 @@
               <a:rPr lang="en-US" altLang="ko-KR" sz="1100" dirty="0" smtClean="0"/>
               <a:t>Append sample to samples</a:t>
             </a:r>
-            <a:endParaRPr lang="en-US" altLang="ko-KR" sz="1100" dirty="0" smtClean="0"/>
           </a:p>
           <a:p>
             <a:pPr marL="171450" indent="-171450">
@@ -8568,11 +8543,7 @@
             </a:pPr>
             <a:r>
               <a:rPr lang="en-US" altLang="ko-KR" sz="1100" dirty="0" smtClean="0"/>
-              <a:t>Remove handler </a:t>
-            </a:r>
-            <a:r>
-              <a:rPr lang="en-US" altLang="ko-KR" sz="1100" dirty="0" smtClean="0"/>
-              <a:t>from connected</a:t>
+              <a:t>Remove handler from connected</a:t>
             </a:r>
           </a:p>
         </p:txBody>
@@ -9603,11 +9574,7 @@
             <a:pPr algn="ctr"/>
             <a:r>
               <a:rPr lang="en-US" altLang="ko-KR" sz="1100" dirty="0" smtClean="0"/>
-              <a:t>Create </a:t>
-            </a:r>
-            <a:r>
-              <a:rPr lang="en-US" altLang="ko-KR" sz="1100" dirty="0" smtClean="0"/>
-              <a:t>Sampler</a:t>
+              <a:t>Create Sampler</a:t>
             </a:r>
           </a:p>
         </p:txBody>
@@ -11202,11 +11169,7 @@
             </a:r>
             <a:r>
               <a:rPr lang="en-US" altLang="ko-KR" dirty="0" smtClean="0"/>
-              <a:t> - Connection </a:t>
-            </a:r>
-            <a:r>
-              <a:rPr lang="en-US" altLang="ko-KR" dirty="0" smtClean="0"/>
-              <a:t>(Master)</a:t>
+              <a:t> - Connection (Master)</a:t>
             </a:r>
             <a:endParaRPr lang="ko-KR" altLang="en-US" dirty="0"/>
           </a:p>
@@ -11335,7 +11298,6 @@
                         <a:rPr lang="en-US" altLang="ko-KR" sz="1100" dirty="0" smtClean="0"/>
                         <a:t>]</a:t>
                       </a:r>
-                      <a:endParaRPr lang="en-US" altLang="ko-KR" sz="1100" dirty="0" smtClean="0"/>
                     </a:p>
                     <a:p>
                       <a:pPr marL="171450" indent="-171450" latinLnBrk="1">
@@ -11344,11 +11306,7 @@
                       </a:pPr>
                       <a:r>
                         <a:rPr lang="en-US" altLang="ko-KR" sz="1100" dirty="0" smtClean="0"/>
-                        <a:t>slaves</a:t>
-                      </a:r>
-                      <a:r>
-                        <a:rPr lang="en-US" altLang="ko-KR" sz="1100" dirty="0" smtClean="0"/>
-                        <a:t>: </a:t>
+                        <a:t>slaves: </a:t>
                       </a:r>
                       <a:r>
                         <a:rPr lang="en-US" altLang="ko-KR" sz="1100" dirty="0" err="1" smtClean="0"/>
@@ -11384,7 +11342,6 @@
                         <a:rPr lang="en-US" altLang="ko-KR" sz="1100" dirty="0" smtClean="0"/>
                         <a:t>[Key]</a:t>
                       </a:r>
-                      <a:endParaRPr lang="en-US" altLang="ko-KR" sz="1100" dirty="0" smtClean="0"/>
                     </a:p>
                     <a:p>
                       <a:pPr marL="171450" indent="-171450" latinLnBrk="1">
@@ -11479,11 +11436,7 @@
                       </a:r>
                       <a:r>
                         <a:rPr lang="en-US" altLang="ko-KR" sz="1100" baseline="0" dirty="0" smtClean="0"/>
-                        <a:t>(Message): </a:t>
-                      </a:r>
-                      <a:r>
-                        <a:rPr lang="en-US" altLang="ko-KR" sz="1100" baseline="0" dirty="0" smtClean="0"/>
-                        <a:t>Unit</a:t>
+                        <a:t>(Message): Unit</a:t>
                       </a:r>
                     </a:p>
                     <a:p>
@@ -11858,11 +11811,7 @@
                       </a:pPr>
                       <a:r>
                         <a:rPr lang="en-US" altLang="ko-KR" sz="1100" dirty="0" smtClean="0"/>
-                        <a:t>socket: </a:t>
-                      </a:r>
-                      <a:r>
-                        <a:rPr lang="en-US" altLang="ko-KR" sz="1100" dirty="0" smtClean="0"/>
-                        <a:t>Socket</a:t>
+                        <a:t>socket: Socket</a:t>
                       </a:r>
                     </a:p>
                     <a:p>
@@ -11906,15 +11855,7 @@
                       <a:pPr latinLnBrk="1"/>
                       <a:r>
                         <a:rPr lang="en-US" altLang="ko-KR" sz="1100" baseline="0" dirty="0" smtClean="0"/>
-                        <a:t>+ </a:t>
-                      </a:r>
-                      <a:r>
-                        <a:rPr lang="en-US" altLang="ko-KR" sz="1100" baseline="0" dirty="0" smtClean="0"/>
-                        <a:t>run(): </a:t>
-                      </a:r>
-                      <a:r>
-                        <a:rPr lang="en-US" altLang="ko-KR" sz="1100" baseline="0" dirty="0" smtClean="0"/>
-                        <a:t>Unit</a:t>
+                        <a:t>+ run(): Unit</a:t>
                       </a:r>
                     </a:p>
                     <a:p>
@@ -12092,11 +12033,7 @@
                       </a:r>
                       <a:r>
                         <a:rPr lang="en-US" altLang="ko-KR" sz="1100" dirty="0" smtClean="0"/>
-                        <a:t>[Message</a:t>
-                      </a:r>
-                      <a:r>
-                        <a:rPr lang="en-US" altLang="ko-KR" sz="1100" dirty="0" smtClean="0"/>
-                        <a:t>]</a:t>
+                        <a:t>[Message]</a:t>
                       </a:r>
                       <a:endParaRPr lang="ko-KR" altLang="en-US" sz="1100" dirty="0"/>
                     </a:p>
@@ -12247,11 +12184,7 @@
           <a:p>
             <a:r>
               <a:rPr lang="en-US" altLang="ko-KR" dirty="0" smtClean="0"/>
-              <a:t>Sample – Connection </a:t>
-            </a:r>
-            <a:r>
-              <a:rPr lang="en-US" altLang="ko-KR" dirty="0" smtClean="0"/>
-              <a:t>(Slave)</a:t>
+              <a:t>Sample – Connection (Slave)</a:t>
             </a:r>
             <a:endParaRPr lang="ko-KR" altLang="en-US" dirty="0"/>
           </a:p>
@@ -12266,7 +12199,7 @@
           <p:nvPr>
             <p:extLst>
               <p:ext uri="{D42A27DB-BD31-4B8C-83A1-F6EECF244321}">
-                <p14:modId xmlns:p14="http://schemas.microsoft.com/office/powerpoint/2010/main" val="2668726897"/>
+                <p14:modId xmlns:p14="http://schemas.microsoft.com/office/powerpoint/2010/main" val="3470942168"/>
               </p:ext>
             </p:extLst>
           </p:nvPr>
@@ -12407,53 +12340,115 @@
                     <a:bodyPr/>
                     <a:lstStyle/>
                     <a:p>
-                      <a:pPr marL="171450" indent="-171450" latinLnBrk="1">
+                      <a:pPr marL="0" marR="0" indent="0" algn="l" defTabSz="914400" rtl="0" eaLnBrk="1" fontAlgn="auto" latinLnBrk="1" hangingPunct="1">
+                        <a:lnSpc>
+                          <a:spcPct val="100000"/>
+                        </a:lnSpc>
+                        <a:spcBef>
+                          <a:spcPts val="0"/>
+                        </a:spcBef>
+                        <a:spcAft>
+                          <a:spcPts val="0"/>
+                        </a:spcAft>
+                        <a:buClrTx/>
+                        <a:buSzTx/>
+                        <a:buFontTx/>
+                        <a:buNone/>
+                        <a:tabLst/>
+                        <a:defRPr/>
+                      </a:pPr>
+                      <a:r>
+                        <a:rPr lang="en-US" altLang="ko-KR" sz="1100" baseline="0" dirty="0" smtClean="0"/>
+                        <a:t># </a:t>
+                      </a:r>
+                      <a:r>
+                        <a:rPr lang="en-US" altLang="ko-KR" sz="1100" baseline="0" dirty="0" err="1" smtClean="0"/>
+                        <a:t>handleMessage</a:t>
+                      </a:r>
+                      <a:r>
+                        <a:rPr lang="en-US" altLang="ko-KR" sz="1100" baseline="0" dirty="0" smtClean="0"/>
+                        <a:t>(Message): Unit</a:t>
+                      </a:r>
+                    </a:p>
+                    <a:p>
+                      <a:pPr marL="171450" marR="0" indent="-171450" algn="l" defTabSz="914400" rtl="0" eaLnBrk="1" fontAlgn="auto" latinLnBrk="1" hangingPunct="1">
+                        <a:lnSpc>
+                          <a:spcPct val="100000"/>
+                        </a:lnSpc>
+                        <a:spcBef>
+                          <a:spcPts val="0"/>
+                        </a:spcBef>
+                        <a:spcAft>
+                          <a:spcPts val="0"/>
+                        </a:spcAft>
+                        <a:buClrTx/>
+                        <a:buSzTx/>
                         <a:buFontTx/>
                         <a:buChar char="-"/>
+                        <a:tabLst/>
+                        <a:defRPr/>
                       </a:pPr>
                       <a:r>
-                        <a:rPr lang="en-US" altLang="ko-KR" sz="1100" dirty="0" err="1" smtClean="0"/>
-                        <a:t>createMasterHandler</a:t>
-                      </a:r>
-                      <a:r>
-                        <a:rPr lang="en-US" altLang="ko-KR" sz="1100" dirty="0" smtClean="0"/>
-                        <a:t>(Socket): Unit</a:t>
+                        <a:rPr lang="en-US" altLang="ko-KR" sz="1100" baseline="0" dirty="0" err="1" smtClean="0"/>
+                        <a:t>initHandleMessage</a:t>
+                      </a:r>
+                      <a:r>
+                        <a:rPr lang="en-US" altLang="ko-KR" sz="1100" baseline="0" dirty="0" smtClean="0"/>
+                        <a:t>(Message): Unit</a:t>
                       </a:r>
                     </a:p>
                     <a:p>
-                      <a:pPr marL="171450" indent="-171450" latinLnBrk="1">
+                      <a:pPr marL="171450" marR="0" indent="-171450" algn="l" defTabSz="914400" rtl="0" eaLnBrk="1" fontAlgn="auto" latinLnBrk="1" hangingPunct="1">
+                        <a:lnSpc>
+                          <a:spcPct val="100000"/>
+                        </a:lnSpc>
+                        <a:spcBef>
+                          <a:spcPts val="0"/>
+                        </a:spcBef>
+                        <a:spcAft>
+                          <a:spcPts val="0"/>
+                        </a:spcAft>
+                        <a:buClrTx/>
+                        <a:buSzTx/>
                         <a:buFontTx/>
                         <a:buChar char="-"/>
+                        <a:tabLst/>
+                        <a:defRPr/>
                       </a:pPr>
                       <a:r>
-                        <a:rPr lang="en-US" altLang="ko-KR" sz="1100" dirty="0" err="1" smtClean="0"/>
-                        <a:t>addSlave</a:t>
-                      </a:r>
-                      <a:r>
-                        <a:rPr lang="en-US" altLang="ko-KR" sz="1100" dirty="0" smtClean="0"/>
-                        <a:t>(</a:t>
-                      </a:r>
-                      <a:r>
-                        <a:rPr lang="en-US" altLang="ko-KR" sz="1100" dirty="0" err="1" smtClean="0"/>
-                        <a:t>SlaveHandler</a:t>
-                      </a:r>
-                      <a:r>
-                        <a:rPr lang="en-US" altLang="ko-KR" sz="1100" dirty="0" smtClean="0"/>
-                        <a:t>): Unit</a:t>
+                        <a:rPr lang="en-US" altLang="ko-KR" sz="1100" baseline="0" dirty="0" err="1" smtClean="0"/>
+                        <a:t>handleConnectionMessage</a:t>
+                      </a:r>
+                      <a:r>
+                        <a:rPr lang="en-US" altLang="ko-KR" sz="1100" baseline="0" dirty="0" smtClean="0"/>
+                        <a:t>(Message): Unit</a:t>
                       </a:r>
                     </a:p>
                     <a:p>
-                      <a:pPr marL="171450" indent="-171450" latinLnBrk="1">
+                      <a:pPr marL="171450" marR="0" indent="-171450" algn="l" defTabSz="914400" rtl="0" eaLnBrk="1" fontAlgn="auto" latinLnBrk="1" hangingPunct="1">
+                        <a:lnSpc>
+                          <a:spcPct val="100000"/>
+                        </a:lnSpc>
+                        <a:spcBef>
+                          <a:spcPts val="0"/>
+                        </a:spcBef>
+                        <a:spcAft>
+                          <a:spcPts val="0"/>
+                        </a:spcAft>
+                        <a:buClrTx/>
+                        <a:buSzTx/>
                         <a:buFontTx/>
                         <a:buChar char="-"/>
+                        <a:tabLst/>
+                        <a:defRPr/>
                       </a:pPr>
                       <a:r>
-                        <a:rPr lang="en-US" altLang="ko-KR" sz="1100" dirty="0" err="1" smtClean="0"/>
-                        <a:t>closeSocketExceptSlaves</a:t>
-                      </a:r>
-                      <a:r>
-                        <a:rPr lang="en-US" altLang="ko-KR" sz="1100" dirty="0" smtClean="0"/>
-                        <a:t>(): Unit</a:t>
+                        <a:rPr lang="en-US" altLang="ko-KR" sz="1100" baseline="0" dirty="0" err="1" smtClean="0"/>
+                        <a:t>handleSampleMessage</a:t>
+                      </a:r>
+                      <a:r>
+                        <a:rPr lang="en-US" altLang="ko-KR" sz="1100" baseline="0" smtClean="0"/>
+                        <a:t>(Message): Unit</a:t>
                       </a:r>
                     </a:p>
                     <a:p>
@@ -12476,41 +12471,6 @@
                       </a:pPr>
                       <a:r>
                         <a:rPr lang="en-US" altLang="ko-KR" sz="1100" baseline="0" dirty="0" smtClean="0"/>
-                        <a:t># </a:t>
-                      </a:r>
-                      <a:r>
-                        <a:rPr lang="en-US" altLang="ko-KR" sz="1100" baseline="0" dirty="0" err="1" smtClean="0"/>
-                        <a:t>handleMessage</a:t>
-                      </a:r>
-                      <a:r>
-                        <a:rPr lang="en-US" altLang="ko-KR" sz="1100" baseline="0" dirty="0" smtClean="0"/>
-                        <a:t>(Message): </a:t>
-                      </a:r>
-                      <a:r>
-                        <a:rPr lang="en-US" altLang="ko-KR" sz="1100" baseline="0" dirty="0" smtClean="0"/>
-                        <a:t>Unit</a:t>
-                      </a:r>
-                    </a:p>
-                    <a:p>
-                      <a:pPr marL="0" marR="0" indent="0" algn="l" defTabSz="914400" rtl="0" eaLnBrk="1" fontAlgn="auto" latinLnBrk="1" hangingPunct="1">
-                        <a:lnSpc>
-                          <a:spcPct val="100000"/>
-                        </a:lnSpc>
-                        <a:spcBef>
-                          <a:spcPts val="0"/>
-                        </a:spcBef>
-                        <a:spcAft>
-                          <a:spcPts val="0"/>
-                        </a:spcAft>
-                        <a:buClrTx/>
-                        <a:buSzTx/>
-                        <a:buFontTx/>
-                        <a:buNone/>
-                        <a:tabLst/>
-                        <a:defRPr/>
-                      </a:pPr>
-                      <a:r>
-                        <a:rPr lang="en-US" altLang="ko-KR" sz="1100" baseline="0" dirty="0" smtClean="0"/>
                         <a:t>+ </a:t>
                       </a:r>
                       <a:r>
@@ -12529,7 +12489,6 @@
                         <a:rPr lang="en-US" altLang="ko-KR" sz="1100" baseline="0" dirty="0" smtClean="0"/>
                         <a:t>): Unit</a:t>
                       </a:r>
-                      <a:endParaRPr lang="en-US" altLang="ko-KR" sz="1100" baseline="0" dirty="0" smtClean="0"/>
                     </a:p>
                     <a:p>
                       <a:pPr marL="171450" indent="-171450" latinLnBrk="1">
@@ -12671,11 +12630,7 @@
                       </a:pPr>
                       <a:r>
                         <a:rPr lang="en-US" altLang="ko-KR" sz="1100" dirty="0" smtClean="0"/>
-                        <a:t>socket: </a:t>
-                      </a:r>
-                      <a:r>
-                        <a:rPr lang="en-US" altLang="ko-KR" sz="1100" dirty="0" smtClean="0"/>
-                        <a:t>Socket</a:t>
+                        <a:t>socket: Socket</a:t>
                       </a:r>
                     </a:p>
                     <a:p>
@@ -12732,15 +12687,7 @@
                       <a:pPr latinLnBrk="1"/>
                       <a:r>
                         <a:rPr lang="en-US" altLang="ko-KR" sz="1100" baseline="0" dirty="0" smtClean="0"/>
-                        <a:t>+ </a:t>
-                      </a:r>
-                      <a:r>
-                        <a:rPr lang="en-US" altLang="ko-KR" sz="1100" baseline="0" dirty="0" smtClean="0"/>
-                        <a:t>run(): </a:t>
-                      </a:r>
-                      <a:r>
-                        <a:rPr lang="en-US" altLang="ko-KR" sz="1100" baseline="0" dirty="0" smtClean="0"/>
-                        <a:t>Unit</a:t>
+                        <a:t>+ run(): Unit</a:t>
                       </a:r>
                     </a:p>
                     <a:p>
@@ -12882,11 +12829,7 @@
                       </a:r>
                       <a:r>
                         <a:rPr lang="en-US" altLang="ko-KR" sz="1100" dirty="0" smtClean="0"/>
-                        <a:t>[Message</a:t>
-                      </a:r>
-                      <a:r>
-                        <a:rPr lang="en-US" altLang="ko-KR" sz="1100" dirty="0" smtClean="0"/>
-                        <a:t>]</a:t>
+                        <a:t>[Message]</a:t>
                       </a:r>
                       <a:endParaRPr lang="ko-KR" altLang="en-US" sz="1100" dirty="0"/>
                     </a:p>
@@ -14219,7 +14162,13 @@
               <a:rPr lang="en-US" altLang="ko-KR" sz="1400" dirty="0" err="1" smtClean="0">
                 <a:latin typeface="+mn-ea"/>
               </a:rPr>
-              <a:t>PicklableMessage</a:t>
+              <a:t>Send</a:t>
+            </a:r>
+            <a:r>
+              <a:rPr lang="en-US" altLang="ko-KR" sz="1400" dirty="0" err="1" smtClean="0">
+                <a:latin typeface="+mn-ea"/>
+              </a:rPr>
+              <a:t>ableMessage</a:t>
             </a:r>
             <a:endParaRPr lang="en-US" altLang="ko-KR" sz="1400" dirty="0">
               <a:latin typeface="+mn-ea"/>
@@ -14247,10 +14196,88 @@
               <a:t> </a:t>
             </a:r>
             <a:r>
+              <a:rPr lang="ko-KR" altLang="ko-KR" sz="1400" dirty="0" err="1" smtClean="0">
+                <a:latin typeface="+mn-ea"/>
+              </a:rPr>
+              <a:t>class</a:t>
+            </a:r>
+            <a:r>
+              <a:rPr lang="en-US" altLang="ko-KR" sz="1400" dirty="0">
+                <a:latin typeface="+mn-ea"/>
+              </a:rPr>
+              <a:t> </a:t>
+            </a:r>
+            <a:r>
+              <a:rPr lang="en-US" altLang="ko-KR" sz="1400" dirty="0" err="1" smtClean="0">
+                <a:latin typeface="+mn-ea"/>
+              </a:rPr>
+              <a:t>Sendable</a:t>
+            </a:r>
+            <a:r>
+              <a:rPr lang="ko-KR" altLang="ko-KR" sz="1400" dirty="0" err="1" smtClean="0">
+                <a:latin typeface="+mn-ea"/>
+              </a:rPr>
+              <a:t>SampleMessage</a:t>
+            </a:r>
+            <a:r>
+              <a:rPr lang="ko-KR" altLang="ko-KR" sz="1400" dirty="0" smtClean="0">
+                <a:latin typeface="+mn-ea"/>
+              </a:rPr>
+              <a:t>(</a:t>
+            </a:r>
+            <a:r>
+              <a:rPr lang="ko-KR" altLang="ko-KR" sz="1400" dirty="0" err="1" smtClean="0">
+                <a:latin typeface="+mn-ea"/>
+              </a:rPr>
+              <a:t>numData</a:t>
+            </a:r>
+            <a:r>
+              <a:rPr lang="ko-KR" altLang="ko-KR" sz="1400" dirty="0">
+                <a:latin typeface="+mn-ea"/>
+              </a:rPr>
+              <a:t>: </a:t>
+            </a:r>
+            <a:r>
               <a:rPr lang="ko-KR" altLang="ko-KR" sz="1400" dirty="0" err="1">
                 <a:latin typeface="+mn-ea"/>
               </a:rPr>
-              <a:t>class</a:t>
+              <a:t>Int</a:t>
+            </a:r>
+            <a:r>
+              <a:rPr lang="ko-KR" altLang="ko-KR" sz="1400" dirty="0">
+                <a:latin typeface="+mn-ea"/>
+              </a:rPr>
+              <a:t>, </a:t>
+            </a:r>
+            <a:r>
+              <a:rPr lang="ko-KR" altLang="ko-KR" sz="1400" dirty="0" err="1">
+                <a:latin typeface="+mn-ea"/>
+              </a:rPr>
+              <a:t>keys</a:t>
+            </a:r>
+            <a:r>
+              <a:rPr lang="ko-KR" altLang="ko-KR" sz="1400" dirty="0">
+                <a:latin typeface="+mn-ea"/>
+              </a:rPr>
+              <a:t>: </a:t>
+            </a:r>
+            <a:r>
+              <a:rPr lang="en-US" altLang="ko-KR" sz="1400" dirty="0" smtClean="0">
+                <a:latin typeface="+mn-ea"/>
+              </a:rPr>
+              <a:t>String</a:t>
+            </a:r>
+            <a:r>
+              <a:rPr lang="ko-KR" altLang="ko-KR" sz="1400" dirty="0" smtClean="0">
+                <a:latin typeface="+mn-ea"/>
+              </a:rPr>
+              <a:t>) </a:t>
+            </a:r>
+            <a:r>
+              <a:rPr lang="ko-KR" altLang="ko-KR" sz="1400" dirty="0" err="1">
+                <a:latin typeface="+mn-ea"/>
+              </a:rPr>
+              <a:t>extends</a:t>
             </a:r>
             <a:r>
               <a:rPr lang="ko-KR" altLang="ko-KR" sz="1400" dirty="0">
@@ -14262,97 +14289,13 @@
               <a:rPr lang="en-US" altLang="ko-KR" sz="1400" dirty="0" err="1" smtClean="0">
                 <a:latin typeface="+mn-ea"/>
               </a:rPr>
-              <a:t>Picklable</a:t>
-            </a:r>
-            <a:r>
-              <a:rPr lang="ko-KR" altLang="ko-KR" sz="1400" dirty="0" err="1" smtClean="0">
-                <a:latin typeface="+mn-ea"/>
-              </a:rPr>
-              <a:t>SampleMessage</a:t>
-            </a:r>
-            <a:r>
-              <a:rPr lang="ko-KR" altLang="ko-KR" sz="1400" dirty="0" smtClean="0">
-                <a:latin typeface="+mn-ea"/>
-              </a:rPr>
-              <a:t>(</a:t>
-            </a:r>
-            <a:r>
-              <a:rPr lang="ko-KR" altLang="ko-KR" sz="1400" dirty="0" err="1" smtClean="0">
-                <a:latin typeface="+mn-ea"/>
-              </a:rPr>
-              <a:t>numData</a:t>
-            </a:r>
-            <a:r>
-              <a:rPr lang="ko-KR" altLang="ko-KR" sz="1400" dirty="0">
-                <a:latin typeface="+mn-ea"/>
-              </a:rPr>
-              <a:t>: </a:t>
-            </a:r>
-            <a:r>
-              <a:rPr lang="ko-KR" altLang="ko-KR" sz="1400" dirty="0" err="1">
-                <a:latin typeface="+mn-ea"/>
-              </a:rPr>
-              <a:t>Int</a:t>
-            </a:r>
-            <a:r>
-              <a:rPr lang="ko-KR" altLang="ko-KR" sz="1400" dirty="0">
-                <a:latin typeface="+mn-ea"/>
-              </a:rPr>
-              <a:t>, </a:t>
-            </a:r>
-            <a:r>
-              <a:rPr lang="ko-KR" altLang="ko-KR" sz="1400" dirty="0" err="1">
-                <a:latin typeface="+mn-ea"/>
-              </a:rPr>
-              <a:t>keys</a:t>
-            </a:r>
-            <a:r>
-              <a:rPr lang="ko-KR" altLang="ko-KR" sz="1400" dirty="0">
-                <a:latin typeface="+mn-ea"/>
-              </a:rPr>
-              <a:t>: </a:t>
-            </a:r>
-            <a:r>
-              <a:rPr lang="ko-KR" altLang="ko-KR" sz="1400" dirty="0" err="1" smtClean="0">
-                <a:latin typeface="+mn-ea"/>
-              </a:rPr>
-              <a:t>Array</a:t>
-            </a:r>
-            <a:r>
-              <a:rPr lang="ko-KR" altLang="ko-KR" sz="1400" dirty="0" smtClean="0">
-                <a:latin typeface="+mn-ea"/>
-              </a:rPr>
-              <a:t>[</a:t>
-            </a:r>
-            <a:r>
-              <a:rPr lang="ko-KR" altLang="ko-KR" sz="1400" dirty="0" err="1" smtClean="0">
-                <a:latin typeface="+mn-ea"/>
-              </a:rPr>
-              <a:t>Key</a:t>
-            </a:r>
-            <a:r>
-              <a:rPr lang="ko-KR" altLang="ko-KR" sz="1400" dirty="0" smtClean="0">
-                <a:latin typeface="+mn-ea"/>
-              </a:rPr>
-              <a:t>]) </a:t>
-            </a:r>
-            <a:r>
-              <a:rPr lang="ko-KR" altLang="ko-KR" sz="1400" dirty="0" err="1">
-                <a:latin typeface="+mn-ea"/>
-              </a:rPr>
-              <a:t>extends</a:t>
-            </a:r>
-            <a:r>
-              <a:rPr lang="ko-KR" altLang="ko-KR" sz="1400" dirty="0">
-                <a:latin typeface="+mn-ea"/>
-              </a:rPr>
-              <a:t> </a:t>
+              <a:t>Send</a:t>
             </a:r>
             <a:r>
               <a:rPr lang="en-US" altLang="ko-KR" sz="1400" dirty="0" err="1" smtClean="0">
                 <a:latin typeface="+mn-ea"/>
               </a:rPr>
-              <a:t>Picklable</a:t>
+              <a:t>able</a:t>
             </a:r>
             <a:r>
               <a:rPr lang="ko-KR" altLang="ko-KR" sz="1400" dirty="0" err="1" smtClean="0">
@@ -14964,13 +14907,8 @@
                       </a:pPr>
                       <a:r>
                         <a:rPr lang="en-US" altLang="ko-KR" sz="1400" b="0" dirty="0" smtClean="0"/>
-                        <a:t># of </a:t>
-                      </a:r>
-                      <a:r>
-                        <a:rPr lang="en-US" altLang="ko-KR" sz="1400" b="0" dirty="0" smtClean="0"/>
-                        <a:t>data</a:t>
-                      </a:r>
-                      <a:endParaRPr lang="en-US" altLang="ko-KR" sz="1400" b="0" dirty="0" smtClean="0"/>
+                        <a:t># of data</a:t>
+                      </a:r>
                     </a:p>
                     <a:p>
                       <a:pPr marL="285750" indent="-285750" latinLnBrk="1">
@@ -15729,17 +15667,8 @@
                       </a:r>
                       <a:r>
                         <a:rPr lang="en-US" altLang="ko-KR" sz="1400" baseline="0" dirty="0" smtClean="0"/>
-                        <a:t> </a:t>
-                      </a:r>
-                      <a:r>
-                        <a:rPr lang="en-US" altLang="ko-KR" sz="1400" baseline="0" dirty="0" smtClean="0"/>
-                        <a:t>of </a:t>
-                      </a:r>
-                      <a:r>
-                        <a:rPr lang="en-US" altLang="ko-KR" sz="1400" baseline="0" dirty="0" smtClean="0"/>
-                        <a:t>slaves</a:t>
-                      </a:r>
-                      <a:endParaRPr lang="en-US" altLang="ko-KR" sz="1400" baseline="0" dirty="0" smtClean="0"/>
+                        <a:t> of slaves</a:t>
+                      </a:r>
                     </a:p>
                     <a:p>
                       <a:pPr marL="285750" indent="-285750" latinLnBrk="1">
@@ -15748,11 +15677,7 @@
                       </a:pPr>
                       <a:r>
                         <a:rPr lang="en-US" altLang="ko-KR" sz="1400" baseline="0" dirty="0" smtClean="0"/>
-                        <a:t>Pivot </a:t>
-                      </a:r>
-                      <a:r>
-                        <a:rPr lang="en-US" altLang="ko-KR" sz="1400" baseline="0" dirty="0" smtClean="0"/>
-                        <a:t>values</a:t>
+                        <a:t>Pivot values</a:t>
                       </a:r>
                       <a:endParaRPr lang="ko-KR" altLang="en-US" sz="1400" b="0" dirty="0"/>
                     </a:p>

</xml_diff>

<commit_message>
Milestone 2 (Added Experiment result)
</commit_message>
<xml_diff>
--- a/project.pptx
+++ b/project.pptx
@@ -51,6 +51,11 @@
     <p:sldId id="345" r:id="rId45"/>
     <p:sldId id="347" r:id="rId46"/>
     <p:sldId id="346" r:id="rId47"/>
+    <p:sldId id="352" r:id="rId48"/>
+    <p:sldId id="354" r:id="rId49"/>
+    <p:sldId id="353" r:id="rId50"/>
+    <p:sldId id="355" r:id="rId51"/>
+    <p:sldId id="356" r:id="rId52"/>
   </p:sldIdLst>
   <p:sldSz cx="12192000" cy="6858000"/>
   <p:notesSz cx="6858000" cy="9144000"/>
@@ -16645,6 +16650,13 @@
               <a:rPr lang="en-US" altLang="ko-KR" dirty="0" smtClean="0"/>
               <a:t>Received, or sent file request</a:t>
             </a:r>
+          </a:p>
+          <a:p>
+            <a:pPr lvl="1"/>
+            <a:r>
+              <a:rPr lang="en-US" altLang="ko-KR" dirty="0" smtClean="0"/>
+              <a:t>Partition name is partition_{file #}_{partition #}_{owner #}</a:t>
+            </a:r>
             <a:endParaRPr lang="en-US" altLang="ko-KR" dirty="0" smtClean="0"/>
           </a:p>
           <a:p>
@@ -19414,6 +19426,295 @@
     <p:extLst>
       <p:ext uri="{BB962C8B-B14F-4D97-AF65-F5344CB8AC3E}">
         <p14:creationId xmlns:p14="http://schemas.microsoft.com/office/powerpoint/2010/main" val="2677597638"/>
+      </p:ext>
+    </p:extLst>
+  </p:cSld>
+  <p:clrMapOvr>
+    <a:masterClrMapping/>
+  </p:clrMapOvr>
+</p:sld>
+</file>
+
+<file path=ppt/slides/slide47.xml><?xml version="1.0" encoding="utf-8"?>
+<p:sld xmlns:a="http://schemas.openxmlformats.org/drawingml/2006/main" xmlns:r="http://schemas.openxmlformats.org/officeDocument/2006/relationships" xmlns:p="http://schemas.openxmlformats.org/presentationml/2006/main">
+  <p:cSld>
+    <p:spTree>
+      <p:nvGrpSpPr>
+        <p:cNvPr id="1" name=""/>
+        <p:cNvGrpSpPr/>
+        <p:nvPr/>
+      </p:nvGrpSpPr>
+      <p:grpSpPr>
+        <a:xfrm>
+          <a:off x="0" y="0"/>
+          <a:ext cx="0" cy="0"/>
+          <a:chOff x="0" y="0"/>
+          <a:chExt cx="0" cy="0"/>
+        </a:xfrm>
+      </p:grpSpPr>
+      <p:sp>
+        <p:nvSpPr>
+          <p:cNvPr id="2" name="제목 1"/>
+          <p:cNvSpPr>
+            <a:spLocks noGrp="1"/>
+          </p:cNvSpPr>
+          <p:nvPr>
+            <p:ph type="title"/>
+          </p:nvPr>
+        </p:nvSpPr>
+        <p:spPr>
+          <a:xfrm>
+            <a:off x="4238297" y="2814035"/>
+            <a:ext cx="10515600" cy="1325563"/>
+          </a:xfrm>
+        </p:spPr>
+        <p:txBody>
+          <a:bodyPr/>
+          <a:lstStyle/>
+          <a:p>
+            <a:r>
+              <a:rPr lang="en-US" altLang="ko-KR" dirty="0" smtClean="0"/>
+              <a:t>Milestone 2</a:t>
+            </a:r>
+            <a:endParaRPr lang="ko-KR" altLang="en-US" dirty="0"/>
+          </a:p>
+        </p:txBody>
+      </p:sp>
+    </p:spTree>
+    <p:extLst>
+      <p:ext uri="{BB962C8B-B14F-4D97-AF65-F5344CB8AC3E}">
+        <p14:creationId xmlns:p14="http://schemas.microsoft.com/office/powerpoint/2010/main" val="2713403401"/>
+      </p:ext>
+    </p:extLst>
+  </p:cSld>
+  <p:clrMapOvr>
+    <a:masterClrMapping/>
+  </p:clrMapOvr>
+</p:sld>
+</file>
+
+<file path=ppt/slides/slide48.xml><?xml version="1.0" encoding="utf-8"?>
+<p:sld xmlns:a="http://schemas.openxmlformats.org/drawingml/2006/main" xmlns:r="http://schemas.openxmlformats.org/officeDocument/2006/relationships" xmlns:p="http://schemas.openxmlformats.org/presentationml/2006/main">
+  <p:cSld>
+    <p:spTree>
+      <p:nvGrpSpPr>
+        <p:cNvPr id="1" name=""/>
+        <p:cNvGrpSpPr/>
+        <p:nvPr/>
+      </p:nvGrpSpPr>
+      <p:grpSpPr>
+        <a:xfrm>
+          <a:off x="0" y="0"/>
+          <a:ext cx="0" cy="0"/>
+          <a:chOff x="0" y="0"/>
+          <a:chExt cx="0" cy="0"/>
+        </a:xfrm>
+      </p:grpSpPr>
+      <p:sp>
+        <p:nvSpPr>
+          <p:cNvPr id="3" name="내용 개체 틀 2"/>
+          <p:cNvSpPr>
+            <a:spLocks noGrp="1"/>
+          </p:cNvSpPr>
+          <p:nvPr>
+            <p:ph idx="1"/>
+          </p:nvPr>
+        </p:nvSpPr>
+        <p:spPr>
+          <a:xfrm>
+            <a:off x="784292" y="1594635"/>
+            <a:ext cx="10515600" cy="4351338"/>
+          </a:xfrm>
+        </p:spPr>
+        <p:txBody>
+          <a:bodyPr/>
+          <a:lstStyle/>
+          <a:p>
+            <a:r>
+              <a:rPr lang="en-US" altLang="ko-KR" dirty="0" smtClean="0"/>
+              <a:t>Scenario:</a:t>
+            </a:r>
+          </a:p>
+          <a:p>
+            <a:pPr lvl="1">
+              <a:buFontTx/>
+              <a:buChar char="-"/>
+            </a:pPr>
+            <a:r>
+              <a:rPr lang="en-US" altLang="ko-KR" dirty="0" smtClean="0"/>
+              <a:t>Master wait 2 slaves</a:t>
+            </a:r>
+          </a:p>
+          <a:p>
+            <a:pPr lvl="1">
+              <a:buFontTx/>
+              <a:buChar char="-"/>
+            </a:pPr>
+            <a:r>
+              <a:rPr lang="en-US" altLang="ko-KR" dirty="0"/>
+              <a:t>2</a:t>
+            </a:r>
+            <a:r>
+              <a:rPr lang="en-US" altLang="ko-KR" dirty="0" smtClean="0"/>
+              <a:t> slaves try to connect to </a:t>
+            </a:r>
+            <a:r>
+              <a:rPr lang="en-US" altLang="ko-KR" dirty="0" smtClean="0"/>
+              <a:t>master</a:t>
+            </a:r>
+          </a:p>
+          <a:p>
+            <a:pPr lvl="1">
+              <a:buFontTx/>
+              <a:buChar char="-"/>
+            </a:pPr>
+            <a:r>
+              <a:rPr lang="en-US" altLang="ko-KR" dirty="0" smtClean="0"/>
+              <a:t>They write (intermediate) partition files to output directory</a:t>
+            </a:r>
+          </a:p>
+          <a:p>
+            <a:pPr lvl="1">
+              <a:buFontTx/>
+              <a:buChar char="-"/>
+            </a:pPr>
+            <a:r>
+              <a:rPr lang="en-US" altLang="ko-KR" dirty="0"/>
+              <a:t>Partition name is partition_{file #}_{partition #}_{owner </a:t>
+            </a:r>
+            <a:r>
+              <a:rPr lang="en-US" altLang="ko-KR" dirty="0" smtClean="0"/>
+              <a:t>#}</a:t>
+            </a:r>
+          </a:p>
+          <a:p>
+            <a:pPr lvl="1">
+              <a:buFontTx/>
+              <a:buChar char="-"/>
+            </a:pPr>
+            <a:r>
+              <a:rPr lang="en-US" altLang="ko-KR" dirty="0" smtClean="0"/>
+              <a:t>Partitions</a:t>
+            </a:r>
+          </a:p>
+          <a:p>
+            <a:pPr lvl="2">
+              <a:buFontTx/>
+              <a:buChar char="-"/>
+            </a:pPr>
+            <a:r>
+              <a:rPr lang="en-US" altLang="ko-KR" dirty="0" smtClean="0"/>
+              <a:t>0~7 are for machine 0</a:t>
+            </a:r>
+          </a:p>
+          <a:p>
+            <a:pPr lvl="2">
+              <a:buFontTx/>
+              <a:buChar char="-"/>
+            </a:pPr>
+            <a:r>
+              <a:rPr lang="en-US" altLang="ko-KR" dirty="0" smtClean="0"/>
+              <a:t>8~15 are for machine 1</a:t>
+            </a:r>
+          </a:p>
+          <a:p>
+            <a:pPr lvl="2">
+              <a:buFontTx/>
+              <a:buChar char="-"/>
+            </a:pPr>
+            <a:r>
+              <a:rPr lang="en-US" altLang="ko-KR" dirty="0" smtClean="0"/>
+              <a:t>8 partitions for single machine</a:t>
+            </a:r>
+            <a:endParaRPr lang="en-US" altLang="ko-KR" dirty="0"/>
+          </a:p>
+        </p:txBody>
+      </p:sp>
+    </p:spTree>
+    <p:extLst>
+      <p:ext uri="{BB962C8B-B14F-4D97-AF65-F5344CB8AC3E}">
+        <p14:creationId xmlns:p14="http://schemas.microsoft.com/office/powerpoint/2010/main" val="882536301"/>
+      </p:ext>
+    </p:extLst>
+  </p:cSld>
+  <p:clrMapOvr>
+    <a:masterClrMapping/>
+  </p:clrMapOvr>
+</p:sld>
+</file>
+
+<file path=ppt/slides/slide49.xml><?xml version="1.0" encoding="utf-8"?>
+<p:sld xmlns:a="http://schemas.openxmlformats.org/drawingml/2006/main" xmlns:r="http://schemas.openxmlformats.org/officeDocument/2006/relationships" xmlns:p="http://schemas.openxmlformats.org/presentationml/2006/main">
+  <p:cSld>
+    <p:spTree>
+      <p:nvGrpSpPr>
+        <p:cNvPr id="1" name=""/>
+        <p:cNvGrpSpPr/>
+        <p:nvPr/>
+      </p:nvGrpSpPr>
+      <p:grpSpPr>
+        <a:xfrm>
+          <a:off x="0" y="0"/>
+          <a:ext cx="0" cy="0"/>
+          <a:chOff x="0" y="0"/>
+          <a:chExt cx="0" cy="0"/>
+        </a:xfrm>
+      </p:grpSpPr>
+      <p:sp>
+        <p:nvSpPr>
+          <p:cNvPr id="2" name="제목 1"/>
+          <p:cNvSpPr>
+            <a:spLocks noGrp="1"/>
+          </p:cNvSpPr>
+          <p:nvPr>
+            <p:ph type="title"/>
+          </p:nvPr>
+        </p:nvSpPr>
+        <p:spPr/>
+        <p:txBody>
+          <a:bodyPr/>
+          <a:lstStyle/>
+          <a:p>
+            <a:r>
+              <a:rPr lang="en-US" altLang="ko-KR" dirty="0" smtClean="0"/>
+              <a:t>Master</a:t>
+            </a:r>
+            <a:endParaRPr lang="ko-KR" altLang="en-US" dirty="0"/>
+          </a:p>
+        </p:txBody>
+      </p:sp>
+      <p:pic>
+        <p:nvPicPr>
+          <p:cNvPr id="5" name="내용 개체 틀 4" descr="141.223.82.191:22 - khpark0312@itcmas1:~ - Xshell 5 (Free for Home/School)"/>
+          <p:cNvPicPr>
+            <a:picLocks noGrp="1" noChangeAspect="1"/>
+          </p:cNvPicPr>
+          <p:nvPr>
+            <p:ph idx="1"/>
+          </p:nvPr>
+        </p:nvPicPr>
+        <p:blipFill rotWithShape="1">
+          <a:blip r:embed="rId2" cstate="print">
+            <a:extLst>
+              <a:ext uri="{28A0092B-C50C-407E-A947-70E740481C1C}">
+                <a14:useLocalDpi xmlns:a14="http://schemas.microsoft.com/office/drawing/2010/main" val="0"/>
+              </a:ext>
+            </a:extLst>
+          </a:blip>
+          <a:srcRect t="63719" r="63776" b="6209"/>
+          <a:stretch/>
+        </p:blipFill>
+        <p:spPr>
+          <a:xfrm>
+            <a:off x="2848118" y="2453832"/>
+            <a:ext cx="5917509" cy="3148184"/>
+          </a:xfrm>
+        </p:spPr>
+      </p:pic>
+    </p:spTree>
+    <p:extLst>
+      <p:ext uri="{BB962C8B-B14F-4D97-AF65-F5344CB8AC3E}">
+        <p14:creationId xmlns:p14="http://schemas.microsoft.com/office/powerpoint/2010/main" val="581266180"/>
       </p:ext>
     </p:extLst>
   </p:cSld>
@@ -19880,6 +20181,406 @@
       </p:par>
     </p:tnLst>
   </p:timing>
+</p:sld>
+</file>
+
+<file path=ppt/slides/slide50.xml><?xml version="1.0" encoding="utf-8"?>
+<p:sld xmlns:a="http://schemas.openxmlformats.org/drawingml/2006/main" xmlns:r="http://schemas.openxmlformats.org/officeDocument/2006/relationships" xmlns:p="http://schemas.openxmlformats.org/presentationml/2006/main">
+  <p:cSld>
+    <p:spTree>
+      <p:nvGrpSpPr>
+        <p:cNvPr id="1" name=""/>
+        <p:cNvGrpSpPr/>
+        <p:nvPr/>
+      </p:nvGrpSpPr>
+      <p:grpSpPr>
+        <a:xfrm>
+          <a:off x="0" y="0"/>
+          <a:ext cx="0" cy="0"/>
+          <a:chOff x="0" y="0"/>
+          <a:chExt cx="0" cy="0"/>
+        </a:xfrm>
+      </p:grpSpPr>
+      <p:sp>
+        <p:nvSpPr>
+          <p:cNvPr id="2" name="제목 1"/>
+          <p:cNvSpPr>
+            <a:spLocks noGrp="1"/>
+          </p:cNvSpPr>
+          <p:nvPr>
+            <p:ph type="title"/>
+          </p:nvPr>
+        </p:nvSpPr>
+        <p:spPr/>
+        <p:txBody>
+          <a:bodyPr/>
+          <a:lstStyle/>
+          <a:p>
+            <a:r>
+              <a:rPr lang="en-US" altLang="ko-KR" dirty="0" smtClean="0"/>
+              <a:t>Slave 1 </a:t>
+            </a:r>
+            <a:endParaRPr lang="ko-KR" altLang="en-US" dirty="0"/>
+          </a:p>
+        </p:txBody>
+      </p:sp>
+      <p:sp>
+        <p:nvSpPr>
+          <p:cNvPr id="3" name="TextBox 2"/>
+          <p:cNvSpPr txBox="1"/>
+          <p:nvPr/>
+        </p:nvSpPr>
+        <p:spPr>
+          <a:xfrm>
+            <a:off x="5412827" y="3139650"/>
+            <a:ext cx="338554" cy="369332"/>
+          </a:xfrm>
+          <a:prstGeom prst="rect">
+            <a:avLst/>
+          </a:prstGeom>
+          <a:noFill/>
+        </p:spPr>
+        <p:txBody>
+          <a:bodyPr wrap="none" rtlCol="0">
+            <a:spAutoFit/>
+          </a:bodyPr>
+          <a:lstStyle/>
+          <a:p>
+            <a:r>
+              <a:rPr lang="en-US" altLang="ko-KR" dirty="0" smtClean="0"/>
+              <a:t>...</a:t>
+            </a:r>
+            <a:endParaRPr lang="ko-KR" altLang="en-US" dirty="0"/>
+          </a:p>
+        </p:txBody>
+      </p:sp>
+      <p:pic>
+        <p:nvPicPr>
+          <p:cNvPr id="6" name="그림 5" descr="141.223.82.191:22 - khpark0312@itcmas1:~ - Xshell 5 (Free for Home/School)"/>
+          <p:cNvPicPr>
+            <a:picLocks noChangeAspect="1"/>
+          </p:cNvPicPr>
+          <p:nvPr/>
+        </p:nvPicPr>
+        <p:blipFill rotWithShape="1">
+          <a:blip r:embed="rId2" cstate="print">
+            <a:extLst>
+              <a:ext uri="{28A0092B-C50C-407E-A947-70E740481C1C}">
+                <a14:useLocalDpi xmlns:a14="http://schemas.microsoft.com/office/drawing/2010/main" val="0"/>
+              </a:ext>
+            </a:extLst>
+          </a:blip>
+          <a:srcRect t="65593" r="4429" b="5901"/>
+          <a:stretch/>
+        </p:blipFill>
+        <p:spPr>
+          <a:xfrm>
+            <a:off x="745211" y="4498428"/>
+            <a:ext cx="10227590" cy="1954924"/>
+          </a:xfrm>
+          <a:prstGeom prst="rect">
+            <a:avLst/>
+          </a:prstGeom>
+        </p:spPr>
+      </p:pic>
+      <p:pic>
+        <p:nvPicPr>
+          <p:cNvPr id="7" name="그림 6" descr="141.223.82.191:22 - khpark0312@itcmas1:~ - Xshell 5 (Free for Home/School)"/>
+          <p:cNvPicPr>
+            <a:picLocks noChangeAspect="1"/>
+          </p:cNvPicPr>
+          <p:nvPr/>
+        </p:nvPicPr>
+        <p:blipFill rotWithShape="1">
+          <a:blip r:embed="rId3" cstate="print">
+            <a:extLst>
+              <a:ext uri="{28A0092B-C50C-407E-A947-70E740481C1C}">
+                <a14:useLocalDpi xmlns:a14="http://schemas.microsoft.com/office/drawing/2010/main" val="0"/>
+              </a:ext>
+            </a:extLst>
+          </a:blip>
+          <a:srcRect t="42222" r="37429" b="6743"/>
+          <a:stretch/>
+        </p:blipFill>
+        <p:spPr>
+          <a:xfrm>
+            <a:off x="745211" y="2155519"/>
+            <a:ext cx="4299755" cy="2247409"/>
+          </a:xfrm>
+          <a:prstGeom prst="rect">
+            <a:avLst/>
+          </a:prstGeom>
+        </p:spPr>
+      </p:pic>
+      <p:sp>
+        <p:nvSpPr>
+          <p:cNvPr id="8" name="TextBox 7"/>
+          <p:cNvSpPr txBox="1"/>
+          <p:nvPr/>
+        </p:nvSpPr>
+        <p:spPr>
+          <a:xfrm>
+            <a:off x="706821" y="1601522"/>
+            <a:ext cx="7685822" cy="369332"/>
+          </a:xfrm>
+          <a:prstGeom prst="rect">
+            <a:avLst/>
+          </a:prstGeom>
+          <a:noFill/>
+        </p:spPr>
+        <p:txBody>
+          <a:bodyPr wrap="none" rtlCol="0">
+            <a:spAutoFit/>
+          </a:bodyPr>
+          <a:lstStyle/>
+          <a:p>
+            <a:r>
+              <a:rPr lang="en-US" altLang="ko-KR" dirty="0" smtClean="0"/>
+              <a:t>The log is too long. So I will just show some part of log and the result.</a:t>
+            </a:r>
+            <a:endParaRPr lang="ko-KR" altLang="en-US" dirty="0"/>
+          </a:p>
+        </p:txBody>
+      </p:sp>
+      <p:pic>
+        <p:nvPicPr>
+          <p:cNvPr id="9" name="그림 8" descr="141.223.82.191:22 - khpark0312@itcmas1:~ - Xshell 5 (Free for Home/School)"/>
+          <p:cNvPicPr>
+            <a:picLocks noChangeAspect="1"/>
+          </p:cNvPicPr>
+          <p:nvPr/>
+        </p:nvPicPr>
+        <p:blipFill rotWithShape="1">
+          <a:blip r:embed="rId4" cstate="print">
+            <a:extLst>
+              <a:ext uri="{28A0092B-C50C-407E-A947-70E740481C1C}">
+                <a14:useLocalDpi xmlns:a14="http://schemas.microsoft.com/office/drawing/2010/main" val="0"/>
+              </a:ext>
+            </a:extLst>
+          </a:blip>
+          <a:srcRect t="17242" r="33780" b="35905"/>
+          <a:stretch/>
+        </p:blipFill>
+        <p:spPr>
+          <a:xfrm>
+            <a:off x="6016264" y="2155519"/>
+            <a:ext cx="4956537" cy="2247409"/>
+          </a:xfrm>
+          <a:prstGeom prst="rect">
+            <a:avLst/>
+          </a:prstGeom>
+        </p:spPr>
+      </p:pic>
+    </p:spTree>
+    <p:extLst>
+      <p:ext uri="{BB962C8B-B14F-4D97-AF65-F5344CB8AC3E}">
+        <p14:creationId xmlns:p14="http://schemas.microsoft.com/office/powerpoint/2010/main" val="2185994503"/>
+      </p:ext>
+    </p:extLst>
+  </p:cSld>
+  <p:clrMapOvr>
+    <a:masterClrMapping/>
+  </p:clrMapOvr>
+</p:sld>
+</file>
+
+<file path=ppt/slides/slide51.xml><?xml version="1.0" encoding="utf-8"?>
+<p:sld xmlns:a="http://schemas.openxmlformats.org/drawingml/2006/main" xmlns:r="http://schemas.openxmlformats.org/officeDocument/2006/relationships" xmlns:p="http://schemas.openxmlformats.org/presentationml/2006/main">
+  <p:cSld>
+    <p:spTree>
+      <p:nvGrpSpPr>
+        <p:cNvPr id="1" name=""/>
+        <p:cNvGrpSpPr/>
+        <p:nvPr/>
+      </p:nvGrpSpPr>
+      <p:grpSpPr>
+        <a:xfrm>
+          <a:off x="0" y="0"/>
+          <a:ext cx="0" cy="0"/>
+          <a:chOff x="0" y="0"/>
+          <a:chExt cx="0" cy="0"/>
+        </a:xfrm>
+      </p:grpSpPr>
+      <p:sp>
+        <p:nvSpPr>
+          <p:cNvPr id="2" name="제목 1"/>
+          <p:cNvSpPr>
+            <a:spLocks noGrp="1"/>
+          </p:cNvSpPr>
+          <p:nvPr>
+            <p:ph type="title"/>
+          </p:nvPr>
+        </p:nvSpPr>
+        <p:spPr/>
+        <p:txBody>
+          <a:bodyPr/>
+          <a:lstStyle/>
+          <a:p>
+            <a:r>
+              <a:rPr lang="en-US" altLang="ko-KR" dirty="0" smtClean="0"/>
+              <a:t>Slave 2 </a:t>
+            </a:r>
+            <a:endParaRPr lang="ko-KR" altLang="en-US" dirty="0"/>
+          </a:p>
+        </p:txBody>
+      </p:sp>
+      <p:sp>
+        <p:nvSpPr>
+          <p:cNvPr id="3" name="TextBox 2"/>
+          <p:cNvSpPr txBox="1"/>
+          <p:nvPr/>
+        </p:nvSpPr>
+        <p:spPr>
+          <a:xfrm>
+            <a:off x="5537116" y="2998479"/>
+            <a:ext cx="338554" cy="369332"/>
+          </a:xfrm>
+          <a:prstGeom prst="rect">
+            <a:avLst/>
+          </a:prstGeom>
+          <a:noFill/>
+        </p:spPr>
+        <p:txBody>
+          <a:bodyPr wrap="none" rtlCol="0">
+            <a:spAutoFit/>
+          </a:bodyPr>
+          <a:lstStyle/>
+          <a:p>
+            <a:r>
+              <a:rPr lang="en-US" altLang="ko-KR" dirty="0" smtClean="0"/>
+              <a:t>...</a:t>
+            </a:r>
+            <a:endParaRPr lang="ko-KR" altLang="en-US" dirty="0"/>
+          </a:p>
+        </p:txBody>
+      </p:sp>
+      <p:sp>
+        <p:nvSpPr>
+          <p:cNvPr id="8" name="TextBox 7"/>
+          <p:cNvSpPr txBox="1"/>
+          <p:nvPr/>
+        </p:nvSpPr>
+        <p:spPr>
+          <a:xfrm>
+            <a:off x="696064" y="1542144"/>
+            <a:ext cx="2058384" cy="369332"/>
+          </a:xfrm>
+          <a:prstGeom prst="rect">
+            <a:avLst/>
+          </a:prstGeom>
+          <a:noFill/>
+        </p:spPr>
+        <p:txBody>
+          <a:bodyPr wrap="none" rtlCol="0">
+            <a:spAutoFit/>
+          </a:bodyPr>
+          <a:lstStyle/>
+          <a:p>
+            <a:r>
+              <a:rPr lang="en-US" altLang="ko-KR" dirty="0" smtClean="0"/>
+              <a:t>Similar to Slave 1</a:t>
+            </a:r>
+            <a:endParaRPr lang="ko-KR" altLang="en-US" dirty="0"/>
+          </a:p>
+        </p:txBody>
+      </p:sp>
+      <p:pic>
+        <p:nvPicPr>
+          <p:cNvPr id="4" name="그림 3" descr="141.223.82.191:22 - khpark0312@itcmas1:~ - Xshell 5 (Free for Home/School)"/>
+          <p:cNvPicPr>
+            <a:picLocks noChangeAspect="1"/>
+          </p:cNvPicPr>
+          <p:nvPr/>
+        </p:nvPicPr>
+        <p:blipFill rotWithShape="1">
+          <a:blip r:embed="rId2" cstate="print">
+            <a:extLst>
+              <a:ext uri="{28A0092B-C50C-407E-A947-70E740481C1C}">
+                <a14:useLocalDpi xmlns:a14="http://schemas.microsoft.com/office/drawing/2010/main" val="0"/>
+              </a:ext>
+            </a:extLst>
+          </a:blip>
+          <a:srcRect t="63601" r="7621" b="6590"/>
+          <a:stretch/>
+        </p:blipFill>
+        <p:spPr>
+          <a:xfrm>
+            <a:off x="745211" y="4514192"/>
+            <a:ext cx="9886004" cy="2044263"/>
+          </a:xfrm>
+          <a:prstGeom prst="rect">
+            <a:avLst/>
+          </a:prstGeom>
+        </p:spPr>
+      </p:pic>
+      <p:pic>
+        <p:nvPicPr>
+          <p:cNvPr id="5" name="그림 4" descr="141.223.82.191:22 - khpark0312@itcmas1:~ - Xshell 5 (Free for Home/School)"/>
+          <p:cNvPicPr>
+            <a:picLocks noChangeAspect="1"/>
+          </p:cNvPicPr>
+          <p:nvPr/>
+        </p:nvPicPr>
+        <p:blipFill rotWithShape="1">
+          <a:blip r:embed="rId3" cstate="print">
+            <a:extLst>
+              <a:ext uri="{28A0092B-C50C-407E-A947-70E740481C1C}">
+                <a14:useLocalDpi xmlns:a14="http://schemas.microsoft.com/office/drawing/2010/main" val="0"/>
+              </a:ext>
+            </a:extLst>
+          </a:blip>
+          <a:srcRect t="16245" r="38651" b="34123"/>
+          <a:stretch/>
+        </p:blipFill>
+        <p:spPr>
+          <a:xfrm>
+            <a:off x="745211" y="1970854"/>
+            <a:ext cx="4676643" cy="2424582"/>
+          </a:xfrm>
+          <a:prstGeom prst="rect">
+            <a:avLst/>
+          </a:prstGeom>
+        </p:spPr>
+      </p:pic>
+      <p:pic>
+        <p:nvPicPr>
+          <p:cNvPr id="10" name="그림 9" descr="141.223.82.191:22 - khpark0312@itcmas1:~ - Xshell 5 (Free for Home/School)"/>
+          <p:cNvPicPr>
+            <a:picLocks noChangeAspect="1"/>
+          </p:cNvPicPr>
+          <p:nvPr/>
+        </p:nvPicPr>
+        <p:blipFill rotWithShape="1">
+          <a:blip r:embed="rId4" cstate="print">
+            <a:extLst>
+              <a:ext uri="{28A0092B-C50C-407E-A947-70E740481C1C}">
+                <a14:useLocalDpi xmlns:a14="http://schemas.microsoft.com/office/drawing/2010/main" val="0"/>
+              </a:ext>
+            </a:extLst>
+          </a:blip>
+          <a:srcRect t="17647" r="35893" b="31308"/>
+          <a:stretch/>
+        </p:blipFill>
+        <p:spPr>
+          <a:xfrm>
+            <a:off x="5990933" y="1970855"/>
+            <a:ext cx="4665354" cy="2380614"/>
+          </a:xfrm>
+          <a:prstGeom prst="rect">
+            <a:avLst/>
+          </a:prstGeom>
+        </p:spPr>
+      </p:pic>
+    </p:spTree>
+    <p:extLst>
+      <p:ext uri="{BB962C8B-B14F-4D97-AF65-F5344CB8AC3E}">
+        <p14:creationId xmlns:p14="http://schemas.microsoft.com/office/powerpoint/2010/main" val="976844201"/>
+      </p:ext>
+    </p:extLst>
+  </p:cSld>
+  <p:clrMapOvr>
+    <a:masterClrMapping/>
+  </p:clrMapOvr>
 </p:sld>
 </file>
 

</xml_diff>